<commit_message>
Fixing slides for MS Access
</commit_message>
<xml_diff>
--- a/Courses/Software-Sciences/Module-3-Databases-New/11-MS-Access/11-MS-Access.pptx
+++ b/Courses/Software-Sciences/Module-3-Databases-New/11-MS-Access/11-MS-Access.pptx
@@ -143,7 +143,7 @@
   </p:defaultTextStyle>
   <p:extLst>
     <p:ext uri="{521415D9-36F7-43E2-AB2F-B90AF26B5E84}">
-      <p14:sectionLst xmlns:p14="http://schemas.microsoft.com/office/powerpoint/2010/main">
+      <p14:sectionLst xmlns:p14="http://schemas.microsoft.com/office/powerpoint/2010/main" xmlns="">
         <p14:section name="Въведение" id="{A0C7653D-1924-4F56-9E27-AA2B21F1DA92}">
           <p14:sldIdLst>
             <p14:sldId id="503"/>
@@ -207,7 +207,7 @@
       </p14:sectionLst>
     </p:ext>
     <p:ext uri="{EFAFB233-063F-42B5-8137-9DF3F51BA10A}">
-      <p15:sldGuideLst xmlns:p15="http://schemas.microsoft.com/office/powerpoint/2012/main">
+      <p15:sldGuideLst xmlns:p15="http://schemas.microsoft.com/office/powerpoint/2012/main" xmlns="">
         <p15:guide id="1" orient="horz" pos="2184" userDrawn="1">
           <p15:clr>
             <a:srgbClr val="A4A3A4"/>
@@ -221,7 +221,7 @@
       </p15:sldGuideLst>
     </p:ext>
     <p:ext uri="{2D200454-40CA-4A62-9FC3-DE9A4176ACB9}">
-      <p15:notesGuideLst xmlns:p15="http://schemas.microsoft.com/office/powerpoint/2012/main"/>
+      <p15:notesGuideLst xmlns:p15="http://schemas.microsoft.com/office/powerpoint/2012/main" xmlns=""/>
     </p:ext>
   </p:extLst>
 </p:presentation>
@@ -254,7 +254,7 @@
           <p:cNvPr id="2" name="Header Placeholder 1">
             <a:extLst>
               <a:ext uri="{FF2B5EF4-FFF2-40B4-BE49-F238E27FC236}">
-                <a16:creationId xmlns:a16="http://schemas.microsoft.com/office/drawing/2014/main" id="{56F20103-83CC-4A54-8FDE-9D37FC2629C0}"/>
+                <a16:creationId xmlns:a16="http://schemas.microsoft.com/office/drawing/2014/main" xmlns="" id="{56F20103-83CC-4A54-8FDE-9D37FC2629C0}"/>
               </a:ext>
             </a:extLst>
           </p:cNvPr>
@@ -291,7 +291,7 @@
           <p:cNvPr id="3" name="Date Placeholder 2">
             <a:extLst>
               <a:ext uri="{FF2B5EF4-FFF2-40B4-BE49-F238E27FC236}">
-                <a16:creationId xmlns:a16="http://schemas.microsoft.com/office/drawing/2014/main" id="{27A53962-26EF-44E4-9E69-61B1727AB1C2}"/>
+                <a16:creationId xmlns:a16="http://schemas.microsoft.com/office/drawing/2014/main" xmlns="" id="{27A53962-26EF-44E4-9E69-61B1727AB1C2}"/>
               </a:ext>
             </a:extLst>
           </p:cNvPr>
@@ -322,7 +322,7 @@
             <a:fld id="{4E087215-0C8F-4762-A664-737A353EC9A4}" type="datetimeFigureOut">
               <a:rPr lang="bg-BG" smtClean="0"/>
               <a:pPr/>
-              <a:t>7.09.23 г.</a:t>
+              <a:t>7.9.2023 г.</a:t>
             </a:fld>
             <a:endParaRPr lang="bg-BG" dirty="0"/>
           </a:p>
@@ -333,7 +333,7 @@
           <p:cNvPr id="4" name="Footer Placeholder 3">
             <a:extLst>
               <a:ext uri="{FF2B5EF4-FFF2-40B4-BE49-F238E27FC236}">
-                <a16:creationId xmlns:a16="http://schemas.microsoft.com/office/drawing/2014/main" id="{28A6967E-448F-4887-8FCB-34482EFBCC74}"/>
+                <a16:creationId xmlns:a16="http://schemas.microsoft.com/office/drawing/2014/main" xmlns="" id="{28A6967E-448F-4887-8FCB-34482EFBCC74}"/>
               </a:ext>
             </a:extLst>
           </p:cNvPr>
@@ -383,7 +383,7 @@
           <p:cNvPr id="5" name="Slide Number Placeholder 4">
             <a:extLst>
               <a:ext uri="{FF2B5EF4-FFF2-40B4-BE49-F238E27FC236}">
-                <a16:creationId xmlns:a16="http://schemas.microsoft.com/office/drawing/2014/main" id="{8B6554C2-DDBA-40E2-9536-53A07EC50274}"/>
+                <a16:creationId xmlns:a16="http://schemas.microsoft.com/office/drawing/2014/main" xmlns="" id="{8B6554C2-DDBA-40E2-9536-53A07EC50274}"/>
               </a:ext>
             </a:extLst>
           </p:cNvPr>
@@ -423,7 +423,7 @@
     </p:spTree>
     <p:extLst>
       <p:ext uri="{BB962C8B-B14F-4D97-AF65-F5344CB8AC3E}">
-        <p14:creationId xmlns:p14="http://schemas.microsoft.com/office/powerpoint/2010/main" val="4150602968"/>
+        <p14:creationId xmlns:p14="http://schemas.microsoft.com/office/powerpoint/2010/main" xmlns="" val="4150602968"/>
       </p:ext>
     </p:extLst>
   </p:cSld>
@@ -515,7 +515,7 @@
             <a:fld id="{72D84649-876A-46C9-8472-14CB09C070D8}" type="datetimeFigureOut">
               <a:rPr lang="en-US" smtClean="0"/>
               <a:pPr/>
-              <a:t>9/7/23</a:t>
+              <a:t>9/7/2023</a:t>
             </a:fld>
             <a:endParaRPr lang="en-US" dirty="0"/>
           </a:p>
@@ -654,7 +654,7 @@
           <p:cNvPr id="8" name="Footer Placeholder 7">
             <a:extLst>
               <a:ext uri="{FF2B5EF4-FFF2-40B4-BE49-F238E27FC236}">
-                <a16:creationId xmlns:a16="http://schemas.microsoft.com/office/drawing/2014/main" id="{CAC3A49B-3196-44DF-AC28-085C72EFBFF0}"/>
+                <a16:creationId xmlns:a16="http://schemas.microsoft.com/office/drawing/2014/main" xmlns="" id="{CAC3A49B-3196-44DF-AC28-085C72EFBFF0}"/>
               </a:ext>
             </a:extLst>
           </p:cNvPr>
@@ -702,7 +702,7 @@
     </p:spTree>
     <p:extLst>
       <p:ext uri="{BB962C8B-B14F-4D97-AF65-F5344CB8AC3E}">
-        <p14:creationId xmlns:p14="http://schemas.microsoft.com/office/powerpoint/2010/main" val="1530847692"/>
+        <p14:creationId xmlns:p14="http://schemas.microsoft.com/office/powerpoint/2010/main" xmlns="" val="1530847692"/>
       </p:ext>
     </p:extLst>
   </p:cSld>
@@ -849,7 +849,7 @@
           <p:cNvPr id="8" name="Slide Image Placeholder 7">
             <a:extLst>
               <a:ext uri="{FF2B5EF4-FFF2-40B4-BE49-F238E27FC236}">
-                <a16:creationId xmlns:a16="http://schemas.microsoft.com/office/drawing/2014/main" id="{78811095-27E9-49AB-972B-D4E20B3963A6}"/>
+                <a16:creationId xmlns:a16="http://schemas.microsoft.com/office/drawing/2014/main" xmlns="" id="{78811095-27E9-49AB-972B-D4E20B3963A6}"/>
               </a:ext>
             </a:extLst>
           </p:cNvPr>
@@ -867,7 +867,7 @@
           <p:cNvPr id="9" name="Notes Placeholder 8">
             <a:extLst>
               <a:ext uri="{FF2B5EF4-FFF2-40B4-BE49-F238E27FC236}">
-                <a16:creationId xmlns:a16="http://schemas.microsoft.com/office/drawing/2014/main" id="{E923224B-0CC3-475A-8628-8A90751AE61A}"/>
+                <a16:creationId xmlns:a16="http://schemas.microsoft.com/office/drawing/2014/main" xmlns="" id="{E923224B-0CC3-475A-8628-8A90751AE61A}"/>
               </a:ext>
             </a:extLst>
           </p:cNvPr>
@@ -892,7 +892,7 @@
           <p:cNvPr id="2" name="Footer Placeholder 1">
             <a:extLst>
               <a:ext uri="{FF2B5EF4-FFF2-40B4-BE49-F238E27FC236}">
-                <a16:creationId xmlns:a16="http://schemas.microsoft.com/office/drawing/2014/main" id="{3288A3F3-90B1-4930-8D00-5603BDABEF10}"/>
+                <a16:creationId xmlns:a16="http://schemas.microsoft.com/office/drawing/2014/main" xmlns="" id="{3288A3F3-90B1-4930-8D00-5603BDABEF10}"/>
               </a:ext>
             </a:extLst>
           </p:cNvPr>
@@ -928,7 +928,7 @@
     </p:spTree>
     <p:extLst>
       <p:ext uri="{BB962C8B-B14F-4D97-AF65-F5344CB8AC3E}">
-        <p14:creationId xmlns:p14="http://schemas.microsoft.com/office/powerpoint/2010/main" val="2594489433"/>
+        <p14:creationId xmlns:p14="http://schemas.microsoft.com/office/powerpoint/2010/main" xmlns="" val="2594489433"/>
       </p:ext>
     </p:extLst>
   </p:cSld>
@@ -1106,7 +1106,7 @@
           <p:cNvPr id="7" name="Slide Number Placeholder 5">
             <a:extLst>
               <a:ext uri="{FF2B5EF4-FFF2-40B4-BE49-F238E27FC236}">
-                <a16:creationId xmlns:a16="http://schemas.microsoft.com/office/drawing/2014/main" id="{E65F1CA9-65DC-416B-8882-B3A5E415CE67}"/>
+                <a16:creationId xmlns:a16="http://schemas.microsoft.com/office/drawing/2014/main" xmlns="" id="{E65F1CA9-65DC-416B-8882-B3A5E415CE67}"/>
               </a:ext>
             </a:extLst>
           </p:cNvPr>
@@ -1236,7 +1236,7 @@
           <p:cNvPr id="4" name="Footer Placeholder 3">
             <a:extLst>
               <a:ext uri="{FF2B5EF4-FFF2-40B4-BE49-F238E27FC236}">
-                <a16:creationId xmlns:a16="http://schemas.microsoft.com/office/drawing/2014/main" id="{C5BD11C3-9FCD-4EAE-876D-E766924FAFF2}"/>
+                <a16:creationId xmlns:a16="http://schemas.microsoft.com/office/drawing/2014/main" xmlns="" id="{C5BD11C3-9FCD-4EAE-876D-E766924FAFF2}"/>
               </a:ext>
             </a:extLst>
           </p:cNvPr>
@@ -1272,7 +1272,7 @@
     </p:spTree>
     <p:extLst>
       <p:ext uri="{BB962C8B-B14F-4D97-AF65-F5344CB8AC3E}">
-        <p14:creationId xmlns:p14="http://schemas.microsoft.com/office/powerpoint/2010/main" val="1860974293"/>
+        <p14:creationId xmlns:p14="http://schemas.microsoft.com/office/powerpoint/2010/main" xmlns="" val="1860974293"/>
       </p:ext>
     </p:extLst>
   </p:cSld>
@@ -1357,7 +1357,7 @@
     </p:spTree>
     <p:extLst>
       <p:ext uri="{BB962C8B-B14F-4D97-AF65-F5344CB8AC3E}">
-        <p14:creationId xmlns:p14="http://schemas.microsoft.com/office/powerpoint/2010/main" val="1201445929"/>
+        <p14:creationId xmlns:p14="http://schemas.microsoft.com/office/powerpoint/2010/main" xmlns="" val="1201445929"/>
       </p:ext>
     </p:extLst>
   </p:cSld>
@@ -1420,7 +1420,7 @@
           <p:cNvPr id="6" name="Slide Number Placeholder 5">
             <a:extLst>
               <a:ext uri="{FF2B5EF4-FFF2-40B4-BE49-F238E27FC236}">
-                <a16:creationId xmlns:a16="http://schemas.microsoft.com/office/drawing/2014/main" id="{6627548A-4D3C-449B-81A5-FA4BE4628490}"/>
+                <a16:creationId xmlns:a16="http://schemas.microsoft.com/office/drawing/2014/main" xmlns="" id="{6627548A-4D3C-449B-81A5-FA4BE4628490}"/>
               </a:ext>
             </a:extLst>
           </p:cNvPr>
@@ -1550,7 +1550,7 @@
           <p:cNvPr id="4" name="Footer Placeholder 3">
             <a:extLst>
               <a:ext uri="{FF2B5EF4-FFF2-40B4-BE49-F238E27FC236}">
-                <a16:creationId xmlns:a16="http://schemas.microsoft.com/office/drawing/2014/main" id="{D2472CE7-61C1-4B7B-B0C8-5A45F0178717}"/>
+                <a16:creationId xmlns:a16="http://schemas.microsoft.com/office/drawing/2014/main" xmlns="" id="{D2472CE7-61C1-4B7B-B0C8-5A45F0178717}"/>
               </a:ext>
             </a:extLst>
           </p:cNvPr>
@@ -1586,7 +1586,7 @@
     </p:spTree>
     <p:extLst>
       <p:ext uri="{BB962C8B-B14F-4D97-AF65-F5344CB8AC3E}">
-        <p14:creationId xmlns:p14="http://schemas.microsoft.com/office/powerpoint/2010/main" val="729041308"/>
+        <p14:creationId xmlns:p14="http://schemas.microsoft.com/office/powerpoint/2010/main" xmlns="" val="729041308"/>
       </p:ext>
     </p:extLst>
   </p:cSld>
@@ -1618,7 +1618,7 @@
           <p:cNvPr id="14" name="Slide Image Placeholder 13">
             <a:extLst>
               <a:ext uri="{FF2B5EF4-FFF2-40B4-BE49-F238E27FC236}">
-                <a16:creationId xmlns:a16="http://schemas.microsoft.com/office/drawing/2014/main" id="{A1F0B3C6-2E53-4CA3-86D1-53D46EC35267}"/>
+                <a16:creationId xmlns:a16="http://schemas.microsoft.com/office/drawing/2014/main" xmlns="" id="{A1F0B3C6-2E53-4CA3-86D1-53D46EC35267}"/>
               </a:ext>
             </a:extLst>
           </p:cNvPr>
@@ -1636,7 +1636,7 @@
           <p:cNvPr id="15" name="Notes Placeholder 14">
             <a:extLst>
               <a:ext uri="{FF2B5EF4-FFF2-40B4-BE49-F238E27FC236}">
-                <a16:creationId xmlns:a16="http://schemas.microsoft.com/office/drawing/2014/main" id="{149CC699-A079-49A5-A4D6-73B7F849A7DC}"/>
+                <a16:creationId xmlns:a16="http://schemas.microsoft.com/office/drawing/2014/main" xmlns="" id="{149CC699-A079-49A5-A4D6-73B7F849A7DC}"/>
               </a:ext>
             </a:extLst>
           </p:cNvPr>
@@ -1661,7 +1661,7 @@
           <p:cNvPr id="19" name="Slide Number Placeholder 5">
             <a:extLst>
               <a:ext uri="{FF2B5EF4-FFF2-40B4-BE49-F238E27FC236}">
-                <a16:creationId xmlns:a16="http://schemas.microsoft.com/office/drawing/2014/main" id="{121F4233-7E9A-40D2-9066-2DB14E2FA5AD}"/>
+                <a16:creationId xmlns:a16="http://schemas.microsoft.com/office/drawing/2014/main" xmlns="" id="{121F4233-7E9A-40D2-9066-2DB14E2FA5AD}"/>
               </a:ext>
             </a:extLst>
           </p:cNvPr>
@@ -1791,7 +1791,7 @@
           <p:cNvPr id="2" name="Footer Placeholder 1">
             <a:extLst>
               <a:ext uri="{FF2B5EF4-FFF2-40B4-BE49-F238E27FC236}">
-                <a16:creationId xmlns:a16="http://schemas.microsoft.com/office/drawing/2014/main" id="{D18F1DFF-B3E7-4ABF-97EE-0BBF3A961EC5}"/>
+                <a16:creationId xmlns:a16="http://schemas.microsoft.com/office/drawing/2014/main" xmlns="" id="{D18F1DFF-B3E7-4ABF-97EE-0BBF3A961EC5}"/>
               </a:ext>
             </a:extLst>
           </p:cNvPr>
@@ -1827,7 +1827,7 @@
     </p:spTree>
     <p:extLst>
       <p:ext uri="{BB962C8B-B14F-4D97-AF65-F5344CB8AC3E}">
-        <p14:creationId xmlns:p14="http://schemas.microsoft.com/office/powerpoint/2010/main" val="4028530743"/>
+        <p14:creationId xmlns:p14="http://schemas.microsoft.com/office/powerpoint/2010/main" xmlns="" val="4028530743"/>
       </p:ext>
     </p:extLst>
   </p:cSld>
@@ -2664,7 +2664,7 @@
           <p:cNvPr id="16" name="Rectangle Bottom">
             <a:extLst>
               <a:ext uri="{FF2B5EF4-FFF2-40B4-BE49-F238E27FC236}">
-                <a16:creationId xmlns:a16="http://schemas.microsoft.com/office/drawing/2014/main" id="{6854D183-0374-4B3E-B2CE-32F308A81591}"/>
+                <a16:creationId xmlns:a16="http://schemas.microsoft.com/office/drawing/2014/main" xmlns="" id="{6854D183-0374-4B3E-B2CE-32F308A81591}"/>
               </a:ext>
             </a:extLst>
           </p:cNvPr>
@@ -2745,7 +2745,7 @@
           <p:cNvPr id="14" name="Picture Logo SoftUni" descr="SoftUni logo">
             <a:extLst>
               <a:ext uri="{FF2B5EF4-FFF2-40B4-BE49-F238E27FC236}">
-                <a16:creationId xmlns:a16="http://schemas.microsoft.com/office/drawing/2014/main" id="{C4D6B2A2-DFF0-4712-BFEC-6676BEC99FEC}"/>
+                <a16:creationId xmlns:a16="http://schemas.microsoft.com/office/drawing/2014/main" xmlns="" id="{C4D6B2A2-DFF0-4712-BFEC-6676BEC99FEC}"/>
               </a:ext>
             </a:extLst>
           </p:cNvPr>
@@ -2768,7 +2768,7 @@
             </a:clrChange>
             <a:extLst>
               <a:ext uri="{28A0092B-C50C-407E-A947-70E740481C1C}">
-                <a14:useLocalDpi xmlns:a14="http://schemas.microsoft.com/office/drawing/2010/main" val="0"/>
+                <a14:useLocalDpi xmlns:a14="http://schemas.microsoft.com/office/drawing/2010/main" xmlns="" val="0"/>
               </a:ext>
             </a:extLst>
           </a:blip>
@@ -2791,7 +2791,7 @@
           <p:cNvPr id="31" name="Text Placeholder Company Site">
             <a:extLst>
               <a:ext uri="{FF2B5EF4-FFF2-40B4-BE49-F238E27FC236}">
-                <a16:creationId xmlns:a16="http://schemas.microsoft.com/office/drawing/2014/main" id="{3E6B87B7-9D33-4EBB-BD4F-C0436BA3FD72}"/>
+                <a16:creationId xmlns:a16="http://schemas.microsoft.com/office/drawing/2014/main" xmlns="" id="{3E6B87B7-9D33-4EBB-BD4F-C0436BA3FD72}"/>
               </a:ext>
             </a:extLst>
           </p:cNvPr>
@@ -2853,7 +2853,7 @@
           <p:cNvPr id="30" name="Text Placeholder Company Name">
             <a:extLst>
               <a:ext uri="{FF2B5EF4-FFF2-40B4-BE49-F238E27FC236}">
-                <a16:creationId xmlns:a16="http://schemas.microsoft.com/office/drawing/2014/main" id="{2EA92DCA-4DB5-4D03-ACD3-A6A296592D0C}"/>
+                <a16:creationId xmlns:a16="http://schemas.microsoft.com/office/drawing/2014/main" xmlns="" id="{2EA92DCA-4DB5-4D03-ACD3-A6A296592D0C}"/>
               </a:ext>
             </a:extLst>
           </p:cNvPr>
@@ -2915,7 +2915,7 @@
           <p:cNvPr id="35" name="Picture SoftUni Mascot" descr="SoftUni mascot">
             <a:extLst>
               <a:ext uri="{FF2B5EF4-FFF2-40B4-BE49-F238E27FC236}">
-                <a16:creationId xmlns:a16="http://schemas.microsoft.com/office/drawing/2014/main" id="{951E7DA9-C5F0-43D9-B013-3BDF9EEF029D}"/>
+                <a16:creationId xmlns:a16="http://schemas.microsoft.com/office/drawing/2014/main" xmlns="" id="{951E7DA9-C5F0-43D9-B013-3BDF9EEF029D}"/>
               </a:ext>
             </a:extLst>
           </p:cNvPr>
@@ -2928,7 +2928,7 @@
           <a:blip r:embed="rId3" cstate="print">
             <a:extLst>
               <a:ext uri="{28A0092B-C50C-407E-A947-70E740481C1C}">
-                <a14:useLocalDpi xmlns:a14="http://schemas.microsoft.com/office/drawing/2010/main" val="0"/>
+                <a14:useLocalDpi xmlns:a14="http://schemas.microsoft.com/office/drawing/2010/main" xmlns="" val="0"/>
               </a:ext>
             </a:extLst>
           </a:blip>
@@ -2951,7 +2951,7 @@
             <a:hlinkClick r:id="rId4"/>
             <a:extLst>
               <a:ext uri="{FF2B5EF4-FFF2-40B4-BE49-F238E27FC236}">
-                <a16:creationId xmlns:a16="http://schemas.microsoft.com/office/drawing/2014/main" id="{F2315EB3-3FE4-4D3B-921E-5F209CEC13CB}"/>
+                <a16:creationId xmlns:a16="http://schemas.microsoft.com/office/drawing/2014/main" xmlns="" id="{F2315EB3-3FE4-4D3B-921E-5F209CEC13CB}"/>
               </a:ext>
             </a:extLst>
           </p:cNvPr>
@@ -2974,7 +2974,7 @@
             </a:clrChange>
             <a:extLst>
               <a:ext uri="{28A0092B-C50C-407E-A947-70E740481C1C}">
-                <a14:useLocalDpi xmlns:a14="http://schemas.microsoft.com/office/drawing/2010/main" val="0"/>
+                <a14:useLocalDpi xmlns:a14="http://schemas.microsoft.com/office/drawing/2010/main" xmlns="" val="0"/>
               </a:ext>
             </a:extLst>
           </a:blip>
@@ -2997,7 +2997,7 @@
           <p:cNvPr id="40" name="Text Placeholder Author Position">
             <a:extLst>
               <a:ext uri="{FF2B5EF4-FFF2-40B4-BE49-F238E27FC236}">
-                <a16:creationId xmlns:a16="http://schemas.microsoft.com/office/drawing/2014/main" id="{CD940256-851E-46C8-8BFB-A5ECA6C7DA07}"/>
+                <a16:creationId xmlns:a16="http://schemas.microsoft.com/office/drawing/2014/main" xmlns="" id="{CD940256-851E-46C8-8BFB-A5ECA6C7DA07}"/>
               </a:ext>
             </a:extLst>
           </p:cNvPr>
@@ -3057,7 +3057,7 @@
           <p:cNvPr id="36" name="Text Placeholder Author Name">
             <a:extLst>
               <a:ext uri="{FF2B5EF4-FFF2-40B4-BE49-F238E27FC236}">
-                <a16:creationId xmlns:a16="http://schemas.microsoft.com/office/drawing/2014/main" id="{3B21F47B-DE1F-442D-A2B7-6866F8786704}"/>
+                <a16:creationId xmlns:a16="http://schemas.microsoft.com/office/drawing/2014/main" xmlns="" id="{3B21F47B-DE1F-442D-A2B7-6866F8786704}"/>
               </a:ext>
             </a:extLst>
           </p:cNvPr>
@@ -3117,7 +3117,7 @@
           <p:cNvPr id="33" name="Picture Placeholder Title Image">
             <a:extLst>
               <a:ext uri="{FF2B5EF4-FFF2-40B4-BE49-F238E27FC236}">
-                <a16:creationId xmlns:a16="http://schemas.microsoft.com/office/drawing/2014/main" id="{A04D819A-89E2-4714-8C56-1838BF467EF7}"/>
+                <a16:creationId xmlns:a16="http://schemas.microsoft.com/office/drawing/2014/main" xmlns="" id="{A04D819A-89E2-4714-8C56-1838BF467EF7}"/>
               </a:ext>
             </a:extLst>
           </p:cNvPr>
@@ -3159,7 +3159,7 @@
           <p:cNvPr id="43" name="Presentation Subtitle">
             <a:extLst>
               <a:ext uri="{FF2B5EF4-FFF2-40B4-BE49-F238E27FC236}">
-                <a16:creationId xmlns:a16="http://schemas.microsoft.com/office/drawing/2014/main" id="{37BDB812-1395-4B02-ABCF-6A331EEE23E5}"/>
+                <a16:creationId xmlns:a16="http://schemas.microsoft.com/office/drawing/2014/main" xmlns="" id="{37BDB812-1395-4B02-ABCF-6A331EEE23E5}"/>
               </a:ext>
             </a:extLst>
           </p:cNvPr>
@@ -3203,7 +3203,7 @@
           <p:cNvPr id="2" name="Presentation Title">
             <a:extLst>
               <a:ext uri="{FF2B5EF4-FFF2-40B4-BE49-F238E27FC236}">
-                <a16:creationId xmlns:a16="http://schemas.microsoft.com/office/drawing/2014/main" id="{A4DF3AB8-E6E3-4FCE-8A4A-ECD147720A5D}"/>
+                <a16:creationId xmlns:a16="http://schemas.microsoft.com/office/drawing/2014/main" xmlns="" id="{A4DF3AB8-E6E3-4FCE-8A4A-ECD147720A5D}"/>
               </a:ext>
             </a:extLst>
           </p:cNvPr>
@@ -3238,24 +3238,24 @@
     </p:spTree>
     <p:extLst>
       <p:ext uri="{BB962C8B-B14F-4D97-AF65-F5344CB8AC3E}">
-        <p14:creationId xmlns:p14="http://schemas.microsoft.com/office/powerpoint/2010/main" val="970179299"/>
+        <p14:creationId xmlns:p14="http://schemas.microsoft.com/office/powerpoint/2010/main" xmlns="" val="970179299"/>
       </p:ext>
     </p:extLst>
   </p:cSld>
   <p:clrMapOvr>
     <a:masterClrMapping/>
   </p:clrMapOvr>
-  <mc:AlternateContent xmlns:mc="http://schemas.openxmlformats.org/markup-compatibility/2006" xmlns:p14="http://schemas.microsoft.com/office/powerpoint/2010/main">
-    <mc:Choice Requires="p14">
+  <mc:AlternateContent xmlns:mc="http://schemas.openxmlformats.org/markup-compatibility/2006">
+    <mc:Choice xmlns:p14="http://schemas.microsoft.com/office/powerpoint/2010/main" xmlns="" Requires="p14">
       <p:transition spd="slow" p14:dur="2000" advClick="0" advTm="5000"/>
     </mc:Choice>
-    <mc:Fallback xmlns="">
+    <mc:Fallback>
       <p:transition spd="slow" advClick="0" advTm="5000"/>
     </mc:Fallback>
   </mc:AlternateContent>
   <p:extLst>
     <p:ext uri="{DCECCB84-F9BA-43D5-87BE-67443E8EF086}">
-      <p15:sldGuideLst xmlns:p15="http://schemas.microsoft.com/office/powerpoint/2012/main">
+      <p15:sldGuideLst xmlns:p15="http://schemas.microsoft.com/office/powerpoint/2012/main" xmlns="">
         <p15:guide id="1" orient="horz" pos="2160">
           <p15:clr>
             <a:srgbClr val="FBAE40"/>
@@ -3294,7 +3294,7 @@
           <p:cNvPr id="15" name="Slide Number">
             <a:extLst>
               <a:ext uri="{FF2B5EF4-FFF2-40B4-BE49-F238E27FC236}">
-                <a16:creationId xmlns:a16="http://schemas.microsoft.com/office/drawing/2014/main" id="{F888EE71-82B3-40F1-A63F-7417422FB4A4}"/>
+                <a16:creationId xmlns:a16="http://schemas.microsoft.com/office/drawing/2014/main" xmlns="" id="{F888EE71-82B3-40F1-A63F-7417422FB4A4}"/>
               </a:ext>
             </a:extLst>
           </p:cNvPr>
@@ -3336,7 +3336,7 @@
           <p:cNvPr id="14" name="Text Placeholder Body">
             <a:extLst>
               <a:ext uri="{FF2B5EF4-FFF2-40B4-BE49-F238E27FC236}">
-                <a16:creationId xmlns:a16="http://schemas.microsoft.com/office/drawing/2014/main" id="{A2ABE920-240F-4CF6-AD45-23ED489FAD6E}"/>
+                <a16:creationId xmlns:a16="http://schemas.microsoft.com/office/drawing/2014/main" xmlns="" id="{A2ABE920-240F-4CF6-AD45-23ED489FAD6E}"/>
               </a:ext>
             </a:extLst>
           </p:cNvPr>
@@ -3642,7 +3642,7 @@
           <p:cNvPr id="10" name="Rectangle Down">
             <a:extLst>
               <a:ext uri="{FF2B5EF4-FFF2-40B4-BE49-F238E27FC236}">
-                <a16:creationId xmlns:a16="http://schemas.microsoft.com/office/drawing/2014/main" id="{E9B994EC-35A8-4A11-98CB-25DC28852F94}"/>
+                <a16:creationId xmlns:a16="http://schemas.microsoft.com/office/drawing/2014/main" xmlns="" id="{E9B994EC-35A8-4A11-98CB-25DC28852F94}"/>
               </a:ext>
             </a:extLst>
           </p:cNvPr>
@@ -3723,7 +3723,7 @@
           <p:cNvPr id="11" name="Rectangle Top">
             <a:extLst>
               <a:ext uri="{FF2B5EF4-FFF2-40B4-BE49-F238E27FC236}">
-                <a16:creationId xmlns:a16="http://schemas.microsoft.com/office/drawing/2014/main" id="{274B8F05-DFCE-47BD-BAFD-DF93E1A63BDD}"/>
+                <a16:creationId xmlns:a16="http://schemas.microsoft.com/office/drawing/2014/main" xmlns="" id="{274B8F05-DFCE-47BD-BAFD-DF93E1A63BDD}"/>
               </a:ext>
             </a:extLst>
           </p:cNvPr>
@@ -3804,7 +3804,7 @@
           <p:cNvPr id="12" name="Logo Software University" descr="Software University logo">
             <a:extLst>
               <a:ext uri="{FF2B5EF4-FFF2-40B4-BE49-F238E27FC236}">
-                <a16:creationId xmlns:a16="http://schemas.microsoft.com/office/drawing/2014/main" id="{233CBB95-791E-4630-B3D9-FADFCE7BCF52}"/>
+                <a16:creationId xmlns:a16="http://schemas.microsoft.com/office/drawing/2014/main" xmlns="" id="{233CBB95-791E-4630-B3D9-FADFCE7BCF52}"/>
               </a:ext>
             </a:extLst>
           </p:cNvPr>
@@ -3817,7 +3817,7 @@
           <a:blip r:embed="rId2" cstate="print">
             <a:extLst>
               <a:ext uri="{28A0092B-C50C-407E-A947-70E740481C1C}">
-                <a14:useLocalDpi xmlns:a14="http://schemas.microsoft.com/office/drawing/2010/main" val="0"/>
+                <a14:useLocalDpi xmlns:a14="http://schemas.microsoft.com/office/drawing/2010/main" xmlns="" val="0"/>
               </a:ext>
             </a:extLst>
           </a:blip>
@@ -3840,7 +3840,7 @@
           <p:cNvPr id="13" name="Slide Title">
             <a:extLst>
               <a:ext uri="{FF2B5EF4-FFF2-40B4-BE49-F238E27FC236}">
-                <a16:creationId xmlns:a16="http://schemas.microsoft.com/office/drawing/2014/main" id="{3F218E34-55D7-4290-BFE4-80F31F941551}"/>
+                <a16:creationId xmlns:a16="http://schemas.microsoft.com/office/drawing/2014/main" xmlns="" id="{3F218E34-55D7-4290-BFE4-80F31F941551}"/>
               </a:ext>
             </a:extLst>
           </p:cNvPr>
@@ -3879,18 +3879,18 @@
     </p:spTree>
     <p:extLst>
       <p:ext uri="{BB962C8B-B14F-4D97-AF65-F5344CB8AC3E}">
-        <p14:creationId xmlns:p14="http://schemas.microsoft.com/office/powerpoint/2010/main" val="3774019400"/>
+        <p14:creationId xmlns:p14="http://schemas.microsoft.com/office/powerpoint/2010/main" xmlns="" val="3774019400"/>
       </p:ext>
     </p:extLst>
   </p:cSld>
   <p:clrMapOvr>
     <a:masterClrMapping/>
   </p:clrMapOvr>
-  <mc:AlternateContent xmlns:mc="http://schemas.openxmlformats.org/markup-compatibility/2006" xmlns:p14="http://schemas.microsoft.com/office/powerpoint/2010/main">
-    <mc:Choice Requires="p14">
+  <mc:AlternateContent xmlns:mc="http://schemas.openxmlformats.org/markup-compatibility/2006">
+    <mc:Choice xmlns:p14="http://schemas.microsoft.com/office/powerpoint/2010/main" xmlns="" Requires="p14">
       <p:transition spd="slow" p14:dur="2000" advClick="0" advTm="5000"/>
     </mc:Choice>
-    <mc:Fallback xmlns="">
+    <mc:Fallback>
       <p:transition spd="slow" advClick="0" advTm="5000"/>
     </mc:Fallback>
   </mc:AlternateContent>
@@ -3927,7 +3927,7 @@
           <p:cNvPr id="35" name="Rectangle Bottom">
             <a:extLst>
               <a:ext uri="{FF2B5EF4-FFF2-40B4-BE49-F238E27FC236}">
-                <a16:creationId xmlns:a16="http://schemas.microsoft.com/office/drawing/2014/main" id="{550A59F9-9A9D-4956-95B4-F78CC0DB1D59}"/>
+                <a16:creationId xmlns:a16="http://schemas.microsoft.com/office/drawing/2014/main" xmlns="" id="{550A59F9-9A9D-4956-95B4-F78CC0DB1D59}"/>
               </a:ext>
             </a:extLst>
           </p:cNvPr>
@@ -4008,7 +4008,7 @@
           <p:cNvPr id="53" name="Rectangle Bottom Copyright">
             <a:extLst>
               <a:ext uri="{FF2B5EF4-FFF2-40B4-BE49-F238E27FC236}">
-                <a16:creationId xmlns:a16="http://schemas.microsoft.com/office/drawing/2014/main" id="{B07FB7FB-DA6C-4F5D-B068-357F0FCE27D8}"/>
+                <a16:creationId xmlns:a16="http://schemas.microsoft.com/office/drawing/2014/main" xmlns="" id="{B07FB7FB-DA6C-4F5D-B068-357F0FCE27D8}"/>
               </a:ext>
             </a:extLst>
           </p:cNvPr>
@@ -4065,7 +4065,7 @@
                 <a:hlinkClick r:id="rId2">
                   <a:extLst>
                     <a:ext uri="{A12FA001-AC4F-418D-AE19-62706E023703}">
-                      <ahyp:hlinkClr xmlns:ahyp="http://schemas.microsoft.com/office/drawing/2018/hyperlinkcolor" val="tx"/>
+                      <ahyp:hlinkClr xmlns:ahyp="http://schemas.microsoft.com/office/drawing/2018/hyperlinkcolor" xmlns="" val="tx"/>
                     </a:ext>
                   </a:extLst>
                 </a:hlinkClick>
@@ -4101,7 +4101,7 @@
           <p:cNvPr id="26" name="Picture SoftUni Mascot" descr="SoftUni mascot with open hand">
             <a:extLst>
               <a:ext uri="{FF2B5EF4-FFF2-40B4-BE49-F238E27FC236}">
-                <a16:creationId xmlns:a16="http://schemas.microsoft.com/office/drawing/2014/main" id="{247CFF3C-C4FA-493D-8505-DF469F4D36A4}"/>
+                <a16:creationId xmlns:a16="http://schemas.microsoft.com/office/drawing/2014/main" xmlns="" id="{247CFF3C-C4FA-493D-8505-DF469F4D36A4}"/>
               </a:ext>
             </a:extLst>
           </p:cNvPr>
@@ -4114,7 +4114,7 @@
           <a:blip r:embed="rId3" cstate="print">
             <a:extLst>
               <a:ext uri="{28A0092B-C50C-407E-A947-70E740481C1C}">
-                <a14:useLocalDpi xmlns:a14="http://schemas.microsoft.com/office/drawing/2010/main" val="0"/>
+                <a14:useLocalDpi xmlns:a14="http://schemas.microsoft.com/office/drawing/2010/main" xmlns="" val="0"/>
               </a:ext>
             </a:extLst>
           </a:blip>
@@ -4137,7 +4137,7 @@
           <p:cNvPr id="2" name="Group SoftUni Brands">
             <a:extLst>
               <a:ext uri="{FF2B5EF4-FFF2-40B4-BE49-F238E27FC236}">
-                <a16:creationId xmlns:a16="http://schemas.microsoft.com/office/drawing/2014/main" id="{418FAE34-C1F8-46C7-A4AE-F270D1E70F25}"/>
+                <a16:creationId xmlns:a16="http://schemas.microsoft.com/office/drawing/2014/main" xmlns="" id="{418FAE34-C1F8-46C7-A4AE-F270D1E70F25}"/>
               </a:ext>
             </a:extLst>
           </p:cNvPr>
@@ -4157,7 +4157,7 @@
             <p:cNvPr id="24" name="Picture SoftUni Kids Logo" descr="SoftUni Kids logo">
               <a:extLst>
                 <a:ext uri="{FF2B5EF4-FFF2-40B4-BE49-F238E27FC236}">
-                  <a16:creationId xmlns:a16="http://schemas.microsoft.com/office/drawing/2014/main" id="{B0812936-74B6-4265-8C08-AEDC8C798702}"/>
+                  <a16:creationId xmlns:a16="http://schemas.microsoft.com/office/drawing/2014/main" xmlns="" id="{B0812936-74B6-4265-8C08-AEDC8C798702}"/>
                 </a:ext>
               </a:extLst>
             </p:cNvPr>
@@ -4170,7 +4170,7 @@
             <a:blip r:embed="rId4" cstate="print">
               <a:extLst>
                 <a:ext uri="{28A0092B-C50C-407E-A947-70E740481C1C}">
-                  <a14:useLocalDpi xmlns:a14="http://schemas.microsoft.com/office/drawing/2010/main" val="0"/>
+                  <a14:useLocalDpi xmlns:a14="http://schemas.microsoft.com/office/drawing/2010/main" xmlns="" val="0"/>
                 </a:ext>
               </a:extLst>
             </a:blip>
@@ -4193,7 +4193,7 @@
             <p:cNvPr id="23" name="Picture SoftUni Foundation Logo" descr="SoftUni Foundation logo">
               <a:extLst>
                 <a:ext uri="{FF2B5EF4-FFF2-40B4-BE49-F238E27FC236}">
-                  <a16:creationId xmlns:a16="http://schemas.microsoft.com/office/drawing/2014/main" id="{6643F71A-2013-433A-8322-FBAAED3162D8}"/>
+                  <a16:creationId xmlns:a16="http://schemas.microsoft.com/office/drawing/2014/main" xmlns="" id="{6643F71A-2013-433A-8322-FBAAED3162D8}"/>
                 </a:ext>
               </a:extLst>
             </p:cNvPr>
@@ -4206,7 +4206,7 @@
             <a:blip r:embed="rId5" cstate="print">
               <a:extLst>
                 <a:ext uri="{28A0092B-C50C-407E-A947-70E740481C1C}">
-                  <a14:useLocalDpi xmlns:a14="http://schemas.microsoft.com/office/drawing/2010/main" val="0"/>
+                  <a14:useLocalDpi xmlns:a14="http://schemas.microsoft.com/office/drawing/2010/main" xmlns="" val="0"/>
                 </a:ext>
               </a:extLst>
             </a:blip>
@@ -4229,7 +4229,7 @@
             <p:cNvPr id="22" name="Picture SoftUni Digital Logo" descr="SoftUni Digital logo">
               <a:extLst>
                 <a:ext uri="{FF2B5EF4-FFF2-40B4-BE49-F238E27FC236}">
-                  <a16:creationId xmlns:a16="http://schemas.microsoft.com/office/drawing/2014/main" id="{0A83D66F-855B-463B-920B-BF239B01A206}"/>
+                  <a16:creationId xmlns:a16="http://schemas.microsoft.com/office/drawing/2014/main" xmlns="" id="{0A83D66F-855B-463B-920B-BF239B01A206}"/>
                 </a:ext>
               </a:extLst>
             </p:cNvPr>
@@ -4242,7 +4242,7 @@
             <a:blip r:embed="rId6" cstate="print">
               <a:extLst>
                 <a:ext uri="{28A0092B-C50C-407E-A947-70E740481C1C}">
-                  <a14:useLocalDpi xmlns:a14="http://schemas.microsoft.com/office/drawing/2010/main" val="0"/>
+                  <a14:useLocalDpi xmlns:a14="http://schemas.microsoft.com/office/drawing/2010/main" xmlns="" val="0"/>
                 </a:ext>
               </a:extLst>
             </a:blip>
@@ -4265,7 +4265,7 @@
             <p:cNvPr id="21" name="Picture SoftUni Creative Logo" descr="SoftUni Creative logo">
               <a:extLst>
                 <a:ext uri="{FF2B5EF4-FFF2-40B4-BE49-F238E27FC236}">
-                  <a16:creationId xmlns:a16="http://schemas.microsoft.com/office/drawing/2014/main" id="{EA755AAE-BA08-481C-9224-0061170EE4B8}"/>
+                  <a16:creationId xmlns:a16="http://schemas.microsoft.com/office/drawing/2014/main" xmlns="" id="{EA755AAE-BA08-481C-9224-0061170EE4B8}"/>
                 </a:ext>
               </a:extLst>
             </p:cNvPr>
@@ -4278,7 +4278,7 @@
             <a:blip r:embed="rId7" cstate="print">
               <a:extLst>
                 <a:ext uri="{28A0092B-C50C-407E-A947-70E740481C1C}">
-                  <a14:useLocalDpi xmlns:a14="http://schemas.microsoft.com/office/drawing/2010/main" val="0"/>
+                  <a14:useLocalDpi xmlns:a14="http://schemas.microsoft.com/office/drawing/2010/main" xmlns="" val="0"/>
                 </a:ext>
               </a:extLst>
             </a:blip>
@@ -4301,7 +4301,7 @@
             <p:cNvPr id="20" name="Picture SoftUni Svetlina Logo" descr="SoftUni Svetlina logo">
               <a:extLst>
                 <a:ext uri="{FF2B5EF4-FFF2-40B4-BE49-F238E27FC236}">
-                  <a16:creationId xmlns:a16="http://schemas.microsoft.com/office/drawing/2014/main" id="{827D15FD-4C66-4B85-98E6-7826AA8F61C6}"/>
+                  <a16:creationId xmlns:a16="http://schemas.microsoft.com/office/drawing/2014/main" xmlns="" id="{827D15FD-4C66-4B85-98E6-7826AA8F61C6}"/>
                 </a:ext>
               </a:extLst>
             </p:cNvPr>
@@ -4314,7 +4314,7 @@
             <a:blip r:embed="rId8" cstate="print">
               <a:extLst>
                 <a:ext uri="{28A0092B-C50C-407E-A947-70E740481C1C}">
-                  <a14:useLocalDpi xmlns:a14="http://schemas.microsoft.com/office/drawing/2010/main" val="0"/>
+                  <a14:useLocalDpi xmlns:a14="http://schemas.microsoft.com/office/drawing/2010/main" xmlns="" val="0"/>
                 </a:ext>
               </a:extLst>
             </a:blip>
@@ -4337,7 +4337,7 @@
             <p:cNvPr id="25" name="Picture Software University Logo" descr="Software University logo">
               <a:extLst>
                 <a:ext uri="{FF2B5EF4-FFF2-40B4-BE49-F238E27FC236}">
-                  <a16:creationId xmlns:a16="http://schemas.microsoft.com/office/drawing/2014/main" id="{C74C190C-5856-41B9-8819-AE8DE0E10980}"/>
+                  <a16:creationId xmlns:a16="http://schemas.microsoft.com/office/drawing/2014/main" xmlns="" id="{C74C190C-5856-41B9-8819-AE8DE0E10980}"/>
                 </a:ext>
               </a:extLst>
             </p:cNvPr>
@@ -4350,7 +4350,7 @@
             <a:blip r:embed="rId9" cstate="print">
               <a:extLst>
                 <a:ext uri="{28A0092B-C50C-407E-A947-70E740481C1C}">
-                  <a14:useLocalDpi xmlns:a14="http://schemas.microsoft.com/office/drawing/2010/main" val="0"/>
+                  <a14:useLocalDpi xmlns:a14="http://schemas.microsoft.com/office/drawing/2010/main" xmlns="" val="0"/>
                 </a:ext>
               </a:extLst>
             </a:blip>
@@ -4373,7 +4373,7 @@
             <p:cNvPr id="33" name="Straight Connector 6">
               <a:extLst>
                 <a:ext uri="{FF2B5EF4-FFF2-40B4-BE49-F238E27FC236}">
-                  <a16:creationId xmlns:a16="http://schemas.microsoft.com/office/drawing/2014/main" id="{5C63D1E8-4A92-4691-8A24-A2FC7E8008E5}"/>
+                  <a16:creationId xmlns:a16="http://schemas.microsoft.com/office/drawing/2014/main" xmlns="" id="{5C63D1E8-4A92-4691-8A24-A2FC7E8008E5}"/>
                 </a:ext>
               </a:extLst>
             </p:cNvPr>
@@ -4412,7 +4412,7 @@
             <p:cNvPr id="32" name="Straight Connector 5">
               <a:extLst>
                 <a:ext uri="{FF2B5EF4-FFF2-40B4-BE49-F238E27FC236}">
-                  <a16:creationId xmlns:a16="http://schemas.microsoft.com/office/drawing/2014/main" id="{6E91D320-3732-40B8-864D-142D0A277ED1}"/>
+                  <a16:creationId xmlns:a16="http://schemas.microsoft.com/office/drawing/2014/main" xmlns="" id="{6E91D320-3732-40B8-864D-142D0A277ED1}"/>
                 </a:ext>
               </a:extLst>
             </p:cNvPr>
@@ -4451,7 +4451,7 @@
             <p:cNvPr id="31" name="Straight Connector 4">
               <a:extLst>
                 <a:ext uri="{FF2B5EF4-FFF2-40B4-BE49-F238E27FC236}">
-                  <a16:creationId xmlns:a16="http://schemas.microsoft.com/office/drawing/2014/main" id="{299ABE09-E33C-46B7-A80D-7BF4A6956211}"/>
+                  <a16:creationId xmlns:a16="http://schemas.microsoft.com/office/drawing/2014/main" xmlns="" id="{299ABE09-E33C-46B7-A80D-7BF4A6956211}"/>
                 </a:ext>
               </a:extLst>
             </p:cNvPr>
@@ -4488,7 +4488,7 @@
             <p:cNvPr id="30" name="Straight Connector 3">
               <a:extLst>
                 <a:ext uri="{FF2B5EF4-FFF2-40B4-BE49-F238E27FC236}">
-                  <a16:creationId xmlns:a16="http://schemas.microsoft.com/office/drawing/2014/main" id="{93DDBF37-0764-47AA-94E3-9A44F3ED8FB5}"/>
+                  <a16:creationId xmlns:a16="http://schemas.microsoft.com/office/drawing/2014/main" xmlns="" id="{93DDBF37-0764-47AA-94E3-9A44F3ED8FB5}"/>
                 </a:ext>
               </a:extLst>
             </p:cNvPr>
@@ -4525,7 +4525,7 @@
             <p:cNvPr id="29" name="Straight Connector 2">
               <a:extLst>
                 <a:ext uri="{FF2B5EF4-FFF2-40B4-BE49-F238E27FC236}">
-                  <a16:creationId xmlns:a16="http://schemas.microsoft.com/office/drawing/2014/main" id="{72BFE2F3-0845-4E5B-9375-E9D4027DD675}"/>
+                  <a16:creationId xmlns:a16="http://schemas.microsoft.com/office/drawing/2014/main" xmlns="" id="{72BFE2F3-0845-4E5B-9375-E9D4027DD675}"/>
                 </a:ext>
               </a:extLst>
             </p:cNvPr>
@@ -4562,7 +4562,7 @@
             <p:cNvPr id="28" name="Straight Connector 1">
               <a:extLst>
                 <a:ext uri="{FF2B5EF4-FFF2-40B4-BE49-F238E27FC236}">
-                  <a16:creationId xmlns:a16="http://schemas.microsoft.com/office/drawing/2014/main" id="{D4E5982E-3110-47E1-A5BB-91B7BECC3093}"/>
+                  <a16:creationId xmlns:a16="http://schemas.microsoft.com/office/drawing/2014/main" xmlns="" id="{D4E5982E-3110-47E1-A5BB-91B7BECC3093}"/>
                 </a:ext>
               </a:extLst>
             </p:cNvPr>
@@ -4599,7 +4599,7 @@
             <p:cNvPr id="27" name="Straight Connector Horizontal">
               <a:extLst>
                 <a:ext uri="{FF2B5EF4-FFF2-40B4-BE49-F238E27FC236}">
-                  <a16:creationId xmlns:a16="http://schemas.microsoft.com/office/drawing/2014/main" id="{5F62FB7C-BD6E-4383-98C1-2CF30F34CAFD}"/>
+                  <a16:creationId xmlns:a16="http://schemas.microsoft.com/office/drawing/2014/main" xmlns="" id="{5F62FB7C-BD6E-4383-98C1-2CF30F34CAFD}"/>
                 </a:ext>
               </a:extLst>
             </p:cNvPr>
@@ -4638,7 +4638,7 @@
             <p:cNvPr id="34" name="Straight Connector 0">
               <a:extLst>
                 <a:ext uri="{FF2B5EF4-FFF2-40B4-BE49-F238E27FC236}">
-                  <a16:creationId xmlns:a16="http://schemas.microsoft.com/office/drawing/2014/main" id="{C84A0FE1-723D-4682-8682-77BAD950EE15}"/>
+                  <a16:creationId xmlns:a16="http://schemas.microsoft.com/office/drawing/2014/main" xmlns="" id="{C84A0FE1-723D-4682-8682-77BAD950EE15}"/>
                 </a:ext>
               </a:extLst>
             </p:cNvPr>
@@ -4675,7 +4675,7 @@
             <p:cNvPr id="18" name="Picture SoftUni Logo" descr="SoftUni logo">
               <a:extLst>
                 <a:ext uri="{FF2B5EF4-FFF2-40B4-BE49-F238E27FC236}">
-                  <a16:creationId xmlns:a16="http://schemas.microsoft.com/office/drawing/2014/main" id="{A0675455-B7FA-4569-A5FD-A3B0F20B2A26}"/>
+                  <a16:creationId xmlns:a16="http://schemas.microsoft.com/office/drawing/2014/main" xmlns="" id="{A0675455-B7FA-4569-A5FD-A3B0F20B2A26}"/>
                 </a:ext>
               </a:extLst>
             </p:cNvPr>
@@ -4688,7 +4688,7 @@
             <a:blip r:embed="rId10" cstate="print">
               <a:extLst>
                 <a:ext uri="{28A0092B-C50C-407E-A947-70E740481C1C}">
-                  <a14:useLocalDpi xmlns:a14="http://schemas.microsoft.com/office/drawing/2010/main" val="0"/>
+                  <a14:useLocalDpi xmlns:a14="http://schemas.microsoft.com/office/drawing/2010/main" xmlns="" val="0"/>
                 </a:ext>
               </a:extLst>
             </a:blip>
@@ -4712,7 +4712,7 @@
           <p:cNvPr id="19" name="Slide Title">
             <a:extLst>
               <a:ext uri="{FF2B5EF4-FFF2-40B4-BE49-F238E27FC236}">
-                <a16:creationId xmlns:a16="http://schemas.microsoft.com/office/drawing/2014/main" id="{7CFDBB16-985C-4CC7-B6DB-B81B36037922}"/>
+                <a16:creationId xmlns:a16="http://schemas.microsoft.com/office/drawing/2014/main" xmlns="" id="{7CFDBB16-985C-4CC7-B6DB-B81B36037922}"/>
               </a:ext>
             </a:extLst>
           </p:cNvPr>
@@ -4815,7 +4815,7 @@
           <p:cNvPr id="36" name="Logo Software University" descr="Software University logo">
             <a:extLst>
               <a:ext uri="{FF2B5EF4-FFF2-40B4-BE49-F238E27FC236}">
-                <a16:creationId xmlns:a16="http://schemas.microsoft.com/office/drawing/2014/main" id="{67FC4D2E-913D-432A-B658-F0D82839FA5E}"/>
+                <a16:creationId xmlns:a16="http://schemas.microsoft.com/office/drawing/2014/main" xmlns="" id="{67FC4D2E-913D-432A-B658-F0D82839FA5E}"/>
               </a:ext>
             </a:extLst>
           </p:cNvPr>
@@ -4838,7 +4838,7 @@
             </a:clrChange>
             <a:extLst>
               <a:ext uri="{28A0092B-C50C-407E-A947-70E740481C1C}">
-                <a14:useLocalDpi xmlns:a14="http://schemas.microsoft.com/office/drawing/2010/main" val="0"/>
+                <a14:useLocalDpi xmlns:a14="http://schemas.microsoft.com/office/drawing/2010/main" xmlns="" val="0"/>
               </a:ext>
             </a:extLst>
           </a:blip>
@@ -4859,24 +4859,24 @@
     </p:spTree>
     <p:extLst>
       <p:ext uri="{BB962C8B-B14F-4D97-AF65-F5344CB8AC3E}">
-        <p14:creationId xmlns:p14="http://schemas.microsoft.com/office/powerpoint/2010/main" val="4192061223"/>
+        <p14:creationId xmlns:p14="http://schemas.microsoft.com/office/powerpoint/2010/main" xmlns="" val="4192061223"/>
       </p:ext>
     </p:extLst>
   </p:cSld>
   <p:clrMapOvr>
     <a:masterClrMapping/>
   </p:clrMapOvr>
-  <mc:AlternateContent xmlns:mc="http://schemas.openxmlformats.org/markup-compatibility/2006" xmlns:p14="http://schemas.microsoft.com/office/powerpoint/2010/main">
-    <mc:Choice Requires="p14">
+  <mc:AlternateContent xmlns:mc="http://schemas.openxmlformats.org/markup-compatibility/2006">
+    <mc:Choice xmlns:p14="http://schemas.microsoft.com/office/powerpoint/2010/main" xmlns="" Requires="p14">
       <p:transition spd="slow" p14:dur="2000" advClick="0" advTm="5000"/>
     </mc:Choice>
-    <mc:Fallback xmlns="">
+    <mc:Fallback>
       <p:transition spd="slow" advClick="0" advTm="5000"/>
     </mc:Fallback>
   </mc:AlternateContent>
   <p:extLst>
     <p:ext uri="{DCECCB84-F9BA-43D5-87BE-67443E8EF086}">
-      <p15:sldGuideLst xmlns:p15="http://schemas.microsoft.com/office/powerpoint/2012/main">
+      <p15:sldGuideLst xmlns:p15="http://schemas.microsoft.com/office/powerpoint/2012/main" xmlns="">
         <p15:guide id="1" orient="horz" pos="2160">
           <p15:clr>
             <a:srgbClr val="FBAE40"/>
@@ -4915,7 +4915,7 @@
           <p:cNvPr id="13" name="Slide Number">
             <a:extLst>
               <a:ext uri="{FF2B5EF4-FFF2-40B4-BE49-F238E27FC236}">
-                <a16:creationId xmlns:a16="http://schemas.microsoft.com/office/drawing/2014/main" id="{5B8761D8-B42F-4A70-A0CE-682CEB2AE31B}"/>
+                <a16:creationId xmlns:a16="http://schemas.microsoft.com/office/drawing/2014/main" xmlns="" id="{5B8761D8-B42F-4A70-A0CE-682CEB2AE31B}"/>
               </a:ext>
             </a:extLst>
           </p:cNvPr>
@@ -4958,7 +4958,7 @@
             <a:hlinkClick r:id="rId2" tooltip="Software University Discussion Forum"/>
             <a:extLst>
               <a:ext uri="{FF2B5EF4-FFF2-40B4-BE49-F238E27FC236}">
-                <a16:creationId xmlns:a16="http://schemas.microsoft.com/office/drawing/2014/main" id="{98C579AD-FAF5-4B28-9B52-5457F1E90061}"/>
+                <a16:creationId xmlns:a16="http://schemas.microsoft.com/office/drawing/2014/main" xmlns="" id="{98C579AD-FAF5-4B28-9B52-5457F1E90061}"/>
               </a:ext>
             </a:extLst>
           </p:cNvPr>
@@ -4971,7 +4971,7 @@
           <a:blip r:embed="rId3" cstate="print">
             <a:extLst>
               <a:ext uri="{28A0092B-C50C-407E-A947-70E740481C1C}">
-                <a14:useLocalDpi xmlns:a14="http://schemas.microsoft.com/office/drawing/2010/main"/>
+                <a14:useLocalDpi xmlns:a14="http://schemas.microsoft.com/office/drawing/2010/main" xmlns=""/>
               </a:ext>
             </a:extLst>
           </a:blip>
@@ -4995,7 +4995,7 @@
             <a:hlinkClick r:id="rId4" tooltip="Software University @ Facebook"/>
             <a:extLst>
               <a:ext uri="{FF2B5EF4-FFF2-40B4-BE49-F238E27FC236}">
-                <a16:creationId xmlns:a16="http://schemas.microsoft.com/office/drawing/2014/main" id="{6B2C510E-5EF2-49F6-B926-2BD74CD3C7F8}"/>
+                <a16:creationId xmlns:a16="http://schemas.microsoft.com/office/drawing/2014/main" xmlns="" id="{6B2C510E-5EF2-49F6-B926-2BD74CD3C7F8}"/>
               </a:ext>
             </a:extLst>
           </p:cNvPr>
@@ -5008,7 +5008,7 @@
           <a:blip r:embed="rId5" cstate="print">
             <a:extLst>
               <a:ext uri="{28A0092B-C50C-407E-A947-70E740481C1C}">
-                <a14:useLocalDpi xmlns:a14="http://schemas.microsoft.com/office/drawing/2010/main"/>
+                <a14:useLocalDpi xmlns:a14="http://schemas.microsoft.com/office/drawing/2010/main" xmlns=""/>
               </a:ext>
             </a:extLst>
           </a:blip>
@@ -5026,7 +5026,7 @@
           <a:noFill/>
           <a:extLst>
             <a:ext uri="{909E8E84-426E-40DD-AFC4-6F175D3DCCD1}">
-              <a14:hiddenFill xmlns:a14="http://schemas.microsoft.com/office/drawing/2010/main">
+              <a14:hiddenFill xmlns:a14="http://schemas.microsoft.com/office/drawing/2010/main" xmlns="">
                 <a:solidFill>
                   <a:srgbClr val="FFFFFF"/>
                 </a:solidFill>
@@ -5041,7 +5041,7 @@
             <a:hlinkClick r:id="rId6"/>
             <a:extLst>
               <a:ext uri="{FF2B5EF4-FFF2-40B4-BE49-F238E27FC236}">
-                <a16:creationId xmlns:a16="http://schemas.microsoft.com/office/drawing/2014/main" id="{F4604840-E810-44B7-9FF1-3B28CD68B758}"/>
+                <a16:creationId xmlns:a16="http://schemas.microsoft.com/office/drawing/2014/main" xmlns="" id="{F4604840-E810-44B7-9FF1-3B28CD68B758}"/>
               </a:ext>
             </a:extLst>
           </p:cNvPr>
@@ -5054,7 +5054,7 @@
           <a:blip r:embed="rId7" cstate="print">
             <a:extLst>
               <a:ext uri="{28A0092B-C50C-407E-A947-70E740481C1C}">
-                <a14:useLocalDpi xmlns:a14="http://schemas.microsoft.com/office/drawing/2010/main" val="0"/>
+                <a14:useLocalDpi xmlns:a14="http://schemas.microsoft.com/office/drawing/2010/main" xmlns="" val="0"/>
               </a:ext>
             </a:extLst>
           </a:blip>
@@ -5078,7 +5078,7 @@
             <a:hlinkClick r:id="rId8"/>
             <a:extLst>
               <a:ext uri="{FF2B5EF4-FFF2-40B4-BE49-F238E27FC236}">
-                <a16:creationId xmlns:a16="http://schemas.microsoft.com/office/drawing/2014/main" id="{07C965FA-A87E-4824-AFA8-C67AF548A76A}"/>
+                <a16:creationId xmlns:a16="http://schemas.microsoft.com/office/drawing/2014/main" xmlns="" id="{07C965FA-A87E-4824-AFA8-C67AF548A76A}"/>
               </a:ext>
             </a:extLst>
           </p:cNvPr>
@@ -5091,7 +5091,7 @@
           <a:blip r:embed="rId9" cstate="print">
             <a:extLst>
               <a:ext uri="{28A0092B-C50C-407E-A947-70E740481C1C}">
-                <a14:useLocalDpi xmlns:a14="http://schemas.microsoft.com/office/drawing/2010/main" val="0"/>
+                <a14:useLocalDpi xmlns:a14="http://schemas.microsoft.com/office/drawing/2010/main" xmlns="" val="0"/>
               </a:ext>
             </a:extLst>
           </a:blip>
@@ -5113,7 +5113,7 @@
           <p:cNvPr id="12" name="Slide Body Text">
             <a:extLst>
               <a:ext uri="{FF2B5EF4-FFF2-40B4-BE49-F238E27FC236}">
-                <a16:creationId xmlns:a16="http://schemas.microsoft.com/office/drawing/2014/main" id="{0C1F9416-8B6E-46DE-973C-777785E27A26}"/>
+                <a16:creationId xmlns:a16="http://schemas.microsoft.com/office/drawing/2014/main" xmlns="" id="{0C1F9416-8B6E-46DE-973C-777785E27A26}"/>
               </a:ext>
             </a:extLst>
           </p:cNvPr>
@@ -5238,7 +5238,7 @@
           <p:cNvPr id="10" name="Rectangle Top">
             <a:extLst>
               <a:ext uri="{FF2B5EF4-FFF2-40B4-BE49-F238E27FC236}">
-                <a16:creationId xmlns:a16="http://schemas.microsoft.com/office/drawing/2014/main" id="{86646B95-5E3B-4DE8-9118-031C2C296D8C}"/>
+                <a16:creationId xmlns:a16="http://schemas.microsoft.com/office/drawing/2014/main" xmlns="" id="{86646B95-5E3B-4DE8-9118-031C2C296D8C}"/>
               </a:ext>
             </a:extLst>
           </p:cNvPr>
@@ -5319,7 +5319,7 @@
           <p:cNvPr id="11" name="Logo Software University" descr="Software University logo">
             <a:extLst>
               <a:ext uri="{FF2B5EF4-FFF2-40B4-BE49-F238E27FC236}">
-                <a16:creationId xmlns:a16="http://schemas.microsoft.com/office/drawing/2014/main" id="{58AB1944-B146-4E89-B2D9-426EB610F319}"/>
+                <a16:creationId xmlns:a16="http://schemas.microsoft.com/office/drawing/2014/main" xmlns="" id="{58AB1944-B146-4E89-B2D9-426EB610F319}"/>
               </a:ext>
             </a:extLst>
           </p:cNvPr>
@@ -5332,7 +5332,7 @@
           <a:blip r:embed="rId11" cstate="print">
             <a:extLst>
               <a:ext uri="{28A0092B-C50C-407E-A947-70E740481C1C}">
-                <a14:useLocalDpi xmlns:a14="http://schemas.microsoft.com/office/drawing/2010/main" val="0"/>
+                <a14:useLocalDpi xmlns:a14="http://schemas.microsoft.com/office/drawing/2010/main" xmlns="" val="0"/>
               </a:ext>
             </a:extLst>
           </a:blip>
@@ -5355,7 +5355,7 @@
           <p:cNvPr id="18" name="Slide Title">
             <a:extLst>
               <a:ext uri="{FF2B5EF4-FFF2-40B4-BE49-F238E27FC236}">
-                <a16:creationId xmlns:a16="http://schemas.microsoft.com/office/drawing/2014/main" id="{AE87ED9C-76E1-4D85-9B06-3AF44AABB668}"/>
+                <a16:creationId xmlns:a16="http://schemas.microsoft.com/office/drawing/2014/main" xmlns="" id="{AE87ED9C-76E1-4D85-9B06-3AF44AABB668}"/>
               </a:ext>
             </a:extLst>
           </p:cNvPr>
@@ -5394,18 +5394,18 @@
     </p:spTree>
     <p:extLst>
       <p:ext uri="{BB962C8B-B14F-4D97-AF65-F5344CB8AC3E}">
-        <p14:creationId xmlns:p14="http://schemas.microsoft.com/office/powerpoint/2010/main" val="2196466322"/>
+        <p14:creationId xmlns:p14="http://schemas.microsoft.com/office/powerpoint/2010/main" xmlns="" val="2196466322"/>
       </p:ext>
     </p:extLst>
   </p:cSld>
   <p:clrMapOvr>
     <a:masterClrMapping/>
   </p:clrMapOvr>
-  <mc:AlternateContent xmlns:mc="http://schemas.openxmlformats.org/markup-compatibility/2006" xmlns:p14="http://schemas.microsoft.com/office/powerpoint/2010/main">
-    <mc:Choice Requires="p14">
+  <mc:AlternateContent xmlns:mc="http://schemas.openxmlformats.org/markup-compatibility/2006">
+    <mc:Choice xmlns:p14="http://schemas.microsoft.com/office/powerpoint/2010/main" xmlns="" Requires="p14">
       <p:transition spd="slow" p14:dur="2000" advClick="0" advTm="5000"/>
     </mc:Choice>
-    <mc:Fallback xmlns="">
+    <mc:Fallback>
       <p:transition spd="slow" advClick="0" advTm="5000"/>
     </mc:Fallback>
   </mc:AlternateContent>
@@ -5434,7 +5434,7 @@
           <p:cNvPr id="9" name="Oval Center Icon">
             <a:extLst>
               <a:ext uri="{FF2B5EF4-FFF2-40B4-BE49-F238E27FC236}">
-                <a16:creationId xmlns:a16="http://schemas.microsoft.com/office/drawing/2014/main" id="{13B9A8FE-2718-4F2C-98D4-CBF86AD69D58}"/>
+                <a16:creationId xmlns:a16="http://schemas.microsoft.com/office/drawing/2014/main" xmlns="" id="{13B9A8FE-2718-4F2C-98D4-CBF86AD69D58}"/>
               </a:ext>
             </a:extLst>
           </p:cNvPr>
@@ -5515,7 +5515,7 @@
           <p:cNvPr id="8" name="Slide Subtitle">
             <a:extLst>
               <a:ext uri="{FF2B5EF4-FFF2-40B4-BE49-F238E27FC236}">
-                <a16:creationId xmlns:a16="http://schemas.microsoft.com/office/drawing/2014/main" id="{588387B4-E99E-4145-9D1D-F17CA5190DFD}"/>
+                <a16:creationId xmlns:a16="http://schemas.microsoft.com/office/drawing/2014/main" xmlns="" id="{588387B4-E99E-4145-9D1D-F17CA5190DFD}"/>
               </a:ext>
             </a:extLst>
           </p:cNvPr>
@@ -5565,7 +5565,7 @@
           <p:cNvPr id="13" name="Slide Title">
             <a:extLst>
               <a:ext uri="{FF2B5EF4-FFF2-40B4-BE49-F238E27FC236}">
-                <a16:creationId xmlns:a16="http://schemas.microsoft.com/office/drawing/2014/main" id="{8A28C56F-AE84-49D0-9AD1-1F0CEEABF710}"/>
+                <a16:creationId xmlns:a16="http://schemas.microsoft.com/office/drawing/2014/main" xmlns="" id="{8A28C56F-AE84-49D0-9AD1-1F0CEEABF710}"/>
               </a:ext>
             </a:extLst>
           </p:cNvPr>
@@ -5610,18 +5610,18 @@
     </p:spTree>
     <p:extLst>
       <p:ext uri="{BB962C8B-B14F-4D97-AF65-F5344CB8AC3E}">
-        <p14:creationId xmlns:p14="http://schemas.microsoft.com/office/powerpoint/2010/main" val="475389923"/>
+        <p14:creationId xmlns:p14="http://schemas.microsoft.com/office/powerpoint/2010/main" xmlns="" val="475389923"/>
       </p:ext>
     </p:extLst>
   </p:cSld>
   <p:clrMapOvr>
     <a:masterClrMapping/>
   </p:clrMapOvr>
-  <mc:AlternateContent xmlns:mc="http://schemas.openxmlformats.org/markup-compatibility/2006" xmlns:p14="http://schemas.microsoft.com/office/powerpoint/2010/main">
-    <mc:Choice Requires="p14">
+  <mc:AlternateContent xmlns:mc="http://schemas.openxmlformats.org/markup-compatibility/2006">
+    <mc:Choice xmlns:p14="http://schemas.microsoft.com/office/powerpoint/2010/main" xmlns="" Requires="p14">
       <p:transition spd="slow" p14:dur="2000" advClick="0" advTm="5000"/>
     </mc:Choice>
-    <mc:Fallback xmlns="">
+    <mc:Fallback>
       <p:transition spd="slow" advClick="0" advTm="5000"/>
     </mc:Fallback>
   </mc:AlternateContent>
@@ -5651,7 +5651,7 @@
           <p:cNvPr id="2" name="Title 1">
             <a:extLst>
               <a:ext uri="{FF2B5EF4-FFF2-40B4-BE49-F238E27FC236}">
-                <a16:creationId xmlns:a16="http://schemas.microsoft.com/office/drawing/2014/main" id="{5213C145-EA12-94EF-AA17-5F628EA0AD2D}"/>
+                <a16:creationId xmlns:a16="http://schemas.microsoft.com/office/drawing/2014/main" xmlns="" id="{5213C145-EA12-94EF-AA17-5F628EA0AD2D}"/>
               </a:ext>
             </a:extLst>
           </p:cNvPr>
@@ -5689,7 +5689,7 @@
           <p:cNvPr id="3" name="Subtitle 2">
             <a:extLst>
               <a:ext uri="{FF2B5EF4-FFF2-40B4-BE49-F238E27FC236}">
-                <a16:creationId xmlns:a16="http://schemas.microsoft.com/office/drawing/2014/main" id="{5F55E72E-5B45-B6EE-75AE-03B188AD9A08}"/>
+                <a16:creationId xmlns:a16="http://schemas.microsoft.com/office/drawing/2014/main" xmlns="" id="{5F55E72E-5B45-B6EE-75AE-03B188AD9A08}"/>
               </a:ext>
             </a:extLst>
           </p:cNvPr>
@@ -5760,7 +5760,7 @@
           <p:cNvPr id="4" name="Date Placeholder 3">
             <a:extLst>
               <a:ext uri="{FF2B5EF4-FFF2-40B4-BE49-F238E27FC236}">
-                <a16:creationId xmlns:a16="http://schemas.microsoft.com/office/drawing/2014/main" id="{30C6A8EA-0240-01AB-A7C2-BD1CD885E1C1}"/>
+                <a16:creationId xmlns:a16="http://schemas.microsoft.com/office/drawing/2014/main" xmlns="" id="{30C6A8EA-0240-01AB-A7C2-BD1CD885E1C1}"/>
               </a:ext>
             </a:extLst>
           </p:cNvPr>
@@ -5779,7 +5779,7 @@
             <a:fld id="{1CF2F75B-1C4E-1E47-AE31-5B79E79ADF4F}" type="datetimeFigureOut">
               <a:rPr lang="x-none" smtClean="0"/>
               <a:pPr/>
-              <a:t>7.09.23</a:t>
+              <a:t>7.9.2023 г.</a:t>
             </a:fld>
             <a:endParaRPr lang="x-none"/>
           </a:p>
@@ -5790,7 +5790,7 @@
           <p:cNvPr id="5" name="Footer Placeholder 4">
             <a:extLst>
               <a:ext uri="{FF2B5EF4-FFF2-40B4-BE49-F238E27FC236}">
-                <a16:creationId xmlns:a16="http://schemas.microsoft.com/office/drawing/2014/main" id="{F95CBF96-4249-1541-E44E-FBCECA233B3C}"/>
+                <a16:creationId xmlns:a16="http://schemas.microsoft.com/office/drawing/2014/main" xmlns="" id="{F95CBF96-4249-1541-E44E-FBCECA233B3C}"/>
               </a:ext>
             </a:extLst>
           </p:cNvPr>
@@ -5815,7 +5815,7 @@
           <p:cNvPr id="6" name="Slide Number Placeholder 5">
             <a:extLst>
               <a:ext uri="{FF2B5EF4-FFF2-40B4-BE49-F238E27FC236}">
-                <a16:creationId xmlns:a16="http://schemas.microsoft.com/office/drawing/2014/main" id="{7ACB54F2-814F-F79B-8CD7-FA3133365CBC}"/>
+                <a16:creationId xmlns:a16="http://schemas.microsoft.com/office/drawing/2014/main" xmlns="" id="{7ACB54F2-814F-F79B-8CD7-FA3133365CBC}"/>
               </a:ext>
             </a:extLst>
           </p:cNvPr>
@@ -5843,7 +5843,7 @@
     </p:spTree>
     <p:extLst>
       <p:ext uri="{BB962C8B-B14F-4D97-AF65-F5344CB8AC3E}">
-        <p14:creationId xmlns:p14="http://schemas.microsoft.com/office/powerpoint/2010/main" val="2773863354"/>
+        <p14:creationId xmlns:p14="http://schemas.microsoft.com/office/powerpoint/2010/main" xmlns="" val="2773863354"/>
       </p:ext>
     </p:extLst>
   </p:cSld>
@@ -5875,7 +5875,7 @@
           <p:cNvPr id="8" name="Rectangle Top">
             <a:extLst>
               <a:ext uri="{FF2B5EF4-FFF2-40B4-BE49-F238E27FC236}">
-                <a16:creationId xmlns:a16="http://schemas.microsoft.com/office/drawing/2014/main" id="{454BD9C2-93A6-4860-A758-846ED0E1C8FA}"/>
+                <a16:creationId xmlns:a16="http://schemas.microsoft.com/office/drawing/2014/main" xmlns="" id="{454BD9C2-93A6-4860-A758-846ED0E1C8FA}"/>
               </a:ext>
             </a:extLst>
           </p:cNvPr>
@@ -5956,7 +5956,7 @@
           <p:cNvPr id="7" name="Slide Number">
             <a:extLst>
               <a:ext uri="{FF2B5EF4-FFF2-40B4-BE49-F238E27FC236}">
-                <a16:creationId xmlns:a16="http://schemas.microsoft.com/office/drawing/2014/main" id="{C1780DB1-0AF0-4108-AFE1-9DA99F0DBCB8}"/>
+                <a16:creationId xmlns:a16="http://schemas.microsoft.com/office/drawing/2014/main" xmlns="" id="{C1780DB1-0AF0-4108-AFE1-9DA99F0DBCB8}"/>
               </a:ext>
             </a:extLst>
           </p:cNvPr>
@@ -5998,7 +5998,7 @@
           <p:cNvPr id="3" name="Slide Body Text">
             <a:extLst>
               <a:ext uri="{FF2B5EF4-FFF2-40B4-BE49-F238E27FC236}">
-                <a16:creationId xmlns:a16="http://schemas.microsoft.com/office/drawing/2014/main" id="{5A9D2960-6D42-439F-82E8-812822013A10}"/>
+                <a16:creationId xmlns:a16="http://schemas.microsoft.com/office/drawing/2014/main" xmlns="" id="{5A9D2960-6D42-439F-82E8-812822013A10}"/>
               </a:ext>
             </a:extLst>
           </p:cNvPr>
@@ -6076,7 +6076,7 @@
           <p:cNvPr id="13" name="Rectangle Top">
             <a:extLst>
               <a:ext uri="{FF2B5EF4-FFF2-40B4-BE49-F238E27FC236}">
-                <a16:creationId xmlns:a16="http://schemas.microsoft.com/office/drawing/2014/main" id="{391AFA4E-7870-4561-A1B8-AC956B0C8931}"/>
+                <a16:creationId xmlns:a16="http://schemas.microsoft.com/office/drawing/2014/main" xmlns="" id="{391AFA4E-7870-4561-A1B8-AC956B0C8931}"/>
               </a:ext>
             </a:extLst>
           </p:cNvPr>
@@ -6157,7 +6157,7 @@
           <p:cNvPr id="12" name="Logo Software University" descr="Software University logo">
             <a:extLst>
               <a:ext uri="{FF2B5EF4-FFF2-40B4-BE49-F238E27FC236}">
-                <a16:creationId xmlns:a16="http://schemas.microsoft.com/office/drawing/2014/main" id="{B1D3B425-B9BF-43ED-9DEC-C05002FBA22F}"/>
+                <a16:creationId xmlns:a16="http://schemas.microsoft.com/office/drawing/2014/main" xmlns="" id="{B1D3B425-B9BF-43ED-9DEC-C05002FBA22F}"/>
               </a:ext>
             </a:extLst>
           </p:cNvPr>
@@ -6170,7 +6170,7 @@
           <a:blip r:embed="rId2" cstate="print">
             <a:extLst>
               <a:ext uri="{28A0092B-C50C-407E-A947-70E740481C1C}">
-                <a14:useLocalDpi xmlns:a14="http://schemas.microsoft.com/office/drawing/2010/main" val="0"/>
+                <a14:useLocalDpi xmlns:a14="http://schemas.microsoft.com/office/drawing/2010/main" xmlns="" val="0"/>
               </a:ext>
             </a:extLst>
           </a:blip>
@@ -6193,7 +6193,7 @@
           <p:cNvPr id="6" name="Slide Title">
             <a:extLst>
               <a:ext uri="{FF2B5EF4-FFF2-40B4-BE49-F238E27FC236}">
-                <a16:creationId xmlns:a16="http://schemas.microsoft.com/office/drawing/2014/main" id="{19B5B676-7892-440F-8191-7109B2C59885}"/>
+                <a16:creationId xmlns:a16="http://schemas.microsoft.com/office/drawing/2014/main" xmlns="" id="{19B5B676-7892-440F-8191-7109B2C59885}"/>
               </a:ext>
             </a:extLst>
           </p:cNvPr>
@@ -6232,18 +6232,18 @@
     </p:spTree>
     <p:extLst>
       <p:ext uri="{BB962C8B-B14F-4D97-AF65-F5344CB8AC3E}">
-        <p14:creationId xmlns:p14="http://schemas.microsoft.com/office/powerpoint/2010/main" val="2685365194"/>
+        <p14:creationId xmlns:p14="http://schemas.microsoft.com/office/powerpoint/2010/main" xmlns="" val="2685365194"/>
       </p:ext>
     </p:extLst>
   </p:cSld>
   <p:clrMapOvr>
     <a:masterClrMapping/>
   </p:clrMapOvr>
-  <mc:AlternateContent xmlns:mc="http://schemas.openxmlformats.org/markup-compatibility/2006" xmlns:p14="http://schemas.microsoft.com/office/powerpoint/2010/main">
-    <mc:Choice Requires="p14">
+  <mc:AlternateContent xmlns:mc="http://schemas.openxmlformats.org/markup-compatibility/2006">
+    <mc:Choice xmlns:p14="http://schemas.microsoft.com/office/powerpoint/2010/main" xmlns="" Requires="p14">
       <p:transition spd="slow" p14:dur="2000" advClick="0" advTm="5000"/>
     </mc:Choice>
-    <mc:Fallback xmlns="">
+    <mc:Fallback>
       <p:transition spd="slow" advClick="0" advTm="5000"/>
     </mc:Fallback>
   </mc:AlternateContent>
@@ -7290,7 +7290,7 @@
             <a:fld id="{1D8BD707-D9CF-40AE-B4C6-C98DA3205C09}" type="datetimeFigureOut">
               <a:rPr lang="en-US"/>
               <a:pPr/>
-              <a:t>9/7/23</a:t>
+              <a:t>9/7/2023</a:t>
             </a:fld>
             <a:endParaRPr lang="en-US" dirty="0"/>
           </a:p>
@@ -7350,7 +7350,7 @@
     </p:spTree>
     <p:extLst>
       <p:ext uri="{BB962C8B-B14F-4D97-AF65-F5344CB8AC3E}">
-        <p14:creationId xmlns:p14="http://schemas.microsoft.com/office/powerpoint/2010/main" val="2531485629"/>
+        <p14:creationId xmlns:p14="http://schemas.microsoft.com/office/powerpoint/2010/main" xmlns="" val="2531485629"/>
       </p:ext>
     </p:extLst>
   </p:cSld>
@@ -7546,18 +7546,18 @@
     </p:spTree>
     <p:extLst>
       <p:ext uri="{BB962C8B-B14F-4D97-AF65-F5344CB8AC3E}">
-        <p14:creationId xmlns:p14="http://schemas.microsoft.com/office/powerpoint/2010/main" val="3529216409"/>
+        <p14:creationId xmlns:p14="http://schemas.microsoft.com/office/powerpoint/2010/main" xmlns="" val="3529216409"/>
       </p:ext>
     </p:extLst>
   </p:cSld>
   <p:clrMapOvr>
     <a:masterClrMapping/>
   </p:clrMapOvr>
-  <mc:AlternateContent xmlns:mc="http://schemas.openxmlformats.org/markup-compatibility/2006" xmlns:p14="http://schemas.microsoft.com/office/powerpoint/2010/main">
-    <mc:Choice Requires="p14">
+  <mc:AlternateContent xmlns:mc="http://schemas.openxmlformats.org/markup-compatibility/2006">
+    <mc:Choice xmlns:p14="http://schemas.microsoft.com/office/powerpoint/2010/main" xmlns="" Requires="p14">
       <p:transition spd="slow" p14:dur="2000" advClick="0" advTm="5000"/>
     </mc:Choice>
-    <mc:Fallback xmlns="">
+    <mc:Fallback>
       <p:transition spd="slow" advClick="0" advTm="5000"/>
     </mc:Fallback>
   </mc:AlternateContent>
@@ -7586,7 +7586,7 @@
           <p:cNvPr id="7" name="Slide Number">
             <a:extLst>
               <a:ext uri="{FF2B5EF4-FFF2-40B4-BE49-F238E27FC236}">
-                <a16:creationId xmlns:a16="http://schemas.microsoft.com/office/drawing/2014/main" id="{C1780DB1-0AF0-4108-AFE1-9DA99F0DBCB8}"/>
+                <a16:creationId xmlns:a16="http://schemas.microsoft.com/office/drawing/2014/main" xmlns="" id="{C1780DB1-0AF0-4108-AFE1-9DA99F0DBCB8}"/>
               </a:ext>
             </a:extLst>
           </p:cNvPr>
@@ -7628,7 +7628,7 @@
           <p:cNvPr id="3" name="Slide Body Text">
             <a:extLst>
               <a:ext uri="{FF2B5EF4-FFF2-40B4-BE49-F238E27FC236}">
-                <a16:creationId xmlns:a16="http://schemas.microsoft.com/office/drawing/2014/main" id="{5A9D2960-6D42-439F-82E8-812822013A10}"/>
+                <a16:creationId xmlns:a16="http://schemas.microsoft.com/office/drawing/2014/main" xmlns="" id="{5A9D2960-6D42-439F-82E8-812822013A10}"/>
               </a:ext>
             </a:extLst>
           </p:cNvPr>
@@ -7706,7 +7706,7 @@
           <p:cNvPr id="13" name="Rectangle Top">
             <a:extLst>
               <a:ext uri="{FF2B5EF4-FFF2-40B4-BE49-F238E27FC236}">
-                <a16:creationId xmlns:a16="http://schemas.microsoft.com/office/drawing/2014/main" id="{391AFA4E-7870-4561-A1B8-AC956B0C8931}"/>
+                <a16:creationId xmlns:a16="http://schemas.microsoft.com/office/drawing/2014/main" xmlns="" id="{391AFA4E-7870-4561-A1B8-AC956B0C8931}"/>
               </a:ext>
             </a:extLst>
           </p:cNvPr>
@@ -7787,7 +7787,7 @@
           <p:cNvPr id="12" name="Logo Software University" descr="Software University logo">
             <a:extLst>
               <a:ext uri="{FF2B5EF4-FFF2-40B4-BE49-F238E27FC236}">
-                <a16:creationId xmlns:a16="http://schemas.microsoft.com/office/drawing/2014/main" id="{B1D3B425-B9BF-43ED-9DEC-C05002FBA22F}"/>
+                <a16:creationId xmlns:a16="http://schemas.microsoft.com/office/drawing/2014/main" xmlns="" id="{B1D3B425-B9BF-43ED-9DEC-C05002FBA22F}"/>
               </a:ext>
             </a:extLst>
           </p:cNvPr>
@@ -7800,7 +7800,7 @@
           <a:blip r:embed="rId2" cstate="print">
             <a:extLst>
               <a:ext uri="{28A0092B-C50C-407E-A947-70E740481C1C}">
-                <a14:useLocalDpi xmlns:a14="http://schemas.microsoft.com/office/drawing/2010/main" val="0"/>
+                <a14:useLocalDpi xmlns:a14="http://schemas.microsoft.com/office/drawing/2010/main" xmlns="" val="0"/>
               </a:ext>
             </a:extLst>
           </a:blip>
@@ -7823,7 +7823,7 @@
           <p:cNvPr id="6" name="Slide Title">
             <a:extLst>
               <a:ext uri="{FF2B5EF4-FFF2-40B4-BE49-F238E27FC236}">
-                <a16:creationId xmlns:a16="http://schemas.microsoft.com/office/drawing/2014/main" id="{19B5B676-7892-440F-8191-7109B2C59885}"/>
+                <a16:creationId xmlns:a16="http://schemas.microsoft.com/office/drawing/2014/main" xmlns="" id="{19B5B676-7892-440F-8191-7109B2C59885}"/>
               </a:ext>
             </a:extLst>
           </p:cNvPr>
@@ -7862,18 +7862,18 @@
     </p:spTree>
     <p:extLst>
       <p:ext uri="{BB962C8B-B14F-4D97-AF65-F5344CB8AC3E}">
-        <p14:creationId xmlns:p14="http://schemas.microsoft.com/office/powerpoint/2010/main" val="1102970716"/>
+        <p14:creationId xmlns:p14="http://schemas.microsoft.com/office/powerpoint/2010/main" xmlns="" val="1102970716"/>
       </p:ext>
     </p:extLst>
   </p:cSld>
   <p:clrMapOvr>
     <a:masterClrMapping/>
   </p:clrMapOvr>
-  <mc:AlternateContent xmlns:mc="http://schemas.openxmlformats.org/markup-compatibility/2006" xmlns:p14="http://schemas.microsoft.com/office/powerpoint/2010/main">
-    <mc:Choice Requires="p14">
+  <mc:AlternateContent xmlns:mc="http://schemas.openxmlformats.org/markup-compatibility/2006">
+    <mc:Choice xmlns:p14="http://schemas.microsoft.com/office/powerpoint/2010/main" xmlns="" Requires="p14">
       <p:transition spd="slow" p14:dur="2000" advClick="0" advTm="5000"/>
     </mc:Choice>
-    <mc:Fallback xmlns="">
+    <mc:Fallback>
       <p:transition spd="slow" advClick="0" advTm="5000"/>
     </mc:Fallback>
   </mc:AlternateContent>
@@ -7902,7 +7902,7 @@
           <p:cNvPr id="9" name="Slide Number">
             <a:extLst>
               <a:ext uri="{FF2B5EF4-FFF2-40B4-BE49-F238E27FC236}">
-                <a16:creationId xmlns:a16="http://schemas.microsoft.com/office/drawing/2014/main" id="{0020EB61-2079-41A3-B356-B1D8D48D786E}"/>
+                <a16:creationId xmlns:a16="http://schemas.microsoft.com/office/drawing/2014/main" xmlns="" id="{0020EB61-2079-41A3-B356-B1D8D48D786E}"/>
               </a:ext>
             </a:extLst>
           </p:cNvPr>
@@ -8019,7 +8019,7 @@
           <p:cNvPr id="7" name="Slide Body Text">
             <a:extLst>
               <a:ext uri="{FF2B5EF4-FFF2-40B4-BE49-F238E27FC236}">
-                <a16:creationId xmlns:a16="http://schemas.microsoft.com/office/drawing/2014/main" id="{CB4CB13C-66A1-466B-A6C1-B0BABF5CFEC1}"/>
+                <a16:creationId xmlns:a16="http://schemas.microsoft.com/office/drawing/2014/main" xmlns="" id="{CB4CB13C-66A1-466B-A6C1-B0BABF5CFEC1}"/>
               </a:ext>
             </a:extLst>
           </p:cNvPr>
@@ -8117,7 +8117,7 @@
           <p:cNvPr id="3" name="Logo Software University" descr="Software University logo">
             <a:extLst>
               <a:ext uri="{FF2B5EF4-FFF2-40B4-BE49-F238E27FC236}">
-                <a16:creationId xmlns:a16="http://schemas.microsoft.com/office/drawing/2014/main" id="{5573C101-930B-47AC-967A-A64513DFFDEE}"/>
+                <a16:creationId xmlns:a16="http://schemas.microsoft.com/office/drawing/2014/main" xmlns="" id="{5573C101-930B-47AC-967A-A64513DFFDEE}"/>
               </a:ext>
             </a:extLst>
           </p:cNvPr>
@@ -8140,7 +8140,7 @@
             </a:clrChange>
             <a:extLst>
               <a:ext uri="{28A0092B-C50C-407E-A947-70E740481C1C}">
-                <a14:useLocalDpi xmlns:a14="http://schemas.microsoft.com/office/drawing/2010/main" val="0"/>
+                <a14:useLocalDpi xmlns:a14="http://schemas.microsoft.com/office/drawing/2010/main" xmlns="" val="0"/>
               </a:ext>
             </a:extLst>
           </a:blip>
@@ -8163,7 +8163,7 @@
           <p:cNvPr id="8" name="Slide Title">
             <a:extLst>
               <a:ext uri="{FF2B5EF4-FFF2-40B4-BE49-F238E27FC236}">
-                <a16:creationId xmlns:a16="http://schemas.microsoft.com/office/drawing/2014/main" id="{E2DA9691-CDF5-499C-94BB-AAA61DAC1BFB}"/>
+                <a16:creationId xmlns:a16="http://schemas.microsoft.com/office/drawing/2014/main" xmlns="" id="{E2DA9691-CDF5-499C-94BB-AAA61DAC1BFB}"/>
               </a:ext>
             </a:extLst>
           </p:cNvPr>
@@ -8200,7 +8200,7 @@
           <p:cNvPr id="10" name="Group 9">
             <a:extLst>
               <a:ext uri="{FF2B5EF4-FFF2-40B4-BE49-F238E27FC236}">
-                <a16:creationId xmlns:a16="http://schemas.microsoft.com/office/drawing/2014/main" id="{43CDBCC2-1C96-44BC-B992-7B0C49C34904}"/>
+                <a16:creationId xmlns:a16="http://schemas.microsoft.com/office/drawing/2014/main" xmlns="" id="{43CDBCC2-1C96-44BC-B992-7B0C49C34904}"/>
               </a:ext>
             </a:extLst>
           </p:cNvPr>
@@ -8220,7 +8220,7 @@
             <p:cNvPr id="11" name="Group 10">
               <a:extLst>
                 <a:ext uri="{FF2B5EF4-FFF2-40B4-BE49-F238E27FC236}">
-                  <a16:creationId xmlns:a16="http://schemas.microsoft.com/office/drawing/2014/main" id="{7D71B3A8-4D39-42CF-9255-81EA3A622DD6}"/>
+                  <a16:creationId xmlns:a16="http://schemas.microsoft.com/office/drawing/2014/main" xmlns="" id="{7D71B3A8-4D39-42CF-9255-81EA3A622DD6}"/>
                 </a:ext>
               </a:extLst>
             </p:cNvPr>
@@ -8240,7 +8240,7 @@
               <p:cNvPr id="25" name="Oval 24">
                 <a:extLst>
                   <a:ext uri="{FF2B5EF4-FFF2-40B4-BE49-F238E27FC236}">
-                    <a16:creationId xmlns:a16="http://schemas.microsoft.com/office/drawing/2014/main" id="{B98059F9-1874-426D-8AF7-A12C21F37DD9}"/>
+                    <a16:creationId xmlns:a16="http://schemas.microsoft.com/office/drawing/2014/main" xmlns="" id="{B98059F9-1874-426D-8AF7-A12C21F37DD9}"/>
                   </a:ext>
                 </a:extLst>
               </p:cNvPr>
@@ -8292,7 +8292,7 @@
               <p:cNvPr id="26" name="Rectangle 5">
                 <a:extLst>
                   <a:ext uri="{FF2B5EF4-FFF2-40B4-BE49-F238E27FC236}">
-                    <a16:creationId xmlns:a16="http://schemas.microsoft.com/office/drawing/2014/main" id="{A3A1E077-DBDF-48F0-A924-604984B940A2}"/>
+                    <a16:creationId xmlns:a16="http://schemas.microsoft.com/office/drawing/2014/main" xmlns="" id="{A3A1E077-DBDF-48F0-A924-604984B940A2}"/>
                   </a:ext>
                 </a:extLst>
               </p:cNvPr>
@@ -8437,7 +8437,7 @@
               <p:cNvPr id="27" name="Rectangle 5">
                 <a:extLst>
                   <a:ext uri="{FF2B5EF4-FFF2-40B4-BE49-F238E27FC236}">
-                    <a16:creationId xmlns:a16="http://schemas.microsoft.com/office/drawing/2014/main" id="{798B1F51-1FA4-4199-81C7-62356C936CC9}"/>
+                    <a16:creationId xmlns:a16="http://schemas.microsoft.com/office/drawing/2014/main" xmlns="" id="{798B1F51-1FA4-4199-81C7-62356C936CC9}"/>
                   </a:ext>
                 </a:extLst>
               </p:cNvPr>
@@ -8582,7 +8582,7 @@
               <p:cNvPr id="28" name="Arc 27">
                 <a:extLst>
                   <a:ext uri="{FF2B5EF4-FFF2-40B4-BE49-F238E27FC236}">
-                    <a16:creationId xmlns:a16="http://schemas.microsoft.com/office/drawing/2014/main" id="{40A224C8-1233-40F7-96AB-BFF79AF6CDCB}"/>
+                    <a16:creationId xmlns:a16="http://schemas.microsoft.com/office/drawing/2014/main" xmlns="" id="{40A224C8-1233-40F7-96AB-BFF79AF6CDCB}"/>
                   </a:ext>
                 </a:extLst>
               </p:cNvPr>
@@ -8641,7 +8641,7 @@
               <p:cNvPr id="29" name="Arc 28">
                 <a:extLst>
                   <a:ext uri="{FF2B5EF4-FFF2-40B4-BE49-F238E27FC236}">
-                    <a16:creationId xmlns:a16="http://schemas.microsoft.com/office/drawing/2014/main" id="{B57C7CCC-E218-4321-8C7B-3F0C5753C7A1}"/>
+                    <a16:creationId xmlns:a16="http://schemas.microsoft.com/office/drawing/2014/main" xmlns="" id="{B57C7CCC-E218-4321-8C7B-3F0C5753C7A1}"/>
                   </a:ext>
                 </a:extLst>
               </p:cNvPr>
@@ -8701,7 +8701,7 @@
             <p:cNvPr id="13" name="Rectangle: Rounded Corners 12">
               <a:extLst>
                 <a:ext uri="{FF2B5EF4-FFF2-40B4-BE49-F238E27FC236}">
-                  <a16:creationId xmlns:a16="http://schemas.microsoft.com/office/drawing/2014/main" id="{6AF309CA-A56C-4ABC-B293-420F4EB1A9B4}"/>
+                  <a16:creationId xmlns:a16="http://schemas.microsoft.com/office/drawing/2014/main" xmlns="" id="{6AF309CA-A56C-4ABC-B293-420F4EB1A9B4}"/>
                 </a:ext>
               </a:extLst>
             </p:cNvPr>
@@ -8755,7 +8755,7 @@
             <p:cNvPr id="14" name="Rectangle: Rounded Corners 13">
               <a:extLst>
                 <a:ext uri="{FF2B5EF4-FFF2-40B4-BE49-F238E27FC236}">
-                  <a16:creationId xmlns:a16="http://schemas.microsoft.com/office/drawing/2014/main" id="{07955808-2AC7-44EB-8B6D-82B974E53A3C}"/>
+                  <a16:creationId xmlns:a16="http://schemas.microsoft.com/office/drawing/2014/main" xmlns="" id="{07955808-2AC7-44EB-8B6D-82B974E53A3C}"/>
                 </a:ext>
               </a:extLst>
             </p:cNvPr>
@@ -8816,7 +8816,7 @@
             <p:cNvPr id="15" name="Straight Connector 14">
               <a:extLst>
                 <a:ext uri="{FF2B5EF4-FFF2-40B4-BE49-F238E27FC236}">
-                  <a16:creationId xmlns:a16="http://schemas.microsoft.com/office/drawing/2014/main" id="{AC6420D7-AEAB-45EF-8D46-11EB06E4AFEA}"/>
+                  <a16:creationId xmlns:a16="http://schemas.microsoft.com/office/drawing/2014/main" xmlns="" id="{AC6420D7-AEAB-45EF-8D46-11EB06E4AFEA}"/>
                 </a:ext>
               </a:extLst>
             </p:cNvPr>
@@ -8862,7 +8862,7 @@
             <p:cNvPr id="16" name="Straight Connector 15">
               <a:extLst>
                 <a:ext uri="{FF2B5EF4-FFF2-40B4-BE49-F238E27FC236}">
-                  <a16:creationId xmlns:a16="http://schemas.microsoft.com/office/drawing/2014/main" id="{76C7FABC-6773-44F6-990B-3EB082BE9B35}"/>
+                  <a16:creationId xmlns:a16="http://schemas.microsoft.com/office/drawing/2014/main" xmlns="" id="{76C7FABC-6773-44F6-990B-3EB082BE9B35}"/>
                 </a:ext>
               </a:extLst>
             </p:cNvPr>
@@ -8908,7 +8908,7 @@
             <p:cNvPr id="17" name="Group 16">
               <a:extLst>
                 <a:ext uri="{FF2B5EF4-FFF2-40B4-BE49-F238E27FC236}">
-                  <a16:creationId xmlns:a16="http://schemas.microsoft.com/office/drawing/2014/main" id="{1FAD48E1-DC45-4B3D-9CE5-613250708496}"/>
+                  <a16:creationId xmlns:a16="http://schemas.microsoft.com/office/drawing/2014/main" xmlns="" id="{1FAD48E1-DC45-4B3D-9CE5-613250708496}"/>
                 </a:ext>
               </a:extLst>
             </p:cNvPr>
@@ -8931,7 +8931,7 @@
               <p:cNvPr id="23" name="Straight Connector 22">
                 <a:extLst>
                   <a:ext uri="{FF2B5EF4-FFF2-40B4-BE49-F238E27FC236}">
-                    <a16:creationId xmlns:a16="http://schemas.microsoft.com/office/drawing/2014/main" id="{B01FD1D1-046F-457B-AB63-2702CE3E906E}"/>
+                    <a16:creationId xmlns:a16="http://schemas.microsoft.com/office/drawing/2014/main" xmlns="" id="{B01FD1D1-046F-457B-AB63-2702CE3E906E}"/>
                   </a:ext>
                 </a:extLst>
               </p:cNvPr>
@@ -8975,7 +8975,7 @@
               <p:cNvPr id="24" name="Straight Connector 23">
                 <a:extLst>
                   <a:ext uri="{FF2B5EF4-FFF2-40B4-BE49-F238E27FC236}">
-                    <a16:creationId xmlns:a16="http://schemas.microsoft.com/office/drawing/2014/main" id="{895660C3-C72C-43EE-9C4A-170F85E5BE08}"/>
+                    <a16:creationId xmlns:a16="http://schemas.microsoft.com/office/drawing/2014/main" xmlns="" id="{895660C3-C72C-43EE-9C4A-170F85E5BE08}"/>
                   </a:ext>
                 </a:extLst>
               </p:cNvPr>
@@ -9020,7 +9020,7 @@
             <p:cNvPr id="19" name="Straight Connector 18">
               <a:extLst>
                 <a:ext uri="{FF2B5EF4-FFF2-40B4-BE49-F238E27FC236}">
-                  <a16:creationId xmlns:a16="http://schemas.microsoft.com/office/drawing/2014/main" id="{A74EE503-8FC0-42A6-8860-CA4EE42272E4}"/>
+                  <a16:creationId xmlns:a16="http://schemas.microsoft.com/office/drawing/2014/main" xmlns="" id="{A74EE503-8FC0-42A6-8860-CA4EE42272E4}"/>
                 </a:ext>
               </a:extLst>
             </p:cNvPr>
@@ -9066,7 +9066,7 @@
             <p:cNvPr id="12" name="Rectangle: Rounded Corners 11">
               <a:extLst>
                 <a:ext uri="{FF2B5EF4-FFF2-40B4-BE49-F238E27FC236}">
-                  <a16:creationId xmlns:a16="http://schemas.microsoft.com/office/drawing/2014/main" id="{F4189FDA-9FE8-490B-8A70-2E941811021F}"/>
+                  <a16:creationId xmlns:a16="http://schemas.microsoft.com/office/drawing/2014/main" xmlns="" id="{F4189FDA-9FE8-490B-8A70-2E941811021F}"/>
                 </a:ext>
               </a:extLst>
             </p:cNvPr>
@@ -9120,7 +9120,7 @@
             <p:cNvPr id="18" name="Group 17">
               <a:extLst>
                 <a:ext uri="{FF2B5EF4-FFF2-40B4-BE49-F238E27FC236}">
-                  <a16:creationId xmlns:a16="http://schemas.microsoft.com/office/drawing/2014/main" id="{FDA3EFCD-0DF8-419D-8533-D781521E597E}"/>
+                  <a16:creationId xmlns:a16="http://schemas.microsoft.com/office/drawing/2014/main" xmlns="" id="{FDA3EFCD-0DF8-419D-8533-D781521E597E}"/>
                 </a:ext>
               </a:extLst>
             </p:cNvPr>
@@ -9143,7 +9143,7 @@
               <p:cNvPr id="21" name="Straight Connector 20">
                 <a:extLst>
                   <a:ext uri="{FF2B5EF4-FFF2-40B4-BE49-F238E27FC236}">
-                    <a16:creationId xmlns:a16="http://schemas.microsoft.com/office/drawing/2014/main" id="{C3CC6A5A-182E-4A09-9C04-EB191881D789}"/>
+                    <a16:creationId xmlns:a16="http://schemas.microsoft.com/office/drawing/2014/main" xmlns="" id="{C3CC6A5A-182E-4A09-9C04-EB191881D789}"/>
                   </a:ext>
                 </a:extLst>
               </p:cNvPr>
@@ -9187,7 +9187,7 @@
               <p:cNvPr id="22" name="Straight Connector 21">
                 <a:extLst>
                   <a:ext uri="{FF2B5EF4-FFF2-40B4-BE49-F238E27FC236}">
-                    <a16:creationId xmlns:a16="http://schemas.microsoft.com/office/drawing/2014/main" id="{440C8953-0555-48CC-8255-78F17E053EE7}"/>
+                    <a16:creationId xmlns:a16="http://schemas.microsoft.com/office/drawing/2014/main" xmlns="" id="{440C8953-0555-48CC-8255-78F17E053EE7}"/>
                   </a:ext>
                 </a:extLst>
               </p:cNvPr>
@@ -9233,7 +9233,7 @@
           <p:cNvPr id="34" name="Straight Connector 33">
             <a:extLst>
               <a:ext uri="{FF2B5EF4-FFF2-40B4-BE49-F238E27FC236}">
-                <a16:creationId xmlns:a16="http://schemas.microsoft.com/office/drawing/2014/main" id="{29B538CA-8CCB-43FB-B5E5-5FC04EBC1F54}"/>
+                <a16:creationId xmlns:a16="http://schemas.microsoft.com/office/drawing/2014/main" xmlns="" id="{29B538CA-8CCB-43FB-B5E5-5FC04EBC1F54}"/>
               </a:ext>
             </a:extLst>
           </p:cNvPr>
@@ -9278,18 +9278,18 @@
     </p:spTree>
     <p:extLst>
       <p:ext uri="{BB962C8B-B14F-4D97-AF65-F5344CB8AC3E}">
-        <p14:creationId xmlns:p14="http://schemas.microsoft.com/office/powerpoint/2010/main" val="743545348"/>
+        <p14:creationId xmlns:p14="http://schemas.microsoft.com/office/powerpoint/2010/main" xmlns="" val="743545348"/>
       </p:ext>
     </p:extLst>
   </p:cSld>
   <p:clrMapOvr>
     <a:masterClrMapping/>
   </p:clrMapOvr>
-  <mc:AlternateContent xmlns:mc="http://schemas.openxmlformats.org/markup-compatibility/2006" xmlns:p14="http://schemas.microsoft.com/office/powerpoint/2010/main">
-    <mc:Choice Requires="p14">
+  <mc:AlternateContent xmlns:mc="http://schemas.openxmlformats.org/markup-compatibility/2006">
+    <mc:Choice xmlns:p14="http://schemas.microsoft.com/office/powerpoint/2010/main" xmlns="" Requires="p14">
       <p:transition spd="slow" p14:dur="2000" advClick="0" advTm="5000"/>
     </mc:Choice>
-    <mc:Fallback xmlns="">
+    <mc:Fallback>
       <p:transition spd="slow" advClick="0" advTm="5000"/>
     </mc:Fallback>
   </mc:AlternateContent>
@@ -9318,7 +9318,7 @@
           <p:cNvPr id="9" name="Slide Number">
             <a:extLst>
               <a:ext uri="{FF2B5EF4-FFF2-40B4-BE49-F238E27FC236}">
-                <a16:creationId xmlns:a16="http://schemas.microsoft.com/office/drawing/2014/main" id="{1865BF6B-7F07-4E9C-879F-80E36EEB3405}"/>
+                <a16:creationId xmlns:a16="http://schemas.microsoft.com/office/drawing/2014/main" xmlns="" id="{1865BF6B-7F07-4E9C-879F-80E36EEB3405}"/>
               </a:ext>
             </a:extLst>
           </p:cNvPr>
@@ -9360,7 +9360,7 @@
           <p:cNvPr id="12" name="Rectangle Left">
             <a:extLst>
               <a:ext uri="{FF2B5EF4-FFF2-40B4-BE49-F238E27FC236}">
-                <a16:creationId xmlns:a16="http://schemas.microsoft.com/office/drawing/2014/main" id="{345FB1C8-7F66-4D5C-ACCE-AE919936BCFD}"/>
+                <a16:creationId xmlns:a16="http://schemas.microsoft.com/office/drawing/2014/main" xmlns="" id="{345FB1C8-7F66-4D5C-ACCE-AE919936BCFD}"/>
               </a:ext>
             </a:extLst>
           </p:cNvPr>
@@ -9441,7 +9441,7 @@
           <p:cNvPr id="15" name="Slide Body Text">
             <a:extLst>
               <a:ext uri="{FF2B5EF4-FFF2-40B4-BE49-F238E27FC236}">
-                <a16:creationId xmlns:a16="http://schemas.microsoft.com/office/drawing/2014/main" id="{6157C8DE-E0AF-422B-BBB1-F0AF1264B5E9}"/>
+                <a16:creationId xmlns:a16="http://schemas.microsoft.com/office/drawing/2014/main" xmlns="" id="{6157C8DE-E0AF-422B-BBB1-F0AF1264B5E9}"/>
               </a:ext>
             </a:extLst>
           </p:cNvPr>
@@ -9539,7 +9539,7 @@
           <p:cNvPr id="16" name="Logo Software University" descr="Software University logo">
             <a:extLst>
               <a:ext uri="{FF2B5EF4-FFF2-40B4-BE49-F238E27FC236}">
-                <a16:creationId xmlns:a16="http://schemas.microsoft.com/office/drawing/2014/main" id="{EFEBB553-EACE-4B4F-8B4F-7629FDD910A4}"/>
+                <a16:creationId xmlns:a16="http://schemas.microsoft.com/office/drawing/2014/main" xmlns="" id="{EFEBB553-EACE-4B4F-8B4F-7629FDD910A4}"/>
               </a:ext>
             </a:extLst>
           </p:cNvPr>
@@ -9562,7 +9562,7 @@
             </a:clrChange>
             <a:extLst>
               <a:ext uri="{28A0092B-C50C-407E-A947-70E740481C1C}">
-                <a14:useLocalDpi xmlns:a14="http://schemas.microsoft.com/office/drawing/2010/main" val="0"/>
+                <a14:useLocalDpi xmlns:a14="http://schemas.microsoft.com/office/drawing/2010/main" xmlns="" val="0"/>
               </a:ext>
             </a:extLst>
           </a:blip>
@@ -9585,7 +9585,7 @@
           <p:cNvPr id="13" name="Slide Title">
             <a:extLst>
               <a:ext uri="{FF2B5EF4-FFF2-40B4-BE49-F238E27FC236}">
-                <a16:creationId xmlns:a16="http://schemas.microsoft.com/office/drawing/2014/main" id="{0D5CC956-5C4A-44BE-8F8B-327FAFA51E97}"/>
+                <a16:creationId xmlns:a16="http://schemas.microsoft.com/office/drawing/2014/main" xmlns="" id="{0D5CC956-5C4A-44BE-8F8B-327FAFA51E97}"/>
               </a:ext>
             </a:extLst>
           </p:cNvPr>
@@ -9622,7 +9622,7 @@
           <p:cNvPr id="33" name="Group 32">
             <a:extLst>
               <a:ext uri="{FF2B5EF4-FFF2-40B4-BE49-F238E27FC236}">
-                <a16:creationId xmlns:a16="http://schemas.microsoft.com/office/drawing/2014/main" id="{7CF60135-47AA-48F0-96BA-0E795668ABDB}"/>
+                <a16:creationId xmlns:a16="http://schemas.microsoft.com/office/drawing/2014/main" xmlns="" id="{7CF60135-47AA-48F0-96BA-0E795668ABDB}"/>
               </a:ext>
             </a:extLst>
           </p:cNvPr>
@@ -9642,7 +9642,7 @@
             <p:cNvPr id="34" name="Group 33">
               <a:extLst>
                 <a:ext uri="{FF2B5EF4-FFF2-40B4-BE49-F238E27FC236}">
-                  <a16:creationId xmlns:a16="http://schemas.microsoft.com/office/drawing/2014/main" id="{2823380E-3936-41AF-BDF7-DA54D75BBF6B}"/>
+                  <a16:creationId xmlns:a16="http://schemas.microsoft.com/office/drawing/2014/main" xmlns="" id="{2823380E-3936-41AF-BDF7-DA54D75BBF6B}"/>
                 </a:ext>
               </a:extLst>
             </p:cNvPr>
@@ -9662,7 +9662,7 @@
               <p:cNvPr id="47" name="Oval 46">
                 <a:extLst>
                   <a:ext uri="{FF2B5EF4-FFF2-40B4-BE49-F238E27FC236}">
-                    <a16:creationId xmlns:a16="http://schemas.microsoft.com/office/drawing/2014/main" id="{52B047D9-D8DD-45C7-9BC8-6D4F682F5182}"/>
+                    <a16:creationId xmlns:a16="http://schemas.microsoft.com/office/drawing/2014/main" xmlns="" id="{52B047D9-D8DD-45C7-9BC8-6D4F682F5182}"/>
                   </a:ext>
                 </a:extLst>
               </p:cNvPr>
@@ -9714,7 +9714,7 @@
               <p:cNvPr id="48" name="Rectangle 5">
                 <a:extLst>
                   <a:ext uri="{FF2B5EF4-FFF2-40B4-BE49-F238E27FC236}">
-                    <a16:creationId xmlns:a16="http://schemas.microsoft.com/office/drawing/2014/main" id="{4D84FE51-BD8E-47EA-9463-CE02FEA31766}"/>
+                    <a16:creationId xmlns:a16="http://schemas.microsoft.com/office/drawing/2014/main" xmlns="" id="{4D84FE51-BD8E-47EA-9463-CE02FEA31766}"/>
                   </a:ext>
                 </a:extLst>
               </p:cNvPr>
@@ -9859,7 +9859,7 @@
               <p:cNvPr id="49" name="Rectangle 5">
                 <a:extLst>
                   <a:ext uri="{FF2B5EF4-FFF2-40B4-BE49-F238E27FC236}">
-                    <a16:creationId xmlns:a16="http://schemas.microsoft.com/office/drawing/2014/main" id="{F5C8F037-C197-4219-AC87-3A81763512BC}"/>
+                    <a16:creationId xmlns:a16="http://schemas.microsoft.com/office/drawing/2014/main" xmlns="" id="{F5C8F037-C197-4219-AC87-3A81763512BC}"/>
                   </a:ext>
                 </a:extLst>
               </p:cNvPr>
@@ -10004,7 +10004,7 @@
               <p:cNvPr id="50" name="Arc 49">
                 <a:extLst>
                   <a:ext uri="{FF2B5EF4-FFF2-40B4-BE49-F238E27FC236}">
-                    <a16:creationId xmlns:a16="http://schemas.microsoft.com/office/drawing/2014/main" id="{786EE401-CF8E-439B-94A0-EE6F3A7D5798}"/>
+                    <a16:creationId xmlns:a16="http://schemas.microsoft.com/office/drawing/2014/main" xmlns="" id="{786EE401-CF8E-439B-94A0-EE6F3A7D5798}"/>
                   </a:ext>
                 </a:extLst>
               </p:cNvPr>
@@ -10063,7 +10063,7 @@
               <p:cNvPr id="51" name="Arc 50">
                 <a:extLst>
                   <a:ext uri="{FF2B5EF4-FFF2-40B4-BE49-F238E27FC236}">
-                    <a16:creationId xmlns:a16="http://schemas.microsoft.com/office/drawing/2014/main" id="{8D9ACD38-B3EB-4A63-9730-CBF0501BF235}"/>
+                    <a16:creationId xmlns:a16="http://schemas.microsoft.com/office/drawing/2014/main" xmlns="" id="{8D9ACD38-B3EB-4A63-9730-CBF0501BF235}"/>
                   </a:ext>
                 </a:extLst>
               </p:cNvPr>
@@ -10123,7 +10123,7 @@
             <p:cNvPr id="35" name="Rectangle: Rounded Corners 34">
               <a:extLst>
                 <a:ext uri="{FF2B5EF4-FFF2-40B4-BE49-F238E27FC236}">
-                  <a16:creationId xmlns:a16="http://schemas.microsoft.com/office/drawing/2014/main" id="{64EE493E-A353-4C75-A3B9-D48ABA2C57CC}"/>
+                  <a16:creationId xmlns:a16="http://schemas.microsoft.com/office/drawing/2014/main" xmlns="" id="{64EE493E-A353-4C75-A3B9-D48ABA2C57CC}"/>
                 </a:ext>
               </a:extLst>
             </p:cNvPr>
@@ -10177,7 +10177,7 @@
             <p:cNvPr id="36" name="Rectangle: Rounded Corners 35">
               <a:extLst>
                 <a:ext uri="{FF2B5EF4-FFF2-40B4-BE49-F238E27FC236}">
-                  <a16:creationId xmlns:a16="http://schemas.microsoft.com/office/drawing/2014/main" id="{718408B9-204E-42E3-9E79-33E047E869BC}"/>
+                  <a16:creationId xmlns:a16="http://schemas.microsoft.com/office/drawing/2014/main" xmlns="" id="{718408B9-204E-42E3-9E79-33E047E869BC}"/>
                 </a:ext>
               </a:extLst>
             </p:cNvPr>
@@ -10238,7 +10238,7 @@
             <p:cNvPr id="37" name="Straight Connector 36">
               <a:extLst>
                 <a:ext uri="{FF2B5EF4-FFF2-40B4-BE49-F238E27FC236}">
-                  <a16:creationId xmlns:a16="http://schemas.microsoft.com/office/drawing/2014/main" id="{0AB66D97-DF6F-4CD2-AF13-42B5C852F673}"/>
+                  <a16:creationId xmlns:a16="http://schemas.microsoft.com/office/drawing/2014/main" xmlns="" id="{0AB66D97-DF6F-4CD2-AF13-42B5C852F673}"/>
                 </a:ext>
               </a:extLst>
             </p:cNvPr>
@@ -10284,7 +10284,7 @@
             <p:cNvPr id="38" name="Straight Connector 37">
               <a:extLst>
                 <a:ext uri="{FF2B5EF4-FFF2-40B4-BE49-F238E27FC236}">
-                  <a16:creationId xmlns:a16="http://schemas.microsoft.com/office/drawing/2014/main" id="{F2AFBA69-C196-4703-8AAB-5F72A8EDCEB5}"/>
+                  <a16:creationId xmlns:a16="http://schemas.microsoft.com/office/drawing/2014/main" xmlns="" id="{F2AFBA69-C196-4703-8AAB-5F72A8EDCEB5}"/>
                 </a:ext>
               </a:extLst>
             </p:cNvPr>
@@ -10330,7 +10330,7 @@
             <p:cNvPr id="39" name="Group 38">
               <a:extLst>
                 <a:ext uri="{FF2B5EF4-FFF2-40B4-BE49-F238E27FC236}">
-                  <a16:creationId xmlns:a16="http://schemas.microsoft.com/office/drawing/2014/main" id="{9AFC66C1-0C1C-4332-9C4E-782574C896B8}"/>
+                  <a16:creationId xmlns:a16="http://schemas.microsoft.com/office/drawing/2014/main" xmlns="" id="{9AFC66C1-0C1C-4332-9C4E-782574C896B8}"/>
                 </a:ext>
               </a:extLst>
             </p:cNvPr>
@@ -10353,7 +10353,7 @@
               <p:cNvPr id="45" name="Straight Connector 44">
                 <a:extLst>
                   <a:ext uri="{FF2B5EF4-FFF2-40B4-BE49-F238E27FC236}">
-                    <a16:creationId xmlns:a16="http://schemas.microsoft.com/office/drawing/2014/main" id="{872CA8AD-EAF6-40BE-9DDE-ECDB4A980CA5}"/>
+                    <a16:creationId xmlns:a16="http://schemas.microsoft.com/office/drawing/2014/main" xmlns="" id="{872CA8AD-EAF6-40BE-9DDE-ECDB4A980CA5}"/>
                   </a:ext>
                 </a:extLst>
               </p:cNvPr>
@@ -10397,7 +10397,7 @@
               <p:cNvPr id="46" name="Straight Connector 45">
                 <a:extLst>
                   <a:ext uri="{FF2B5EF4-FFF2-40B4-BE49-F238E27FC236}">
-                    <a16:creationId xmlns:a16="http://schemas.microsoft.com/office/drawing/2014/main" id="{57DD3EC7-1A13-4AFE-BD6F-DA12C281FAFB}"/>
+                    <a16:creationId xmlns:a16="http://schemas.microsoft.com/office/drawing/2014/main" xmlns="" id="{57DD3EC7-1A13-4AFE-BD6F-DA12C281FAFB}"/>
                   </a:ext>
                 </a:extLst>
               </p:cNvPr>
@@ -10442,7 +10442,7 @@
             <p:cNvPr id="40" name="Straight Connector 39">
               <a:extLst>
                 <a:ext uri="{FF2B5EF4-FFF2-40B4-BE49-F238E27FC236}">
-                  <a16:creationId xmlns:a16="http://schemas.microsoft.com/office/drawing/2014/main" id="{E46151FA-19E9-4E84-A082-EDAC6F76EA9D}"/>
+                  <a16:creationId xmlns:a16="http://schemas.microsoft.com/office/drawing/2014/main" xmlns="" id="{E46151FA-19E9-4E84-A082-EDAC6F76EA9D}"/>
                 </a:ext>
               </a:extLst>
             </p:cNvPr>
@@ -10488,7 +10488,7 @@
             <p:cNvPr id="41" name="Rectangle: Rounded Corners 40">
               <a:extLst>
                 <a:ext uri="{FF2B5EF4-FFF2-40B4-BE49-F238E27FC236}">
-                  <a16:creationId xmlns:a16="http://schemas.microsoft.com/office/drawing/2014/main" id="{3423EEF0-5B70-4091-B2DA-0740D2609643}"/>
+                  <a16:creationId xmlns:a16="http://schemas.microsoft.com/office/drawing/2014/main" xmlns="" id="{3423EEF0-5B70-4091-B2DA-0740D2609643}"/>
                 </a:ext>
               </a:extLst>
             </p:cNvPr>
@@ -10542,7 +10542,7 @@
             <p:cNvPr id="42" name="Group 41">
               <a:extLst>
                 <a:ext uri="{FF2B5EF4-FFF2-40B4-BE49-F238E27FC236}">
-                  <a16:creationId xmlns:a16="http://schemas.microsoft.com/office/drawing/2014/main" id="{49A8AAA7-98E7-4224-B027-830FFCC285A3}"/>
+                  <a16:creationId xmlns:a16="http://schemas.microsoft.com/office/drawing/2014/main" xmlns="" id="{49A8AAA7-98E7-4224-B027-830FFCC285A3}"/>
                 </a:ext>
               </a:extLst>
             </p:cNvPr>
@@ -10565,7 +10565,7 @@
               <p:cNvPr id="43" name="Straight Connector 42">
                 <a:extLst>
                   <a:ext uri="{FF2B5EF4-FFF2-40B4-BE49-F238E27FC236}">
-                    <a16:creationId xmlns:a16="http://schemas.microsoft.com/office/drawing/2014/main" id="{2129EC38-471E-4685-973E-BA7A7F567C42}"/>
+                    <a16:creationId xmlns:a16="http://schemas.microsoft.com/office/drawing/2014/main" xmlns="" id="{2129EC38-471E-4685-973E-BA7A7F567C42}"/>
                   </a:ext>
                 </a:extLst>
               </p:cNvPr>
@@ -10609,7 +10609,7 @@
               <p:cNvPr id="44" name="Straight Connector 43">
                 <a:extLst>
                   <a:ext uri="{FF2B5EF4-FFF2-40B4-BE49-F238E27FC236}">
-                    <a16:creationId xmlns:a16="http://schemas.microsoft.com/office/drawing/2014/main" id="{678142BE-84C9-4834-B6CC-6623E401661C}"/>
+                    <a16:creationId xmlns:a16="http://schemas.microsoft.com/office/drawing/2014/main" xmlns="" id="{678142BE-84C9-4834-B6CC-6623E401661C}"/>
                   </a:ext>
                 </a:extLst>
               </p:cNvPr>
@@ -10653,18 +10653,18 @@
     </p:spTree>
     <p:extLst>
       <p:ext uri="{BB962C8B-B14F-4D97-AF65-F5344CB8AC3E}">
-        <p14:creationId xmlns:p14="http://schemas.microsoft.com/office/powerpoint/2010/main" val="1679651758"/>
+        <p14:creationId xmlns:p14="http://schemas.microsoft.com/office/powerpoint/2010/main" xmlns="" val="1679651758"/>
       </p:ext>
     </p:extLst>
   </p:cSld>
   <p:clrMapOvr>
     <a:masterClrMapping/>
   </p:clrMapOvr>
-  <mc:AlternateContent xmlns:mc="http://schemas.openxmlformats.org/markup-compatibility/2006" xmlns:p14="http://schemas.microsoft.com/office/powerpoint/2010/main">
-    <mc:Choice Requires="p14">
+  <mc:AlternateContent xmlns:mc="http://schemas.openxmlformats.org/markup-compatibility/2006">
+    <mc:Choice xmlns:p14="http://schemas.microsoft.com/office/powerpoint/2010/main" xmlns="" Requires="p14">
       <p:transition spd="slow" p14:dur="2000" advClick="0" advTm="5000"/>
     </mc:Choice>
-    <mc:Fallback xmlns="">
+    <mc:Fallback>
       <p:transition spd="slow" advClick="0" advTm="5000"/>
     </mc:Fallback>
   </mc:AlternateContent>
@@ -10693,7 +10693,7 @@
           <p:cNvPr id="5" name="Slide Number">
             <a:extLst>
               <a:ext uri="{FF2B5EF4-FFF2-40B4-BE49-F238E27FC236}">
-                <a16:creationId xmlns:a16="http://schemas.microsoft.com/office/drawing/2014/main" id="{F0B8C963-1813-4B69-AD27-6D02EBBBB569}"/>
+                <a16:creationId xmlns:a16="http://schemas.microsoft.com/office/drawing/2014/main" xmlns="" id="{F0B8C963-1813-4B69-AD27-6D02EBBBB569}"/>
               </a:ext>
             </a:extLst>
           </p:cNvPr>
@@ -10735,7 +10735,7 @@
           <p:cNvPr id="3" name="Rectangle Left">
             <a:extLst>
               <a:ext uri="{FF2B5EF4-FFF2-40B4-BE49-F238E27FC236}">
-                <a16:creationId xmlns:a16="http://schemas.microsoft.com/office/drawing/2014/main" id="{345FB1C8-7F66-4D5C-ACCE-AE919936BCFD}"/>
+                <a16:creationId xmlns:a16="http://schemas.microsoft.com/office/drawing/2014/main" xmlns="" id="{345FB1C8-7F66-4D5C-ACCE-AE919936BCFD}"/>
               </a:ext>
             </a:extLst>
           </p:cNvPr>
@@ -10816,7 +10816,7 @@
           <p:cNvPr id="7" name="Slide Body Text">
             <a:extLst>
               <a:ext uri="{FF2B5EF4-FFF2-40B4-BE49-F238E27FC236}">
-                <a16:creationId xmlns:a16="http://schemas.microsoft.com/office/drawing/2014/main" id="{7296EDA7-D37D-4B31-A888-371F0804124F}"/>
+                <a16:creationId xmlns:a16="http://schemas.microsoft.com/office/drawing/2014/main" xmlns="" id="{7296EDA7-D37D-4B31-A888-371F0804124F}"/>
               </a:ext>
             </a:extLst>
           </p:cNvPr>
@@ -10914,7 +10914,7 @@
           <p:cNvPr id="6" name="Slide Title">
             <a:extLst>
               <a:ext uri="{FF2B5EF4-FFF2-40B4-BE49-F238E27FC236}">
-                <a16:creationId xmlns:a16="http://schemas.microsoft.com/office/drawing/2014/main" id="{55A88B09-3557-48A3-BF27-42699C269215}"/>
+                <a16:creationId xmlns:a16="http://schemas.microsoft.com/office/drawing/2014/main" xmlns="" id="{55A88B09-3557-48A3-BF27-42699C269215}"/>
               </a:ext>
             </a:extLst>
           </p:cNvPr>
@@ -10951,7 +10951,7 @@
           <p:cNvPr id="28" name="Group 27">
             <a:extLst>
               <a:ext uri="{FF2B5EF4-FFF2-40B4-BE49-F238E27FC236}">
-                <a16:creationId xmlns:a16="http://schemas.microsoft.com/office/drawing/2014/main" id="{C4248838-4E67-439E-AE0A-0043D2CB04D6}"/>
+                <a16:creationId xmlns:a16="http://schemas.microsoft.com/office/drawing/2014/main" xmlns="" id="{C4248838-4E67-439E-AE0A-0043D2CB04D6}"/>
               </a:ext>
             </a:extLst>
           </p:cNvPr>
@@ -10971,7 +10971,7 @@
             <p:cNvPr id="29" name="Group 28">
               <a:extLst>
                 <a:ext uri="{FF2B5EF4-FFF2-40B4-BE49-F238E27FC236}">
-                  <a16:creationId xmlns:a16="http://schemas.microsoft.com/office/drawing/2014/main" id="{810CFD6A-2427-49D5-846A-5F93601D4184}"/>
+                  <a16:creationId xmlns:a16="http://schemas.microsoft.com/office/drawing/2014/main" xmlns="" id="{810CFD6A-2427-49D5-846A-5F93601D4184}"/>
                 </a:ext>
               </a:extLst>
             </p:cNvPr>
@@ -10991,7 +10991,7 @@
               <p:cNvPr id="42" name="Oval 41">
                 <a:extLst>
                   <a:ext uri="{FF2B5EF4-FFF2-40B4-BE49-F238E27FC236}">
-                    <a16:creationId xmlns:a16="http://schemas.microsoft.com/office/drawing/2014/main" id="{017B1AE5-5C36-4839-BA1F-B404EA44E701}"/>
+                    <a16:creationId xmlns:a16="http://schemas.microsoft.com/office/drawing/2014/main" xmlns="" id="{017B1AE5-5C36-4839-BA1F-B404EA44E701}"/>
                   </a:ext>
                 </a:extLst>
               </p:cNvPr>
@@ -11043,7 +11043,7 @@
               <p:cNvPr id="43" name="Rectangle 5">
                 <a:extLst>
                   <a:ext uri="{FF2B5EF4-FFF2-40B4-BE49-F238E27FC236}">
-                    <a16:creationId xmlns:a16="http://schemas.microsoft.com/office/drawing/2014/main" id="{FB963D79-BB49-4A1D-BA66-EA0670C79BAE}"/>
+                    <a16:creationId xmlns:a16="http://schemas.microsoft.com/office/drawing/2014/main" xmlns="" id="{FB963D79-BB49-4A1D-BA66-EA0670C79BAE}"/>
                   </a:ext>
                 </a:extLst>
               </p:cNvPr>
@@ -11188,7 +11188,7 @@
               <p:cNvPr id="44" name="Rectangle 5">
                 <a:extLst>
                   <a:ext uri="{FF2B5EF4-FFF2-40B4-BE49-F238E27FC236}">
-                    <a16:creationId xmlns:a16="http://schemas.microsoft.com/office/drawing/2014/main" id="{6D7746D8-B913-493B-AAE9-25BC6893D40E}"/>
+                    <a16:creationId xmlns:a16="http://schemas.microsoft.com/office/drawing/2014/main" xmlns="" id="{6D7746D8-B913-493B-AAE9-25BC6893D40E}"/>
                   </a:ext>
                 </a:extLst>
               </p:cNvPr>
@@ -11333,7 +11333,7 @@
               <p:cNvPr id="45" name="Arc 44">
                 <a:extLst>
                   <a:ext uri="{FF2B5EF4-FFF2-40B4-BE49-F238E27FC236}">
-                    <a16:creationId xmlns:a16="http://schemas.microsoft.com/office/drawing/2014/main" id="{29031C02-E965-417B-8799-96061B14F30D}"/>
+                    <a16:creationId xmlns:a16="http://schemas.microsoft.com/office/drawing/2014/main" xmlns="" id="{29031C02-E965-417B-8799-96061B14F30D}"/>
                   </a:ext>
                 </a:extLst>
               </p:cNvPr>
@@ -11392,7 +11392,7 @@
               <p:cNvPr id="46" name="Arc 45">
                 <a:extLst>
                   <a:ext uri="{FF2B5EF4-FFF2-40B4-BE49-F238E27FC236}">
-                    <a16:creationId xmlns:a16="http://schemas.microsoft.com/office/drawing/2014/main" id="{26BFD8A6-BC99-4B16-BA10-08A9E5C681C0}"/>
+                    <a16:creationId xmlns:a16="http://schemas.microsoft.com/office/drawing/2014/main" xmlns="" id="{26BFD8A6-BC99-4B16-BA10-08A9E5C681C0}"/>
                   </a:ext>
                 </a:extLst>
               </p:cNvPr>
@@ -11452,7 +11452,7 @@
             <p:cNvPr id="30" name="Rectangle: Rounded Corners 29">
               <a:extLst>
                 <a:ext uri="{FF2B5EF4-FFF2-40B4-BE49-F238E27FC236}">
-                  <a16:creationId xmlns:a16="http://schemas.microsoft.com/office/drawing/2014/main" id="{B310277F-A78E-4FB9-9EA9-88BE4F1D585B}"/>
+                  <a16:creationId xmlns:a16="http://schemas.microsoft.com/office/drawing/2014/main" xmlns="" id="{B310277F-A78E-4FB9-9EA9-88BE4F1D585B}"/>
                 </a:ext>
               </a:extLst>
             </p:cNvPr>
@@ -11506,7 +11506,7 @@
             <p:cNvPr id="31" name="Rectangle: Rounded Corners 30">
               <a:extLst>
                 <a:ext uri="{FF2B5EF4-FFF2-40B4-BE49-F238E27FC236}">
-                  <a16:creationId xmlns:a16="http://schemas.microsoft.com/office/drawing/2014/main" id="{A92CF92B-C212-4542-83AE-A0058B5BB5EA}"/>
+                  <a16:creationId xmlns:a16="http://schemas.microsoft.com/office/drawing/2014/main" xmlns="" id="{A92CF92B-C212-4542-83AE-A0058B5BB5EA}"/>
                 </a:ext>
               </a:extLst>
             </p:cNvPr>
@@ -11567,7 +11567,7 @@
             <p:cNvPr id="32" name="Straight Connector 31">
               <a:extLst>
                 <a:ext uri="{FF2B5EF4-FFF2-40B4-BE49-F238E27FC236}">
-                  <a16:creationId xmlns:a16="http://schemas.microsoft.com/office/drawing/2014/main" id="{563B4374-5C0D-461F-B3BD-78D99614D365}"/>
+                  <a16:creationId xmlns:a16="http://schemas.microsoft.com/office/drawing/2014/main" xmlns="" id="{563B4374-5C0D-461F-B3BD-78D99614D365}"/>
                 </a:ext>
               </a:extLst>
             </p:cNvPr>
@@ -11613,7 +11613,7 @@
             <p:cNvPr id="33" name="Straight Connector 32">
               <a:extLst>
                 <a:ext uri="{FF2B5EF4-FFF2-40B4-BE49-F238E27FC236}">
-                  <a16:creationId xmlns:a16="http://schemas.microsoft.com/office/drawing/2014/main" id="{FBC6FDE7-AEA1-4230-8433-4C088A0FF5F9}"/>
+                  <a16:creationId xmlns:a16="http://schemas.microsoft.com/office/drawing/2014/main" xmlns="" id="{FBC6FDE7-AEA1-4230-8433-4C088A0FF5F9}"/>
                 </a:ext>
               </a:extLst>
             </p:cNvPr>
@@ -11659,7 +11659,7 @@
             <p:cNvPr id="34" name="Group 33">
               <a:extLst>
                 <a:ext uri="{FF2B5EF4-FFF2-40B4-BE49-F238E27FC236}">
-                  <a16:creationId xmlns:a16="http://schemas.microsoft.com/office/drawing/2014/main" id="{C4D1021D-07C7-4331-8FF6-36980A30978B}"/>
+                  <a16:creationId xmlns:a16="http://schemas.microsoft.com/office/drawing/2014/main" xmlns="" id="{C4D1021D-07C7-4331-8FF6-36980A30978B}"/>
                 </a:ext>
               </a:extLst>
             </p:cNvPr>
@@ -11682,7 +11682,7 @@
               <p:cNvPr id="40" name="Straight Connector 39">
                 <a:extLst>
                   <a:ext uri="{FF2B5EF4-FFF2-40B4-BE49-F238E27FC236}">
-                    <a16:creationId xmlns:a16="http://schemas.microsoft.com/office/drawing/2014/main" id="{13B7FE99-95CF-45D5-966B-87A979B93431}"/>
+                    <a16:creationId xmlns:a16="http://schemas.microsoft.com/office/drawing/2014/main" xmlns="" id="{13B7FE99-95CF-45D5-966B-87A979B93431}"/>
                   </a:ext>
                 </a:extLst>
               </p:cNvPr>
@@ -11726,7 +11726,7 @@
               <p:cNvPr id="41" name="Straight Connector 40">
                 <a:extLst>
                   <a:ext uri="{FF2B5EF4-FFF2-40B4-BE49-F238E27FC236}">
-                    <a16:creationId xmlns:a16="http://schemas.microsoft.com/office/drawing/2014/main" id="{71BBA69B-19FF-4ADB-A739-AD8136A5F0A6}"/>
+                    <a16:creationId xmlns:a16="http://schemas.microsoft.com/office/drawing/2014/main" xmlns="" id="{71BBA69B-19FF-4ADB-A739-AD8136A5F0A6}"/>
                   </a:ext>
                 </a:extLst>
               </p:cNvPr>
@@ -11771,7 +11771,7 @@
             <p:cNvPr id="35" name="Straight Connector 34">
               <a:extLst>
                 <a:ext uri="{FF2B5EF4-FFF2-40B4-BE49-F238E27FC236}">
-                  <a16:creationId xmlns:a16="http://schemas.microsoft.com/office/drawing/2014/main" id="{BFD1D86B-562B-40B2-8E46-34233EFEE7FC}"/>
+                  <a16:creationId xmlns:a16="http://schemas.microsoft.com/office/drawing/2014/main" xmlns="" id="{BFD1D86B-562B-40B2-8E46-34233EFEE7FC}"/>
                 </a:ext>
               </a:extLst>
             </p:cNvPr>
@@ -11817,7 +11817,7 @@
             <p:cNvPr id="36" name="Rectangle: Rounded Corners 35">
               <a:extLst>
                 <a:ext uri="{FF2B5EF4-FFF2-40B4-BE49-F238E27FC236}">
-                  <a16:creationId xmlns:a16="http://schemas.microsoft.com/office/drawing/2014/main" id="{388C17BD-16A1-43C5-BFFA-2FF9174719E1}"/>
+                  <a16:creationId xmlns:a16="http://schemas.microsoft.com/office/drawing/2014/main" xmlns="" id="{388C17BD-16A1-43C5-BFFA-2FF9174719E1}"/>
                 </a:ext>
               </a:extLst>
             </p:cNvPr>
@@ -11871,7 +11871,7 @@
             <p:cNvPr id="37" name="Group 36">
               <a:extLst>
                 <a:ext uri="{FF2B5EF4-FFF2-40B4-BE49-F238E27FC236}">
-                  <a16:creationId xmlns:a16="http://schemas.microsoft.com/office/drawing/2014/main" id="{1B3B910E-ACFC-4F28-8E28-F02E1588B87E}"/>
+                  <a16:creationId xmlns:a16="http://schemas.microsoft.com/office/drawing/2014/main" xmlns="" id="{1B3B910E-ACFC-4F28-8E28-F02E1588B87E}"/>
                 </a:ext>
               </a:extLst>
             </p:cNvPr>
@@ -11894,7 +11894,7 @@
               <p:cNvPr id="38" name="Straight Connector 37">
                 <a:extLst>
                   <a:ext uri="{FF2B5EF4-FFF2-40B4-BE49-F238E27FC236}">
-                    <a16:creationId xmlns:a16="http://schemas.microsoft.com/office/drawing/2014/main" id="{F57772B6-06C0-4F54-AA94-D3F92DA4716A}"/>
+                    <a16:creationId xmlns:a16="http://schemas.microsoft.com/office/drawing/2014/main" xmlns="" id="{F57772B6-06C0-4F54-AA94-D3F92DA4716A}"/>
                   </a:ext>
                 </a:extLst>
               </p:cNvPr>
@@ -11938,7 +11938,7 @@
               <p:cNvPr id="39" name="Straight Connector 38">
                 <a:extLst>
                   <a:ext uri="{FF2B5EF4-FFF2-40B4-BE49-F238E27FC236}">
-                    <a16:creationId xmlns:a16="http://schemas.microsoft.com/office/drawing/2014/main" id="{23370C1F-7876-4278-AB20-78F6CAA385E2}"/>
+                    <a16:creationId xmlns:a16="http://schemas.microsoft.com/office/drawing/2014/main" xmlns="" id="{23370C1F-7876-4278-AB20-78F6CAA385E2}"/>
                   </a:ext>
                 </a:extLst>
               </p:cNvPr>
@@ -11982,18 +11982,18 @@
     </p:spTree>
     <p:extLst>
       <p:ext uri="{BB962C8B-B14F-4D97-AF65-F5344CB8AC3E}">
-        <p14:creationId xmlns:p14="http://schemas.microsoft.com/office/powerpoint/2010/main" val="3284562556"/>
+        <p14:creationId xmlns:p14="http://schemas.microsoft.com/office/powerpoint/2010/main" xmlns="" val="3284562556"/>
       </p:ext>
     </p:extLst>
   </p:cSld>
   <p:clrMapOvr>
     <a:masterClrMapping/>
   </p:clrMapOvr>
-  <mc:AlternateContent xmlns:mc="http://schemas.openxmlformats.org/markup-compatibility/2006" xmlns:p14="http://schemas.microsoft.com/office/powerpoint/2010/main">
-    <mc:Choice Requires="p14">
+  <mc:AlternateContent xmlns:mc="http://schemas.openxmlformats.org/markup-compatibility/2006">
+    <mc:Choice xmlns:p14="http://schemas.microsoft.com/office/powerpoint/2010/main" xmlns="" Requires="p14">
       <p:transition spd="slow" p14:dur="2000" advClick="0" advTm="5000"/>
     </mc:Choice>
-    <mc:Fallback xmlns="">
+    <mc:Fallback>
       <p:transition spd="slow" advClick="0" advTm="5000"/>
     </mc:Fallback>
   </mc:AlternateContent>
@@ -12022,7 +12022,7 @@
           <p:cNvPr id="8" name="Slide Number">
             <a:extLst>
               <a:ext uri="{FF2B5EF4-FFF2-40B4-BE49-F238E27FC236}">
-                <a16:creationId xmlns:a16="http://schemas.microsoft.com/office/drawing/2014/main" id="{509D954E-A844-4072-A556-DE584BEB9321}"/>
+                <a16:creationId xmlns:a16="http://schemas.microsoft.com/office/drawing/2014/main" xmlns="" id="{509D954E-A844-4072-A556-DE584BEB9321}"/>
               </a:ext>
             </a:extLst>
           </p:cNvPr>
@@ -12064,7 +12064,7 @@
           <p:cNvPr id="6" name="Code Box">
             <a:extLst>
               <a:ext uri="{FF2B5EF4-FFF2-40B4-BE49-F238E27FC236}">
-                <a16:creationId xmlns:a16="http://schemas.microsoft.com/office/drawing/2014/main" id="{3278A82F-5546-4977-9F75-2A933B415945}"/>
+                <a16:creationId xmlns:a16="http://schemas.microsoft.com/office/drawing/2014/main" xmlns="" id="{3278A82F-5546-4977-9F75-2A933B415945}"/>
               </a:ext>
             </a:extLst>
           </p:cNvPr>
@@ -12151,7 +12151,7 @@
           <p:cNvPr id="21" name="Slide Body Text">
             <a:extLst>
               <a:ext uri="{FF2B5EF4-FFF2-40B4-BE49-F238E27FC236}">
-                <a16:creationId xmlns:a16="http://schemas.microsoft.com/office/drawing/2014/main" id="{04F318BE-2BAD-4677-871C-D78A4BF0CBA6}"/>
+                <a16:creationId xmlns:a16="http://schemas.microsoft.com/office/drawing/2014/main" xmlns="" id="{04F318BE-2BAD-4677-871C-D78A4BF0CBA6}"/>
               </a:ext>
             </a:extLst>
           </p:cNvPr>
@@ -12198,7 +12198,7 @@
           <p:cNvPr id="9" name="Rectangle Top">
             <a:extLst>
               <a:ext uri="{FF2B5EF4-FFF2-40B4-BE49-F238E27FC236}">
-                <a16:creationId xmlns:a16="http://schemas.microsoft.com/office/drawing/2014/main" id="{A15CE03A-0933-4E5D-9EA1-718D4F802FFC}"/>
+                <a16:creationId xmlns:a16="http://schemas.microsoft.com/office/drawing/2014/main" xmlns="" id="{A15CE03A-0933-4E5D-9EA1-718D4F802FFC}"/>
               </a:ext>
             </a:extLst>
           </p:cNvPr>
@@ -12279,7 +12279,7 @@
           <p:cNvPr id="10" name="Logo Software University" descr="Software University logo">
             <a:extLst>
               <a:ext uri="{FF2B5EF4-FFF2-40B4-BE49-F238E27FC236}">
-                <a16:creationId xmlns:a16="http://schemas.microsoft.com/office/drawing/2014/main" id="{8C01D7AF-7CBD-46E1-99F3-8EB60E838D91}"/>
+                <a16:creationId xmlns:a16="http://schemas.microsoft.com/office/drawing/2014/main" xmlns="" id="{8C01D7AF-7CBD-46E1-99F3-8EB60E838D91}"/>
               </a:ext>
             </a:extLst>
           </p:cNvPr>
@@ -12292,7 +12292,7 @@
           <a:blip r:embed="rId2" cstate="print">
             <a:extLst>
               <a:ext uri="{28A0092B-C50C-407E-A947-70E740481C1C}">
-                <a14:useLocalDpi xmlns:a14="http://schemas.microsoft.com/office/drawing/2010/main" val="0"/>
+                <a14:useLocalDpi xmlns:a14="http://schemas.microsoft.com/office/drawing/2010/main" xmlns="" val="0"/>
               </a:ext>
             </a:extLst>
           </a:blip>
@@ -12315,7 +12315,7 @@
           <p:cNvPr id="11" name="Slide Title">
             <a:extLst>
               <a:ext uri="{FF2B5EF4-FFF2-40B4-BE49-F238E27FC236}">
-                <a16:creationId xmlns:a16="http://schemas.microsoft.com/office/drawing/2014/main" id="{47D60833-F0A9-4F29-8C06-A963A7C8BE93}"/>
+                <a16:creationId xmlns:a16="http://schemas.microsoft.com/office/drawing/2014/main" xmlns="" id="{47D60833-F0A9-4F29-8C06-A963A7C8BE93}"/>
               </a:ext>
             </a:extLst>
           </p:cNvPr>
@@ -12354,18 +12354,18 @@
     </p:spTree>
     <p:extLst>
       <p:ext uri="{BB962C8B-B14F-4D97-AF65-F5344CB8AC3E}">
-        <p14:creationId xmlns:p14="http://schemas.microsoft.com/office/powerpoint/2010/main" val="1000829826"/>
+        <p14:creationId xmlns:p14="http://schemas.microsoft.com/office/powerpoint/2010/main" xmlns="" val="1000829826"/>
       </p:ext>
     </p:extLst>
   </p:cSld>
   <p:clrMapOvr>
     <a:masterClrMapping/>
   </p:clrMapOvr>
-  <mc:AlternateContent xmlns:mc="http://schemas.openxmlformats.org/markup-compatibility/2006" xmlns:p14="http://schemas.microsoft.com/office/powerpoint/2010/main">
-    <mc:Choice Requires="p14">
+  <mc:AlternateContent xmlns:mc="http://schemas.openxmlformats.org/markup-compatibility/2006">
+    <mc:Choice xmlns:p14="http://schemas.microsoft.com/office/powerpoint/2010/main" xmlns="" Requires="p14">
       <p:transition spd="slow" p14:dur="2000" advClick="0" advTm="5000"/>
     </mc:Choice>
-    <mc:Fallback xmlns="">
+    <mc:Fallback>
       <p:transition spd="slow" advClick="0" advTm="5000"/>
     </mc:Fallback>
   </mc:AlternateContent>
@@ -12394,7 +12394,7 @@
           <p:cNvPr id="10" name="Slide Number">
             <a:extLst>
               <a:ext uri="{FF2B5EF4-FFF2-40B4-BE49-F238E27FC236}">
-                <a16:creationId xmlns:a16="http://schemas.microsoft.com/office/drawing/2014/main" id="{39DDE17E-5472-41F3-AF5F-54DFF10DC63C}"/>
+                <a16:creationId xmlns:a16="http://schemas.microsoft.com/office/drawing/2014/main" xmlns="" id="{39DDE17E-5472-41F3-AF5F-54DFF10DC63C}"/>
               </a:ext>
             </a:extLst>
           </p:cNvPr>
@@ -12436,7 +12436,7 @@
           <p:cNvPr id="9" name="Picture SoftUni Mascot" descr="SoftUni mascot with laptop">
             <a:extLst>
               <a:ext uri="{FF2B5EF4-FFF2-40B4-BE49-F238E27FC236}">
-                <a16:creationId xmlns:a16="http://schemas.microsoft.com/office/drawing/2014/main" id="{DC4365F6-D2C1-47B4-8477-38FD2C7711AA}"/>
+                <a16:creationId xmlns:a16="http://schemas.microsoft.com/office/drawing/2014/main" xmlns="" id="{DC4365F6-D2C1-47B4-8477-38FD2C7711AA}"/>
               </a:ext>
             </a:extLst>
           </p:cNvPr>
@@ -12449,7 +12449,7 @@
           <a:blip r:embed="rId2" cstate="print">
             <a:extLst>
               <a:ext uri="{28A0092B-C50C-407E-A947-70E740481C1C}">
-                <a14:useLocalDpi xmlns:a14="http://schemas.microsoft.com/office/drawing/2010/main" val="0"/>
+                <a14:useLocalDpi xmlns:a14="http://schemas.microsoft.com/office/drawing/2010/main" xmlns="" val="0"/>
               </a:ext>
             </a:extLst>
           </a:blip>
@@ -12472,7 +12472,7 @@
           <p:cNvPr id="23" name="Slide Body Text">
             <a:extLst>
               <a:ext uri="{FF2B5EF4-FFF2-40B4-BE49-F238E27FC236}">
-                <a16:creationId xmlns:a16="http://schemas.microsoft.com/office/drawing/2014/main" id="{889D93F4-ABFA-46BF-8E5D-FE6562ACB20F}"/>
+                <a16:creationId xmlns:a16="http://schemas.microsoft.com/office/drawing/2014/main" xmlns="" id="{889D93F4-ABFA-46BF-8E5D-FE6562ACB20F}"/>
               </a:ext>
             </a:extLst>
           </p:cNvPr>
@@ -12563,7 +12563,7 @@
           <p:cNvPr id="8" name="Rectangle Top">
             <a:extLst>
               <a:ext uri="{FF2B5EF4-FFF2-40B4-BE49-F238E27FC236}">
-                <a16:creationId xmlns:a16="http://schemas.microsoft.com/office/drawing/2014/main" id="{930E0800-9260-4369-8330-8264DD33C5CE}"/>
+                <a16:creationId xmlns:a16="http://schemas.microsoft.com/office/drawing/2014/main" xmlns="" id="{930E0800-9260-4369-8330-8264DD33C5CE}"/>
               </a:ext>
             </a:extLst>
           </p:cNvPr>
@@ -12644,7 +12644,7 @@
           <p:cNvPr id="11" name="Logo Software University" descr="Software University logo">
             <a:extLst>
               <a:ext uri="{FF2B5EF4-FFF2-40B4-BE49-F238E27FC236}">
-                <a16:creationId xmlns:a16="http://schemas.microsoft.com/office/drawing/2014/main" id="{14F779A7-4A91-448B-BEFA-956C70A1C22F}"/>
+                <a16:creationId xmlns:a16="http://schemas.microsoft.com/office/drawing/2014/main" xmlns="" id="{14F779A7-4A91-448B-BEFA-956C70A1C22F}"/>
               </a:ext>
             </a:extLst>
           </p:cNvPr>
@@ -12657,7 +12657,7 @@
           <a:blip r:embed="rId3" cstate="print">
             <a:extLst>
               <a:ext uri="{28A0092B-C50C-407E-A947-70E740481C1C}">
-                <a14:useLocalDpi xmlns:a14="http://schemas.microsoft.com/office/drawing/2010/main" val="0"/>
+                <a14:useLocalDpi xmlns:a14="http://schemas.microsoft.com/office/drawing/2010/main" xmlns="" val="0"/>
               </a:ext>
             </a:extLst>
           </a:blip>
@@ -12680,7 +12680,7 @@
           <p:cNvPr id="13" name="Slide Title">
             <a:extLst>
               <a:ext uri="{FF2B5EF4-FFF2-40B4-BE49-F238E27FC236}">
-                <a16:creationId xmlns:a16="http://schemas.microsoft.com/office/drawing/2014/main" id="{357D7BE1-6358-42CC-94F3-7BCDD91DCB6D}"/>
+                <a16:creationId xmlns:a16="http://schemas.microsoft.com/office/drawing/2014/main" xmlns="" id="{357D7BE1-6358-42CC-94F3-7BCDD91DCB6D}"/>
               </a:ext>
             </a:extLst>
           </p:cNvPr>
@@ -12719,18 +12719,18 @@
     </p:spTree>
     <p:extLst>
       <p:ext uri="{BB962C8B-B14F-4D97-AF65-F5344CB8AC3E}">
-        <p14:creationId xmlns:p14="http://schemas.microsoft.com/office/powerpoint/2010/main" val="1028724482"/>
+        <p14:creationId xmlns:p14="http://schemas.microsoft.com/office/powerpoint/2010/main" xmlns="" val="1028724482"/>
       </p:ext>
     </p:extLst>
   </p:cSld>
   <p:clrMapOvr>
     <a:masterClrMapping/>
   </p:clrMapOvr>
-  <mc:AlternateContent xmlns:mc="http://schemas.openxmlformats.org/markup-compatibility/2006" xmlns:p14="http://schemas.microsoft.com/office/powerpoint/2010/main">
-    <mc:Choice Requires="p14">
+  <mc:AlternateContent xmlns:mc="http://schemas.openxmlformats.org/markup-compatibility/2006">
+    <mc:Choice xmlns:p14="http://schemas.microsoft.com/office/powerpoint/2010/main" xmlns="" Requires="p14">
       <p:transition spd="slow" p14:dur="2000" advClick="0" advTm="5000"/>
     </mc:Choice>
-    <mc:Fallback xmlns="">
+    <mc:Fallback>
       <p:transition spd="slow" advClick="0" advTm="5000"/>
     </mc:Fallback>
   </mc:AlternateContent>
@@ -12839,7 +12839,7 @@
           <p:cNvPr id="11" name="Slide Number">
             <a:extLst>
               <a:ext uri="{FF2B5EF4-FFF2-40B4-BE49-F238E27FC236}">
-                <a16:creationId xmlns:a16="http://schemas.microsoft.com/office/drawing/2014/main" id="{6750ECE4-94E0-469B-B8E4-562792823B0F}"/>
+                <a16:creationId xmlns:a16="http://schemas.microsoft.com/office/drawing/2014/main" xmlns="" id="{6750ECE4-94E0-469B-B8E4-562792823B0F}"/>
               </a:ext>
             </a:extLst>
           </p:cNvPr>
@@ -12962,7 +12962,7 @@
           <p:cNvPr id="12" name="Logo Software University Down" descr="Software University logo">
             <a:extLst>
               <a:ext uri="{FF2B5EF4-FFF2-40B4-BE49-F238E27FC236}">
-                <a16:creationId xmlns:a16="http://schemas.microsoft.com/office/drawing/2014/main" id="{7028D2F0-1E67-414B-A93D-D3F8F131A132}"/>
+                <a16:creationId xmlns:a16="http://schemas.microsoft.com/office/drawing/2014/main" xmlns="" id="{7028D2F0-1E67-414B-A93D-D3F8F131A132}"/>
               </a:ext>
             </a:extLst>
           </p:cNvPr>
@@ -12975,7 +12975,7 @@
           <a:blip r:embed="rId2" cstate="print">
             <a:extLst>
               <a:ext uri="{28A0092B-C50C-407E-A947-70E740481C1C}">
-                <a14:useLocalDpi xmlns:a14="http://schemas.microsoft.com/office/drawing/2010/main" val="0"/>
+                <a14:useLocalDpi xmlns:a14="http://schemas.microsoft.com/office/drawing/2010/main" xmlns="" val="0"/>
               </a:ext>
             </a:extLst>
           </a:blip>
@@ -12998,7 +12998,7 @@
           <p:cNvPr id="10" name="Text Placeholder Right">
             <a:extLst>
               <a:ext uri="{FF2B5EF4-FFF2-40B4-BE49-F238E27FC236}">
-                <a16:creationId xmlns:a16="http://schemas.microsoft.com/office/drawing/2014/main" id="{AF69A59F-C564-4A04-B1CC-31C261499991}"/>
+                <a16:creationId xmlns:a16="http://schemas.microsoft.com/office/drawing/2014/main" xmlns="" id="{AF69A59F-C564-4A04-B1CC-31C261499991}"/>
               </a:ext>
             </a:extLst>
           </p:cNvPr>
@@ -13076,7 +13076,7 @@
           <p:cNvPr id="9" name="Text Placeholder Left">
             <a:extLst>
               <a:ext uri="{FF2B5EF4-FFF2-40B4-BE49-F238E27FC236}">
-                <a16:creationId xmlns:a16="http://schemas.microsoft.com/office/drawing/2014/main" id="{C8A626D2-456B-41EF-9818-EA8DD7E314DA}"/>
+                <a16:creationId xmlns:a16="http://schemas.microsoft.com/office/drawing/2014/main" xmlns="" id="{C8A626D2-456B-41EF-9818-EA8DD7E314DA}"/>
               </a:ext>
             </a:extLst>
           </p:cNvPr>
@@ -13154,7 +13154,7 @@
           <p:cNvPr id="13" name="Rectangle Top">
             <a:extLst>
               <a:ext uri="{FF2B5EF4-FFF2-40B4-BE49-F238E27FC236}">
-                <a16:creationId xmlns:a16="http://schemas.microsoft.com/office/drawing/2014/main" id="{E03301DA-D0AF-46FD-8740-2F761250203A}"/>
+                <a16:creationId xmlns:a16="http://schemas.microsoft.com/office/drawing/2014/main" xmlns="" id="{E03301DA-D0AF-46FD-8740-2F761250203A}"/>
               </a:ext>
             </a:extLst>
           </p:cNvPr>
@@ -13235,7 +13235,7 @@
           <p:cNvPr id="14" name="Logo Software University" descr="Software University logo">
             <a:extLst>
               <a:ext uri="{FF2B5EF4-FFF2-40B4-BE49-F238E27FC236}">
-                <a16:creationId xmlns:a16="http://schemas.microsoft.com/office/drawing/2014/main" id="{19A67BB9-D880-4EAD-B90E-89C4219BFC0B}"/>
+                <a16:creationId xmlns:a16="http://schemas.microsoft.com/office/drawing/2014/main" xmlns="" id="{19A67BB9-D880-4EAD-B90E-89C4219BFC0B}"/>
               </a:ext>
             </a:extLst>
           </p:cNvPr>
@@ -13248,7 +13248,7 @@
           <a:blip r:embed="rId3" cstate="print">
             <a:extLst>
               <a:ext uri="{28A0092B-C50C-407E-A947-70E740481C1C}">
-                <a14:useLocalDpi xmlns:a14="http://schemas.microsoft.com/office/drawing/2010/main" val="0"/>
+                <a14:useLocalDpi xmlns:a14="http://schemas.microsoft.com/office/drawing/2010/main" xmlns="" val="0"/>
               </a:ext>
             </a:extLst>
           </a:blip>
@@ -13271,7 +13271,7 @@
           <p:cNvPr id="15" name="Slide Title">
             <a:extLst>
               <a:ext uri="{FF2B5EF4-FFF2-40B4-BE49-F238E27FC236}">
-                <a16:creationId xmlns:a16="http://schemas.microsoft.com/office/drawing/2014/main" id="{EA9A94D1-F9F6-4D7B-85E3-896A987B6A4D}"/>
+                <a16:creationId xmlns:a16="http://schemas.microsoft.com/office/drawing/2014/main" xmlns="" id="{EA9A94D1-F9F6-4D7B-85E3-896A987B6A4D}"/>
               </a:ext>
             </a:extLst>
           </p:cNvPr>
@@ -13310,24 +13310,24 @@
     </p:spTree>
     <p:extLst>
       <p:ext uri="{BB962C8B-B14F-4D97-AF65-F5344CB8AC3E}">
-        <p14:creationId xmlns:p14="http://schemas.microsoft.com/office/powerpoint/2010/main" val="3044033461"/>
+        <p14:creationId xmlns:p14="http://schemas.microsoft.com/office/powerpoint/2010/main" xmlns="" val="3044033461"/>
       </p:ext>
     </p:extLst>
   </p:cSld>
   <p:clrMapOvr>
     <a:masterClrMapping/>
   </p:clrMapOvr>
-  <mc:AlternateContent xmlns:mc="http://schemas.openxmlformats.org/markup-compatibility/2006" xmlns:p14="http://schemas.microsoft.com/office/powerpoint/2010/main">
-    <mc:Choice Requires="p14">
+  <mc:AlternateContent xmlns:mc="http://schemas.openxmlformats.org/markup-compatibility/2006">
+    <mc:Choice xmlns:p14="http://schemas.microsoft.com/office/powerpoint/2010/main" xmlns="" Requires="p14">
       <p:transition spd="slow" p14:dur="2000" advClick="0" advTm="5000"/>
     </mc:Choice>
-    <mc:Fallback xmlns="">
+    <mc:Fallback>
       <p:transition spd="slow" advClick="0" advTm="5000"/>
     </mc:Fallback>
   </mc:AlternateContent>
   <p:extLst>
     <p:ext uri="{DCECCB84-F9BA-43D5-87BE-67443E8EF086}">
-      <p15:sldGuideLst xmlns:p15="http://schemas.microsoft.com/office/powerpoint/2012/main">
+      <p15:sldGuideLst xmlns:p15="http://schemas.microsoft.com/office/powerpoint/2012/main" xmlns="">
         <p15:guide id="1" orient="horz" pos="2160">
           <p15:clr>
             <a:srgbClr val="FBAE40"/>
@@ -13374,7 +13374,7 @@
           <p:cNvPr id="4" name="Picture Background" descr="SoftUni Background">
             <a:extLst>
               <a:ext uri="{FF2B5EF4-FFF2-40B4-BE49-F238E27FC236}">
-                <a16:creationId xmlns:a16="http://schemas.microsoft.com/office/drawing/2014/main" id="{5BE90A63-DDD9-4B3B-A234-DF69B9BC812F}"/>
+                <a16:creationId xmlns:a16="http://schemas.microsoft.com/office/drawing/2014/main" xmlns="" id="{5BE90A63-DDD9-4B3B-A234-DF69B9BC812F}"/>
               </a:ext>
             </a:extLst>
           </p:cNvPr>
@@ -13403,7 +13403,7 @@
           <p:cNvPr id="11" name="Slide Body Text">
             <a:extLst>
               <a:ext uri="{FF2B5EF4-FFF2-40B4-BE49-F238E27FC236}">
-                <a16:creationId xmlns:a16="http://schemas.microsoft.com/office/drawing/2014/main" id="{90CBFB32-9F46-4F2F-8A54-9EE8BED27855}"/>
+                <a16:creationId xmlns:a16="http://schemas.microsoft.com/office/drawing/2014/main" xmlns="" id="{90CBFB32-9F46-4F2F-8A54-9EE8BED27855}"/>
               </a:ext>
             </a:extLst>
           </p:cNvPr>
@@ -13471,7 +13471,7 @@
           <p:cNvPr id="10" name="Slide Title">
             <a:extLst>
               <a:ext uri="{FF2B5EF4-FFF2-40B4-BE49-F238E27FC236}">
-                <a16:creationId xmlns:a16="http://schemas.microsoft.com/office/drawing/2014/main" id="{B770C392-3003-4C35-9625-BB041F8257BA}"/>
+                <a16:creationId xmlns:a16="http://schemas.microsoft.com/office/drawing/2014/main" xmlns="" id="{B770C392-3003-4C35-9625-BB041F8257BA}"/>
               </a:ext>
             </a:extLst>
           </p:cNvPr>
@@ -13508,7 +13508,7 @@
     </p:spTree>
     <p:extLst>
       <p:ext uri="{BB962C8B-B14F-4D97-AF65-F5344CB8AC3E}">
-        <p14:creationId xmlns:p14="http://schemas.microsoft.com/office/powerpoint/2010/main" val="156789181"/>
+        <p14:creationId xmlns:p14="http://schemas.microsoft.com/office/powerpoint/2010/main" xmlns="" val="156789181"/>
       </p:ext>
     </p:extLst>
   </p:cSld>
@@ -13531,11 +13531,11 @@
     <p:sldLayoutId id="2147483695" r:id="rId15"/>
     <p:sldLayoutId id="2147483696" r:id="rId16"/>
   </p:sldLayoutIdLst>
-  <mc:AlternateContent xmlns:mc="http://schemas.openxmlformats.org/markup-compatibility/2006" xmlns:p14="http://schemas.microsoft.com/office/powerpoint/2010/main">
-    <mc:Choice Requires="p14">
+  <mc:AlternateContent xmlns:mc="http://schemas.openxmlformats.org/markup-compatibility/2006">
+    <mc:Choice xmlns:p14="http://schemas.microsoft.com/office/powerpoint/2010/main" xmlns="" Requires="p14">
       <p:transition spd="slow" p14:dur="2000" advClick="0" advTm="5000"/>
     </mc:Choice>
-    <mc:Fallback xmlns="">
+    <mc:Fallback>
       <p:transition spd="slow" advClick="0" advTm="5000"/>
     </mc:Fallback>
   </mc:AlternateContent>
@@ -13822,7 +13822,7 @@
   </p:txStyles>
   <p:extLst>
     <p:ext uri="{27BBF7A9-308A-43DC-89C8-2F10F3537804}">
-      <p15:sldGuideLst xmlns:p15="http://schemas.microsoft.com/office/powerpoint/2012/main">
+      <p15:sldGuideLst xmlns:p15="http://schemas.microsoft.com/office/powerpoint/2012/main" xmlns="">
         <p15:guide id="1" orient="horz" pos="2160">
           <p15:clr>
             <a:srgbClr val="F26B43"/>
@@ -13918,7 +13918,7 @@
           <p:cNvPr id="10" name="Author Position">
             <a:extLst>
               <a:ext uri="{FF2B5EF4-FFF2-40B4-BE49-F238E27FC236}">
-                <a16:creationId xmlns:a16="http://schemas.microsoft.com/office/drawing/2014/main" id="{F585BC4C-0F13-4FD4-8F23-99FD46618370}"/>
+                <a16:creationId xmlns:a16="http://schemas.microsoft.com/office/drawing/2014/main" xmlns="" id="{F585BC4C-0F13-4FD4-8F23-99FD46618370}"/>
               </a:ext>
             </a:extLst>
           </p:cNvPr>
@@ -13951,7 +13951,7 @@
           <p:cNvPr id="9" name="Author Name">
             <a:extLst>
               <a:ext uri="{FF2B5EF4-FFF2-40B4-BE49-F238E27FC236}">
-                <a16:creationId xmlns:a16="http://schemas.microsoft.com/office/drawing/2014/main" id="{FA396BB6-2053-4690-9672-BC528007D370}"/>
+                <a16:creationId xmlns:a16="http://schemas.microsoft.com/office/drawing/2014/main" xmlns="" id="{FA396BB6-2053-4690-9672-BC528007D370}"/>
               </a:ext>
             </a:extLst>
           </p:cNvPr>
@@ -13984,7 +13984,7 @@
           <p:cNvPr id="3" name="Presentation Subtitle">
             <a:extLst>
               <a:ext uri="{FF2B5EF4-FFF2-40B4-BE49-F238E27FC236}">
-                <a16:creationId xmlns:a16="http://schemas.microsoft.com/office/drawing/2014/main" id="{A004DC04-DA2A-41C0-8578-4B8D2F08EA7D}"/>
+                <a16:creationId xmlns:a16="http://schemas.microsoft.com/office/drawing/2014/main" xmlns="" id="{A004DC04-DA2A-41C0-8578-4B8D2F08EA7D}"/>
               </a:ext>
             </a:extLst>
           </p:cNvPr>
@@ -14020,7 +14020,7 @@
           <p:cNvPr id="16" name="Title 15">
             <a:extLst>
               <a:ext uri="{FF2B5EF4-FFF2-40B4-BE49-F238E27FC236}">
-                <a16:creationId xmlns:a16="http://schemas.microsoft.com/office/drawing/2014/main" id="{09D526E5-16F9-CDC3-F025-1D308EB5C234}"/>
+                <a16:creationId xmlns:a16="http://schemas.microsoft.com/office/drawing/2014/main" xmlns="" id="{09D526E5-16F9-CDC3-F025-1D308EB5C234}"/>
               </a:ext>
             </a:extLst>
           </p:cNvPr>
@@ -14084,18 +14084,18 @@
     </p:spTree>
     <p:extLst>
       <p:ext uri="{BB962C8B-B14F-4D97-AF65-F5344CB8AC3E}">
-        <p14:creationId xmlns:p14="http://schemas.microsoft.com/office/powerpoint/2010/main" val="3666405375"/>
+        <p14:creationId xmlns:p14="http://schemas.microsoft.com/office/powerpoint/2010/main" xmlns="" val="3666405375"/>
       </p:ext>
     </p:extLst>
   </p:cSld>
   <p:clrMapOvr>
     <a:masterClrMapping/>
   </p:clrMapOvr>
-  <mc:AlternateContent xmlns:mc="http://schemas.openxmlformats.org/markup-compatibility/2006" xmlns:p14="http://schemas.microsoft.com/office/powerpoint/2010/main">
-    <mc:Choice Requires="p14">
+  <mc:AlternateContent xmlns:mc="http://schemas.openxmlformats.org/markup-compatibility/2006">
+    <mc:Choice xmlns:p14="http://schemas.microsoft.com/office/powerpoint/2010/main" xmlns="" Requires="p14">
       <p:transition spd="slow" p14:dur="2000" advClick="0" advTm="5000"/>
     </mc:Choice>
-    <mc:Fallback xmlns="">
+    <mc:Fallback>
       <p:transition spd="slow" advClick="0" advTm="5000"/>
     </mc:Fallback>
   </mc:AlternateContent>
@@ -14448,11 +14448,11 @@
   <p:clrMapOvr>
     <a:masterClrMapping/>
   </p:clrMapOvr>
-  <mc:AlternateContent xmlns:mc="http://schemas.openxmlformats.org/markup-compatibility/2006" xmlns:p14="http://schemas.microsoft.com/office/powerpoint/2010/main">
-    <mc:Choice Requires="p14">
+  <mc:AlternateContent xmlns:mc="http://schemas.openxmlformats.org/markup-compatibility/2006">
+    <mc:Choice xmlns:p14="http://schemas.microsoft.com/office/powerpoint/2010/main" xmlns="" Requires="p14">
       <p:transition spd="slow" p14:dur="2000" advClick="0" advTm="5000"/>
     </mc:Choice>
-    <mc:Fallback xmlns="">
+    <mc:Fallback>
       <p:transition spd="slow" advClick="0" advTm="5000"/>
     </mc:Fallback>
   </mc:AlternateContent>
@@ -14693,7 +14693,13 @@
               <a:t>натиснете </a:t>
             </a:r>
             <a:r>
-              <a:rPr lang="en-US" sz="3500" b="1" dirty="0">
+              <a:rPr lang="en-US" sz="3500" dirty="0" smtClean="0">
+                <a:latin typeface="Consolas" pitchFamily="49" charset="0"/>
+              </a:rPr>
+              <a:t>[</a:t>
+            </a:r>
+            <a:r>
+              <a:rPr lang="en-US" sz="3500" b="1" dirty="0" smtClean="0">
                 <a:solidFill>
                   <a:schemeClr val="bg1"/>
                 </a:solidFill>
@@ -14701,6 +14707,18 @@
               </a:rPr>
               <a:t>Click to Add</a:t>
             </a:r>
+            <a:r>
+              <a:rPr lang="en-US" sz="3500" dirty="0" smtClean="0">
+                <a:latin typeface="Consolas" pitchFamily="49" charset="0"/>
+              </a:rPr>
+              <a:t>]</a:t>
+            </a:r>
+            <a:endParaRPr lang="en-US" sz="3500" b="1" dirty="0">
+              <a:solidFill>
+                <a:schemeClr val="bg1"/>
+              </a:solidFill>
+              <a:latin typeface="Consolas" pitchFamily="49" charset="0"/>
+            </a:endParaRPr>
           </a:p>
           <a:p>
             <a:r>
@@ -14897,7 +14915,13 @@
               <a:t> и изберете </a:t>
             </a:r>
             <a:r>
-              <a:rPr lang="en-US" sz="3500" b="1" dirty="0">
+              <a:rPr lang="en-US" sz="3500" dirty="0" smtClean="0">
+                <a:latin typeface="Consolas" pitchFamily="49" charset="0"/>
+              </a:rPr>
+              <a:t>[</a:t>
+            </a:r>
+            <a:r>
+              <a:rPr lang="en-US" sz="3500" b="1" dirty="0" smtClean="0">
                 <a:solidFill>
                   <a:schemeClr val="bg1"/>
                 </a:solidFill>
@@ -14906,17 +14930,23 @@
               <a:t>Rename</a:t>
             </a:r>
             <a:r>
-              <a:rPr lang="en-US" sz="3500" b="1" dirty="0"/>
+              <a:rPr lang="en-US" sz="3500" b="1" dirty="0" smtClean="0"/>
               <a:t> </a:t>
             </a:r>
             <a:r>
-              <a:rPr lang="en-US" sz="3500" b="1" dirty="0">
+              <a:rPr lang="en-US" sz="3500" b="1" dirty="0" smtClean="0">
                 <a:solidFill>
                   <a:schemeClr val="bg1"/>
                 </a:solidFill>
                 <a:latin typeface="Consolas" pitchFamily="49" charset="0"/>
               </a:rPr>
               <a:t>Field</a:t>
+            </a:r>
+            <a:r>
+              <a:rPr lang="en-US" sz="3500" dirty="0" smtClean="0">
+                <a:latin typeface="Consolas" pitchFamily="49" charset="0"/>
+              </a:rPr>
+              <a:t>]</a:t>
             </a:r>
             <a:endParaRPr lang="ru-RU" sz="3500" dirty="0"/>
           </a:p>
@@ -14986,11 +15016,11 @@
   <p:clrMapOvr>
     <a:masterClrMapping/>
   </p:clrMapOvr>
-  <mc:AlternateContent xmlns:mc="http://schemas.openxmlformats.org/markup-compatibility/2006" xmlns:p14="http://schemas.microsoft.com/office/powerpoint/2010/main">
-    <mc:Choice Requires="p14">
+  <mc:AlternateContent xmlns:mc="http://schemas.openxmlformats.org/markup-compatibility/2006">
+    <mc:Choice xmlns:p14="http://schemas.microsoft.com/office/powerpoint/2010/main" xmlns="" Requires="p14">
       <p:transition spd="slow" p14:dur="2000" advClick="0" advTm="5000"/>
     </mc:Choice>
-    <mc:Fallback xmlns="">
+    <mc:Fallback>
       <p:transition spd="slow" advClick="0" advTm="5000"/>
     </mc:Fallback>
   </mc:AlternateContent>
@@ -15334,25 +15364,46 @@
               <a:t>Натиснете </a:t>
             </a:r>
             <a:r>
-              <a:rPr lang="en-US" sz="3200" b="1" dirty="0">
-                <a:solidFill>
-                  <a:schemeClr val="bg1"/>
-                </a:solidFill>
+              <a:rPr lang="en-US" sz="3200" dirty="0" smtClean="0">
                 <a:latin typeface="Consolas" pitchFamily="49" charset="0"/>
               </a:rPr>
-              <a:t>Click to Add</a:t>
-            </a:r>
-            <a:r>
-              <a:rPr lang="bg-BG" sz="3200" b="1" dirty="0">
+              <a:t>[</a:t>
+            </a:r>
+            <a:r>
+              <a:rPr lang="en-US" sz="3200" b="1" dirty="0" smtClean="0">
                 <a:solidFill>
                   <a:schemeClr val="bg1"/>
                 </a:solidFill>
+                <a:latin typeface="Consolas" pitchFamily="49" charset="0"/>
               </a:rPr>
+              <a:t>Click to </a:t>
+            </a:r>
+            <a:r>
+              <a:rPr lang="en-US" sz="3200" b="1" dirty="0" smtClean="0">
+                <a:solidFill>
+                  <a:schemeClr val="bg1"/>
+                </a:solidFill>
+                <a:latin typeface="Consolas" pitchFamily="49" charset="0"/>
+              </a:rPr>
+              <a:t>Add</a:t>
+            </a:r>
+            <a:r>
+              <a:rPr lang="en-US" sz="3200" dirty="0" smtClean="0">
+                <a:latin typeface="Consolas" pitchFamily="49" charset="0"/>
+              </a:rPr>
+              <a:t>]</a:t>
+            </a:r>
+            <a:r>
+              <a:rPr lang="en-US" sz="3200" dirty="0" smtClean="0"/>
               <a:t> </a:t>
             </a:r>
             <a:r>
+              <a:rPr lang="bg-BG" dirty="0" smtClean="0"/>
+              <a:t>и </a:t>
+            </a:r>
+            <a:r>
               <a:rPr lang="bg-BG" dirty="0"/>
-              <a:t>и от </a:t>
+              <a:t>от </a:t>
             </a:r>
             <a:r>
               <a:rPr lang="bg-BG" b="1" dirty="0">
@@ -15661,11 +15712,11 @@
   <p:clrMapOvr>
     <a:masterClrMapping/>
   </p:clrMapOvr>
-  <mc:AlternateContent xmlns:mc="http://schemas.openxmlformats.org/markup-compatibility/2006" xmlns:p14="http://schemas.microsoft.com/office/powerpoint/2010/main">
-    <mc:Choice Requires="p14">
+  <mc:AlternateContent xmlns:mc="http://schemas.openxmlformats.org/markup-compatibility/2006">
+    <mc:Choice xmlns:p14="http://schemas.microsoft.com/office/powerpoint/2010/main" xmlns="" Requires="p14">
       <p:transition spd="slow" p14:dur="2000" advClick="0" advTm="5000"/>
     </mc:Choice>
-    <mc:Fallback xmlns="">
+    <mc:Fallback>
       <p:transition spd="slow" advClick="0" advTm="5000"/>
     </mc:Fallback>
   </mc:AlternateContent>
@@ -16146,11 +16197,11 @@
   <p:clrMapOvr>
     <a:masterClrMapping/>
   </p:clrMapOvr>
-  <mc:AlternateContent xmlns:mc="http://schemas.openxmlformats.org/markup-compatibility/2006" xmlns:p14="http://schemas.microsoft.com/office/powerpoint/2010/main">
-    <mc:Choice Requires="p14">
+  <mc:AlternateContent xmlns:mc="http://schemas.openxmlformats.org/markup-compatibility/2006">
+    <mc:Choice xmlns:p14="http://schemas.microsoft.com/office/powerpoint/2010/main" xmlns="" Requires="p14">
       <p:transition spd="slow" p14:dur="2000" advClick="0" advTm="5000"/>
     </mc:Choice>
-    <mc:Fallback xmlns="">
+    <mc:Fallback>
       <p:transition spd="slow" advClick="0" advTm="5000"/>
     </mc:Fallback>
   </mc:AlternateContent>
@@ -16329,11 +16380,11 @@
   <p:clrMapOvr>
     <a:masterClrMapping/>
   </p:clrMapOvr>
-  <mc:AlternateContent xmlns:mc="http://schemas.openxmlformats.org/markup-compatibility/2006" xmlns:p14="http://schemas.microsoft.com/office/powerpoint/2010/main">
-    <mc:Choice Requires="p14">
+  <mc:AlternateContent xmlns:mc="http://schemas.openxmlformats.org/markup-compatibility/2006">
+    <mc:Choice xmlns:p14="http://schemas.microsoft.com/office/powerpoint/2010/main" xmlns="" Requires="p14">
       <p:transition spd="slow" p14:dur="2000" advClick="0" advTm="5000"/>
     </mc:Choice>
-    <mc:Fallback xmlns="">
+    <mc:Fallback>
       <p:transition spd="slow" advClick="0" advTm="5000"/>
     </mc:Fallback>
   </mc:AlternateContent>
@@ -16628,11 +16679,11 @@
   <p:clrMapOvr>
     <a:masterClrMapping/>
   </p:clrMapOvr>
-  <mc:AlternateContent xmlns:mc="http://schemas.openxmlformats.org/markup-compatibility/2006" xmlns:p14="http://schemas.microsoft.com/office/powerpoint/2010/main">
-    <mc:Choice Requires="p14">
+  <mc:AlternateContent xmlns:mc="http://schemas.openxmlformats.org/markup-compatibility/2006">
+    <mc:Choice xmlns:p14="http://schemas.microsoft.com/office/powerpoint/2010/main" xmlns="" Requires="p14">
       <p:transition spd="slow" p14:dur="2000" advClick="0" advTm="5000"/>
     </mc:Choice>
-    <mc:Fallback xmlns="">
+    <mc:Fallback>
       <p:transition spd="slow" advClick="0" advTm="5000"/>
     </mc:Fallback>
   </mc:AlternateContent>
@@ -17321,11 +17372,11 @@
   <p:clrMapOvr>
     <a:masterClrMapping/>
   </p:clrMapOvr>
-  <mc:AlternateContent xmlns:mc="http://schemas.openxmlformats.org/markup-compatibility/2006" xmlns:p14="http://schemas.microsoft.com/office/powerpoint/2010/main">
-    <mc:Choice Requires="p14">
+  <mc:AlternateContent xmlns:mc="http://schemas.openxmlformats.org/markup-compatibility/2006">
+    <mc:Choice xmlns:p14="http://schemas.microsoft.com/office/powerpoint/2010/main" xmlns="" Requires="p14">
       <p:transition spd="slow" p14:dur="2000" advClick="0" advTm="5000"/>
     </mc:Choice>
-    <mc:Fallback xmlns="">
+    <mc:Fallback>
       <p:transition spd="slow" advClick="0" advTm="5000"/>
     </mc:Fallback>
   </mc:AlternateContent>
@@ -17554,7 +17605,13 @@
               <a:t>Натиснете </a:t>
             </a:r>
             <a:r>
-              <a:rPr lang="en-US" b="1" dirty="0">
+              <a:rPr lang="en-US" sz="3400" dirty="0" smtClean="0">
+                <a:latin typeface="Consolas" pitchFamily="49" charset="0"/>
+              </a:rPr>
+              <a:t>[</a:t>
+            </a:r>
+            <a:r>
+              <a:rPr lang="en-US" sz="3400" b="1" dirty="0" smtClean="0">
                 <a:solidFill>
                   <a:schemeClr val="bg1"/>
                 </a:solidFill>
@@ -17563,11 +17620,23 @@
               <a:t>File</a:t>
             </a:r>
             <a:r>
-              <a:rPr lang="en-US" dirty="0"/>
+              <a:rPr lang="en-US" sz="3400" dirty="0" smtClean="0">
+                <a:latin typeface="Consolas" pitchFamily="49" charset="0"/>
+              </a:rPr>
+              <a:t>]</a:t>
+            </a:r>
+            <a:r>
+              <a:rPr lang="en-US" sz="3400" dirty="0"/>
               <a:t> &gt; </a:t>
             </a:r>
             <a:r>
-              <a:rPr lang="en-US" b="1" dirty="0">
+              <a:rPr lang="en-US" sz="3400" dirty="0" smtClean="0">
+                <a:latin typeface="Consolas" pitchFamily="49" charset="0"/>
+              </a:rPr>
+              <a:t>[</a:t>
+            </a:r>
+            <a:r>
+              <a:rPr lang="en-US" sz="3400" b="1" dirty="0" smtClean="0">
                 <a:solidFill>
                   <a:schemeClr val="bg1"/>
                 </a:solidFill>
@@ -17575,6 +17644,18 @@
               </a:rPr>
               <a:t>Open</a:t>
             </a:r>
+            <a:r>
+              <a:rPr lang="en-US" sz="3400" dirty="0" smtClean="0">
+                <a:latin typeface="Consolas" pitchFamily="49" charset="0"/>
+              </a:rPr>
+              <a:t>] </a:t>
+            </a:r>
+            <a:endParaRPr lang="en-US" sz="3400" b="1" dirty="0">
+              <a:solidFill>
+                <a:schemeClr val="bg1"/>
+              </a:solidFill>
+              <a:latin typeface="Consolas" pitchFamily="49" charset="0"/>
+            </a:endParaRPr>
           </a:p>
           <a:p>
             <a:r>
@@ -17645,9 +17726,33 @@
             </a:r>
             <a:r>
               <a:rPr lang="bg-BG" dirty="0"/>
-              <a:t>натиснете върху един от наличните източници на данни</a:t>
-            </a:r>
-            <a:endParaRPr lang="en-US" dirty="0"/>
+              <a:t>натиснете върху един от наличните </a:t>
+            </a:r>
+            <a:r>
+              <a:rPr lang="bg-BG" b="1" dirty="0">
+                <a:solidFill>
+                  <a:schemeClr val="bg1"/>
+                </a:solidFill>
+              </a:rPr>
+              <a:t>източници</a:t>
+            </a:r>
+            <a:r>
+              <a:rPr lang="bg-BG" dirty="0"/>
+              <a:t> на </a:t>
+            </a:r>
+            <a:r>
+              <a:rPr lang="bg-BG" b="1" dirty="0">
+                <a:solidFill>
+                  <a:schemeClr val="bg1"/>
+                </a:solidFill>
+              </a:rPr>
+              <a:t>данни</a:t>
+            </a:r>
+            <a:endParaRPr lang="en-US" b="1" dirty="0">
+              <a:solidFill>
+                <a:schemeClr val="bg1"/>
+              </a:solidFill>
+            </a:endParaRPr>
           </a:p>
           <a:p>
             <a:endParaRPr lang="en-US" dirty="0"/>
@@ -17718,11 +17823,11 @@
   <p:clrMapOvr>
     <a:masterClrMapping/>
   </p:clrMapOvr>
-  <mc:AlternateContent xmlns:mc="http://schemas.openxmlformats.org/markup-compatibility/2006" xmlns:p14="http://schemas.microsoft.com/office/powerpoint/2010/main">
-    <mc:Choice Requires="p14">
+  <mc:AlternateContent xmlns:mc="http://schemas.openxmlformats.org/markup-compatibility/2006">
+    <mc:Choice xmlns:p14="http://schemas.microsoft.com/office/powerpoint/2010/main" xmlns="" Requires="p14">
       <p:transition spd="slow" p14:dur="2000" advClick="0" advTm="5000"/>
     </mc:Choice>
-    <mc:Fallback xmlns="">
+    <mc:Fallback>
       <p:transition spd="slow" advClick="0" advTm="5000"/>
     </mc:Fallback>
   </mc:AlternateContent>
@@ -18063,11 +18168,11 @@
   <p:clrMapOvr>
     <a:masterClrMapping/>
   </p:clrMapOvr>
-  <mc:AlternateContent xmlns:mc="http://schemas.openxmlformats.org/markup-compatibility/2006" xmlns:p14="http://schemas.microsoft.com/office/powerpoint/2010/main">
-    <mc:Choice Requires="p14">
+  <mc:AlternateContent xmlns:mc="http://schemas.openxmlformats.org/markup-compatibility/2006">
+    <mc:Choice xmlns:p14="http://schemas.microsoft.com/office/powerpoint/2010/main" xmlns="" Requires="p14">
       <p:transition spd="slow" p14:dur="2000" advClick="0" advTm="5000"/>
     </mc:Choice>
-    <mc:Fallback xmlns="">
+    <mc:Fallback>
       <p:transition spd="slow" advClick="0" advTm="5000"/>
     </mc:Fallback>
   </mc:AlternateContent>
@@ -18431,11 +18536,11 @@
   <p:clrMapOvr>
     <a:masterClrMapping/>
   </p:clrMapOvr>
-  <mc:AlternateContent xmlns:mc="http://schemas.openxmlformats.org/markup-compatibility/2006" xmlns:p14="http://schemas.microsoft.com/office/powerpoint/2010/main">
-    <mc:Choice Requires="p14">
+  <mc:AlternateContent xmlns:mc="http://schemas.openxmlformats.org/markup-compatibility/2006">
+    <mc:Choice xmlns:p14="http://schemas.microsoft.com/office/powerpoint/2010/main" xmlns="" Requires="p14">
       <p:transition spd="slow" p14:dur="2000" advClick="0" advTm="5000"/>
     </mc:Choice>
-    <mc:Fallback xmlns="">
+    <mc:Fallback>
       <p:transition spd="slow" advClick="0" advTm="5000"/>
     </mc:Fallback>
   </mc:AlternateContent>
@@ -18738,7 +18843,7 @@
           <p:cNvPr id="5" name="Slide Number">
             <a:extLst>
               <a:ext uri="{FF2B5EF4-FFF2-40B4-BE49-F238E27FC236}">
-                <a16:creationId xmlns:a16="http://schemas.microsoft.com/office/drawing/2014/main" id="{6A760D59-0056-4F39-B077-DBDBE3D2927E}"/>
+                <a16:creationId xmlns:a16="http://schemas.microsoft.com/office/drawing/2014/main" xmlns="" id="{6A760D59-0056-4F39-B077-DBDBE3D2927E}"/>
               </a:ext>
             </a:extLst>
           </p:cNvPr>
@@ -19209,18 +19314,18 @@
     </p:spTree>
     <p:extLst>
       <p:ext uri="{BB962C8B-B14F-4D97-AF65-F5344CB8AC3E}">
-        <p14:creationId xmlns:p14="http://schemas.microsoft.com/office/powerpoint/2010/main" val="1646986932"/>
+        <p14:creationId xmlns:p14="http://schemas.microsoft.com/office/powerpoint/2010/main" xmlns="" val="1646986932"/>
       </p:ext>
     </p:extLst>
   </p:cSld>
   <p:clrMapOvr>
     <a:masterClrMapping/>
   </p:clrMapOvr>
-  <mc:AlternateContent xmlns:mc="http://schemas.openxmlformats.org/markup-compatibility/2006" xmlns:p14="http://schemas.microsoft.com/office/powerpoint/2010/main">
-    <mc:Choice Requires="p14">
+  <mc:AlternateContent xmlns:mc="http://schemas.openxmlformats.org/markup-compatibility/2006">
+    <mc:Choice xmlns:p14="http://schemas.microsoft.com/office/powerpoint/2010/main" xmlns="" Requires="p14">
       <p:transition spd="slow" p14:dur="2000" advClick="0" advTm="5000"/>
     </mc:Choice>
-    <mc:Fallback xmlns="">
+    <mc:Fallback>
       <p:transition spd="slow" advClick="0" advTm="5000"/>
     </mc:Fallback>
   </mc:AlternateContent>
@@ -19823,11 +19928,11 @@
   <p:clrMapOvr>
     <a:masterClrMapping/>
   </p:clrMapOvr>
-  <mc:AlternateContent xmlns:mc="http://schemas.openxmlformats.org/markup-compatibility/2006" xmlns:p14="http://schemas.microsoft.com/office/powerpoint/2010/main">
-    <mc:Choice Requires="p14">
+  <mc:AlternateContent xmlns:mc="http://schemas.openxmlformats.org/markup-compatibility/2006">
+    <mc:Choice xmlns:p14="http://schemas.microsoft.com/office/powerpoint/2010/main" xmlns="" Requires="p14">
       <p:transition spd="slow" p14:dur="2000" advClick="0" advTm="5000"/>
     </mc:Choice>
-    <mc:Fallback xmlns="">
+    <mc:Fallback>
       <p:transition spd="slow" advClick="0" advTm="5000"/>
     </mc:Fallback>
   </mc:AlternateContent>
@@ -19932,11 +20037,11 @@
   <p:clrMapOvr>
     <a:masterClrMapping/>
   </p:clrMapOvr>
-  <mc:AlternateContent xmlns:mc="http://schemas.openxmlformats.org/markup-compatibility/2006" xmlns:p14="http://schemas.microsoft.com/office/powerpoint/2010/main">
-    <mc:Choice Requires="p14">
+  <mc:AlternateContent xmlns:mc="http://schemas.openxmlformats.org/markup-compatibility/2006">
+    <mc:Choice xmlns:p14="http://schemas.microsoft.com/office/powerpoint/2010/main" xmlns="" Requires="p14">
       <p:transition spd="slow" p14:dur="2000" advClick="0" advTm="5000"/>
     </mc:Choice>
-    <mc:Fallback xmlns="">
+    <mc:Fallback>
       <p:transition spd="slow" advClick="0" advTm="5000"/>
     </mc:Fallback>
   </mc:AlternateContent>
@@ -20063,7 +20168,11 @@
             </a:r>
             <a:r>
               <a:rPr lang="ru-RU" dirty="0"/>
-              <a:t> на елементите, които искаме</a:t>
+              <a:t> на елементите, които </a:t>
+            </a:r>
+            <a:r>
+              <a:rPr lang="ru-RU" dirty="0" smtClean="0"/>
+              <a:t>искаме</a:t>
             </a:r>
             <a:endParaRPr lang="en-US" dirty="0"/>
           </a:p>
@@ -20238,11 +20347,11 @@
   <p:clrMapOvr>
     <a:masterClrMapping/>
   </p:clrMapOvr>
-  <mc:AlternateContent xmlns:mc="http://schemas.openxmlformats.org/markup-compatibility/2006" xmlns:p14="http://schemas.microsoft.com/office/powerpoint/2010/main">
-    <mc:Choice Requires="p14">
+  <mc:AlternateContent xmlns:mc="http://schemas.openxmlformats.org/markup-compatibility/2006">
+    <mc:Choice xmlns:p14="http://schemas.microsoft.com/office/powerpoint/2010/main" xmlns="" Requires="p14">
       <p:transition spd="slow" p14:dur="2000" advClick="0" advTm="5000"/>
     </mc:Choice>
-    <mc:Fallback xmlns="">
+    <mc:Fallback>
       <p:transition spd="slow" advClick="0" advTm="5000"/>
     </mc:Fallback>
   </mc:AlternateContent>
@@ -20684,11 +20793,11 @@
   <p:clrMapOvr>
     <a:masterClrMapping/>
   </p:clrMapOvr>
-  <mc:AlternateContent xmlns:mc="http://schemas.openxmlformats.org/markup-compatibility/2006" xmlns:p14="http://schemas.microsoft.com/office/powerpoint/2010/main">
-    <mc:Choice Requires="p14">
+  <mc:AlternateContent xmlns:mc="http://schemas.openxmlformats.org/markup-compatibility/2006">
+    <mc:Choice xmlns:p14="http://schemas.microsoft.com/office/powerpoint/2010/main" xmlns="" Requires="p14">
       <p:transition spd="slow" p14:dur="2000" advClick="0" advTm="5000"/>
     </mc:Choice>
-    <mc:Fallback xmlns="">
+    <mc:Fallback>
       <p:transition spd="slow" advClick="0" advTm="5000"/>
     </mc:Fallback>
   </mc:AlternateContent>
@@ -20931,13 +21040,25 @@
               <a:t>изберете </a:t>
             </a:r>
             <a:r>
-              <a:rPr lang="en-US" sz="3000" b="1" dirty="0">
+              <a:rPr lang="en-US" sz="3000" dirty="0" smtClean="0">
+                <a:latin typeface="Consolas" pitchFamily="49" charset="0"/>
+              </a:rPr>
+              <a:t>[</a:t>
+            </a:r>
+            <a:r>
+              <a:rPr lang="en-US" sz="3000" b="1" dirty="0" smtClean="0">
                 <a:solidFill>
                   <a:schemeClr val="bg1"/>
                 </a:solidFill>
                 <a:latin typeface="Consolas" pitchFamily="49" charset="0"/>
               </a:rPr>
               <a:t>Form</a:t>
+            </a:r>
+            <a:r>
+              <a:rPr lang="en-US" sz="3000" dirty="0" smtClean="0">
+                <a:latin typeface="Consolas" pitchFamily="49" charset="0"/>
+              </a:rPr>
+              <a:t>]</a:t>
             </a:r>
             <a:endParaRPr lang="en-US" sz="3000" dirty="0"/>
           </a:p>
@@ -21006,11 +21127,11 @@
   <p:clrMapOvr>
     <a:masterClrMapping/>
   </p:clrMapOvr>
-  <mc:AlternateContent xmlns:mc="http://schemas.openxmlformats.org/markup-compatibility/2006" xmlns:p14="http://schemas.microsoft.com/office/powerpoint/2010/main">
-    <mc:Choice Requires="p14">
+  <mc:AlternateContent xmlns:mc="http://schemas.openxmlformats.org/markup-compatibility/2006">
+    <mc:Choice xmlns:p14="http://schemas.microsoft.com/office/powerpoint/2010/main" xmlns="" Requires="p14">
       <p:transition spd="slow" p14:dur="2000" advClick="0" advTm="5000"/>
     </mc:Choice>
-    <mc:Fallback xmlns="">
+    <mc:Fallback>
       <p:transition spd="slow" advClick="0" advTm="5000"/>
     </mc:Fallback>
   </mc:AlternateContent>
@@ -21390,11 +21511,11 @@
   <p:clrMapOvr>
     <a:masterClrMapping/>
   </p:clrMapOvr>
-  <mc:AlternateContent xmlns:mc="http://schemas.openxmlformats.org/markup-compatibility/2006" xmlns:p14="http://schemas.microsoft.com/office/powerpoint/2010/main">
-    <mc:Choice Requires="p14">
+  <mc:AlternateContent xmlns:mc="http://schemas.openxmlformats.org/markup-compatibility/2006">
+    <mc:Choice xmlns:p14="http://schemas.microsoft.com/office/powerpoint/2010/main" xmlns="" Requires="p14">
       <p:transition spd="slow" p14:dur="2000" advClick="0" advTm="5000"/>
     </mc:Choice>
-    <mc:Fallback xmlns="">
+    <mc:Fallback>
       <p:transition spd="slow" advClick="0" advTm="5000"/>
     </mc:Fallback>
   </mc:AlternateContent>
@@ -21852,11 +21973,11 @@
   <p:clrMapOvr>
     <a:masterClrMapping/>
   </p:clrMapOvr>
-  <mc:AlternateContent xmlns:mc="http://schemas.openxmlformats.org/markup-compatibility/2006" xmlns:p14="http://schemas.microsoft.com/office/powerpoint/2010/main">
-    <mc:Choice Requires="p14">
+  <mc:AlternateContent xmlns:mc="http://schemas.openxmlformats.org/markup-compatibility/2006">
+    <mc:Choice xmlns:p14="http://schemas.microsoft.com/office/powerpoint/2010/main" xmlns="" Requires="p14">
       <p:transition spd="slow" p14:dur="2000" advClick="0" advTm="5000"/>
     </mc:Choice>
-    <mc:Fallback xmlns="">
+    <mc:Fallback>
       <p:transition spd="slow" advClick="0" advTm="5000"/>
     </mc:Fallback>
   </mc:AlternateContent>
@@ -21953,11 +22074,11 @@
   <p:clrMapOvr>
     <a:masterClrMapping/>
   </p:clrMapOvr>
-  <mc:AlternateContent xmlns:mc="http://schemas.openxmlformats.org/markup-compatibility/2006" xmlns:p14="http://schemas.microsoft.com/office/powerpoint/2010/main">
-    <mc:Choice Requires="p14">
+  <mc:AlternateContent xmlns:mc="http://schemas.openxmlformats.org/markup-compatibility/2006">
+    <mc:Choice xmlns:p14="http://schemas.microsoft.com/office/powerpoint/2010/main" xmlns="" Requires="p14">
       <p:transition spd="slow" p14:dur="2000" advClick="0" advTm="5000"/>
     </mc:Choice>
-    <mc:Fallback xmlns="">
+    <mc:Fallback>
       <p:transition spd="slow" advClick="0" advTm="5000"/>
     </mc:Fallback>
   </mc:AlternateContent>
@@ -22290,11 +22411,11 @@
   <p:clrMapOvr>
     <a:masterClrMapping/>
   </p:clrMapOvr>
-  <mc:AlternateContent xmlns:mc="http://schemas.openxmlformats.org/markup-compatibility/2006" xmlns:p14="http://schemas.microsoft.com/office/powerpoint/2010/main">
-    <mc:Choice Requires="p14">
+  <mc:AlternateContent xmlns:mc="http://schemas.openxmlformats.org/markup-compatibility/2006">
+    <mc:Choice xmlns:p14="http://schemas.microsoft.com/office/powerpoint/2010/main" xmlns="" Requires="p14">
       <p:transition spd="slow" p14:dur="2000" advClick="0" advTm="5000"/>
     </mc:Choice>
-    <mc:Fallback xmlns="">
+    <mc:Fallback>
       <p:transition spd="slow" advClick="0" advTm="5000"/>
     </mc:Fallback>
   </mc:AlternateContent>
@@ -22885,11 +23006,11 @@
   <p:clrMapOvr>
     <a:masterClrMapping/>
   </p:clrMapOvr>
-  <mc:AlternateContent xmlns:mc="http://schemas.openxmlformats.org/markup-compatibility/2006" xmlns:p14="http://schemas.microsoft.com/office/powerpoint/2010/main">
-    <mc:Choice Requires="p14">
+  <mc:AlternateContent xmlns:mc="http://schemas.openxmlformats.org/markup-compatibility/2006">
+    <mc:Choice xmlns:p14="http://schemas.microsoft.com/office/powerpoint/2010/main" xmlns="" Requires="p14">
       <p:transition spd="slow" p14:dur="2000" advClick="0" advTm="5000"/>
     </mc:Choice>
-    <mc:Fallback xmlns="">
+    <mc:Fallback>
       <p:transition spd="slow" advClick="0" advTm="5000"/>
     </mc:Fallback>
   </mc:AlternateContent>
@@ -23166,11 +23287,11 @@
   <p:clrMapOvr>
     <a:masterClrMapping/>
   </p:clrMapOvr>
-  <mc:AlternateContent xmlns:mc="http://schemas.openxmlformats.org/markup-compatibility/2006" xmlns:p14="http://schemas.microsoft.com/office/powerpoint/2010/main">
-    <mc:Choice Requires="p14">
+  <mc:AlternateContent xmlns:mc="http://schemas.openxmlformats.org/markup-compatibility/2006">
+    <mc:Choice xmlns:p14="http://schemas.microsoft.com/office/powerpoint/2010/main" xmlns="" Requires="p14">
       <p:transition spd="slow" p14:dur="2000" advClick="0" advTm="5000"/>
     </mc:Choice>
-    <mc:Fallback xmlns="">
+    <mc:Fallback>
       <p:transition spd="slow" advClick="0" advTm="5000"/>
     </mc:Fallback>
   </mc:AlternateContent>
@@ -23199,7 +23320,7 @@
           <p:cNvPr id="9" name="Summary Box Group">
             <a:extLst>
               <a:ext uri="{FF2B5EF4-FFF2-40B4-BE49-F238E27FC236}">
-                <a16:creationId xmlns:a16="http://schemas.microsoft.com/office/drawing/2014/main" id="{EBAFE522-EB7D-4931-A015-9A7E8A98517D}"/>
+                <a16:creationId xmlns:a16="http://schemas.microsoft.com/office/drawing/2014/main" xmlns="" id="{EBAFE522-EB7D-4931-A015-9A7E8A98517D}"/>
               </a:ext>
             </a:extLst>
           </p:cNvPr>
@@ -23219,7 +23340,7 @@
             <p:cNvPr id="10" name="Rounded Rectangle Blue">
               <a:extLst>
                 <a:ext uri="{FF2B5EF4-FFF2-40B4-BE49-F238E27FC236}">
-                  <a16:creationId xmlns:a16="http://schemas.microsoft.com/office/drawing/2014/main" id="{18F78F23-3D09-4B63-8DF9-D49CFBB145EE}"/>
+                  <a16:creationId xmlns:a16="http://schemas.microsoft.com/office/drawing/2014/main" xmlns="" id="{18F78F23-3D09-4B63-8DF9-D49CFBB145EE}"/>
                 </a:ext>
               </a:extLst>
             </p:cNvPr>
@@ -23273,7 +23394,7 @@
             <p:cNvPr id="11" name="Rounded Rectangle Left">
               <a:extLst>
                 <a:ext uri="{FF2B5EF4-FFF2-40B4-BE49-F238E27FC236}">
-                  <a16:creationId xmlns:a16="http://schemas.microsoft.com/office/drawing/2014/main" id="{F12C06CE-2BBE-46C2-B718-813794C58DF9}"/>
+                  <a16:creationId xmlns:a16="http://schemas.microsoft.com/office/drawing/2014/main" xmlns="" id="{F12C06CE-2BBE-46C2-B718-813794C58DF9}"/>
                 </a:ext>
               </a:extLst>
             </p:cNvPr>
@@ -23333,7 +23454,7 @@
             <p:cNvPr id="12" name="Half Frame Top Right">
               <a:extLst>
                 <a:ext uri="{FF2B5EF4-FFF2-40B4-BE49-F238E27FC236}">
-                  <a16:creationId xmlns:a16="http://schemas.microsoft.com/office/drawing/2014/main" id="{66CDBB1E-AF3C-43FC-9F34-2DD691F81726}"/>
+                  <a16:creationId xmlns:a16="http://schemas.microsoft.com/office/drawing/2014/main" xmlns="" id="{66CDBB1E-AF3C-43FC-9F34-2DD691F81726}"/>
                 </a:ext>
               </a:extLst>
             </p:cNvPr>
@@ -23395,7 +23516,7 @@
           <p:cNvPr id="14" name="Text Placeholder Body">
             <a:extLst>
               <a:ext uri="{FF2B5EF4-FFF2-40B4-BE49-F238E27FC236}">
-                <a16:creationId xmlns:a16="http://schemas.microsoft.com/office/drawing/2014/main" id="{0E49D336-45B6-44D3-97C4-E28F8DEA2022}"/>
+                <a16:creationId xmlns:a16="http://schemas.microsoft.com/office/drawing/2014/main" xmlns="" id="{0E49D336-45B6-44D3-97C4-E28F8DEA2022}"/>
               </a:ext>
             </a:extLst>
           </p:cNvPr>
@@ -23491,7 +23612,7 @@
           <p:cNvPr id="17" name="Slide Number">
             <a:extLst>
               <a:ext uri="{FF2B5EF4-FFF2-40B4-BE49-F238E27FC236}">
-                <a16:creationId xmlns:a16="http://schemas.microsoft.com/office/drawing/2014/main" id="{9DE5559F-55C2-47F1-A321-B593B1EC63C1}"/>
+                <a16:creationId xmlns:a16="http://schemas.microsoft.com/office/drawing/2014/main" xmlns="" id="{9DE5559F-55C2-47F1-A321-B593B1EC63C1}"/>
               </a:ext>
             </a:extLst>
           </p:cNvPr>
@@ -23533,7 +23654,7 @@
           <p:cNvPr id="13" name="Picture SoftUni Mascot">
             <a:extLst>
               <a:ext uri="{FF2B5EF4-FFF2-40B4-BE49-F238E27FC236}">
-                <a16:creationId xmlns:a16="http://schemas.microsoft.com/office/drawing/2014/main" id="{CCC3A316-993C-4741-8826-E104F27650A3}"/>
+                <a16:creationId xmlns:a16="http://schemas.microsoft.com/office/drawing/2014/main" xmlns="" id="{CCC3A316-993C-4741-8826-E104F27650A3}"/>
               </a:ext>
             </a:extLst>
           </p:cNvPr>
@@ -23546,7 +23667,7 @@
           <a:blip r:embed="rId3" cstate="print">
             <a:extLst>
               <a:ext uri="{28A0092B-C50C-407E-A947-70E740481C1C}">
-                <a14:useLocalDpi xmlns:a14="http://schemas.microsoft.com/office/drawing/2010/main" val="0"/>
+                <a14:useLocalDpi xmlns:a14="http://schemas.microsoft.com/office/drawing/2010/main" xmlns="" val="0"/>
               </a:ext>
             </a:extLst>
           </a:blip>
@@ -23591,18 +23712,18 @@
     </p:spTree>
     <p:extLst>
       <p:ext uri="{BB962C8B-B14F-4D97-AF65-F5344CB8AC3E}">
-        <p14:creationId xmlns:p14="http://schemas.microsoft.com/office/powerpoint/2010/main" val="2087190546"/>
+        <p14:creationId xmlns:p14="http://schemas.microsoft.com/office/powerpoint/2010/main" xmlns="" val="2087190546"/>
       </p:ext>
     </p:extLst>
   </p:cSld>
   <p:clrMapOvr>
     <a:masterClrMapping/>
   </p:clrMapOvr>
-  <mc:AlternateContent xmlns:mc="http://schemas.openxmlformats.org/markup-compatibility/2006" xmlns:p14="http://schemas.microsoft.com/office/powerpoint/2010/main">
-    <mc:Choice Requires="p14">
+  <mc:AlternateContent xmlns:mc="http://schemas.openxmlformats.org/markup-compatibility/2006">
+    <mc:Choice xmlns:p14="http://schemas.microsoft.com/office/powerpoint/2010/main" xmlns="" Requires="p14">
       <p:transition spd="slow" p14:dur="2000" advClick="0" advTm="5000"/>
     </mc:Choice>
-    <mc:Fallback xmlns="">
+    <mc:Fallback>
       <p:transition spd="slow" advClick="0" advTm="5000"/>
     </mc:Fallback>
   </mc:AlternateContent>
@@ -23631,7 +23752,7 @@
           <p:cNvPr id="5" name="Group 4">
             <a:extLst>
               <a:ext uri="{FF2B5EF4-FFF2-40B4-BE49-F238E27FC236}">
-                <a16:creationId xmlns:a16="http://schemas.microsoft.com/office/drawing/2014/main" id="{1A67F800-7980-E3CA-7188-3C478C8E98B8}"/>
+                <a16:creationId xmlns:a16="http://schemas.microsoft.com/office/drawing/2014/main" xmlns="" id="{1A67F800-7980-E3CA-7188-3C478C8E98B8}"/>
               </a:ext>
             </a:extLst>
           </p:cNvPr>
@@ -23651,7 +23772,7 @@
             <p:cNvPr id="7" name="Picture 6" descr="A picture containing text, sign, vector graphics&#10;&#10;Description automatically generated">
               <a:extLst>
                 <a:ext uri="{FF2B5EF4-FFF2-40B4-BE49-F238E27FC236}">
-                  <a16:creationId xmlns:a16="http://schemas.microsoft.com/office/drawing/2014/main" id="{15CE28B1-02BA-4014-E149-BF1EE09447ED}"/>
+                  <a16:creationId xmlns:a16="http://schemas.microsoft.com/office/drawing/2014/main" xmlns="" id="{15CE28B1-02BA-4014-E149-BF1EE09447ED}"/>
                 </a:ext>
               </a:extLst>
             </p:cNvPr>
@@ -23681,7 +23802,7 @@
             <p:cNvPr id="9" name="Picture 8" descr="Logo&#10;&#10;Description automatically generated">
               <a:extLst>
                 <a:ext uri="{FF2B5EF4-FFF2-40B4-BE49-F238E27FC236}">
-                  <a16:creationId xmlns:a16="http://schemas.microsoft.com/office/drawing/2014/main" id="{5F82FF4F-4AD2-4B3B-1445-F3C6BA268522}"/>
+                  <a16:creationId xmlns:a16="http://schemas.microsoft.com/office/drawing/2014/main" xmlns="" id="{5F82FF4F-4AD2-4B3B-1445-F3C6BA268522}"/>
                 </a:ext>
               </a:extLst>
             </p:cNvPr>
@@ -23711,7 +23832,7 @@
             <p:cNvPr id="11" name="Picture 10" descr="Logo&#10;&#10;Description automatically generated">
               <a:extLst>
                 <a:ext uri="{FF2B5EF4-FFF2-40B4-BE49-F238E27FC236}">
-                  <a16:creationId xmlns:a16="http://schemas.microsoft.com/office/drawing/2014/main" id="{68CCA8DB-9EFC-F9BC-57AE-81E4F843E863}"/>
+                  <a16:creationId xmlns:a16="http://schemas.microsoft.com/office/drawing/2014/main" xmlns="" id="{68CCA8DB-9EFC-F9BC-57AE-81E4F843E863}"/>
                 </a:ext>
               </a:extLst>
             </p:cNvPr>
@@ -23741,7 +23862,7 @@
             <p:cNvPr id="13" name="Picture 12" descr="Logo&#10;&#10;Description automatically generated">
               <a:extLst>
                 <a:ext uri="{FF2B5EF4-FFF2-40B4-BE49-F238E27FC236}">
-                  <a16:creationId xmlns:a16="http://schemas.microsoft.com/office/drawing/2014/main" id="{3FDF9297-50FA-E866-B6CE-9D64B1E892BF}"/>
+                  <a16:creationId xmlns:a16="http://schemas.microsoft.com/office/drawing/2014/main" xmlns="" id="{3FDF9297-50FA-E866-B6CE-9D64B1E892BF}"/>
                 </a:ext>
               </a:extLst>
             </p:cNvPr>
@@ -23771,7 +23892,7 @@
             <p:cNvPr id="18" name="Graphic 17">
               <a:extLst>
                 <a:ext uri="{FF2B5EF4-FFF2-40B4-BE49-F238E27FC236}">
-                  <a16:creationId xmlns:a16="http://schemas.microsoft.com/office/drawing/2014/main" id="{2A1BC0C9-7A7B-9C5B-B457-3E86E59EF29E}"/>
+                  <a16:creationId xmlns:a16="http://schemas.microsoft.com/office/drawing/2014/main" xmlns="" id="{2A1BC0C9-7A7B-9C5B-B457-3E86E59EF29E}"/>
                 </a:ext>
               </a:extLst>
             </p:cNvPr>
@@ -23784,7 +23905,7 @@
             <a:blip r:embed="rId7" cstate="print">
               <a:extLst>
                 <a:ext uri="{96DAC541-7B7A-43D3-8B79-37D633B846F1}">
-                  <asvg:svgBlip xmlns:asvg="http://schemas.microsoft.com/office/drawing/2016/SVG/main" r:embed="rId8"/>
+                  <asvg:svgBlip xmlns:asvg="http://schemas.microsoft.com/office/drawing/2016/SVG/main" xmlns="" r:embed="rId8"/>
                 </a:ext>
               </a:extLst>
             </a:blip>
@@ -23807,7 +23928,7 @@
             <p:cNvPr id="20" name="Graphic 19">
               <a:extLst>
                 <a:ext uri="{FF2B5EF4-FFF2-40B4-BE49-F238E27FC236}">
-                  <a16:creationId xmlns:a16="http://schemas.microsoft.com/office/drawing/2014/main" id="{DBE174DA-A182-7E57-06D4-86AFA26D484D}"/>
+                  <a16:creationId xmlns:a16="http://schemas.microsoft.com/office/drawing/2014/main" xmlns="" id="{DBE174DA-A182-7E57-06D4-86AFA26D484D}"/>
                 </a:ext>
               </a:extLst>
             </p:cNvPr>
@@ -23820,7 +23941,7 @@
             <a:blip r:embed="rId9" cstate="print">
               <a:extLst>
                 <a:ext uri="{96DAC541-7B7A-43D3-8B79-37D633B846F1}">
-                  <asvg:svgBlip xmlns:asvg="http://schemas.microsoft.com/office/drawing/2016/SVG/main" r:embed="rId10"/>
+                  <asvg:svgBlip xmlns:asvg="http://schemas.microsoft.com/office/drawing/2016/SVG/main" xmlns="" r:embed="rId10"/>
                 </a:ext>
               </a:extLst>
             </a:blip>
@@ -23843,7 +23964,7 @@
             <p:cNvPr id="22" name="Picture 21" descr="Logo&#10;&#10;Description automatically generated">
               <a:extLst>
                 <a:ext uri="{FF2B5EF4-FFF2-40B4-BE49-F238E27FC236}">
-                  <a16:creationId xmlns:a16="http://schemas.microsoft.com/office/drawing/2014/main" id="{9B7FFC36-A4BC-7A53-AB82-82C398A47538}"/>
+                  <a16:creationId xmlns:a16="http://schemas.microsoft.com/office/drawing/2014/main" xmlns="" id="{9B7FFC36-A4BC-7A53-AB82-82C398A47538}"/>
                 </a:ext>
               </a:extLst>
             </p:cNvPr>
@@ -23873,7 +23994,7 @@
             <p:cNvPr id="36" name="Group 35">
               <a:extLst>
                 <a:ext uri="{FF2B5EF4-FFF2-40B4-BE49-F238E27FC236}">
-                  <a16:creationId xmlns:a16="http://schemas.microsoft.com/office/drawing/2014/main" id="{3FB2AEAC-BDEE-9D5F-67A3-17CEDA699052}"/>
+                  <a16:creationId xmlns:a16="http://schemas.microsoft.com/office/drawing/2014/main" xmlns="" id="{3FB2AEAC-BDEE-9D5F-67A3-17CEDA699052}"/>
                 </a:ext>
               </a:extLst>
             </p:cNvPr>
@@ -23893,7 +24014,7 @@
               <p:cNvPr id="31" name="Straight Connector 30">
                 <a:extLst>
                   <a:ext uri="{FF2B5EF4-FFF2-40B4-BE49-F238E27FC236}">
-                    <a16:creationId xmlns:a16="http://schemas.microsoft.com/office/drawing/2014/main" id="{AA38ABD5-1637-DC80-A922-DF10E4F75CDE}"/>
+                    <a16:creationId xmlns:a16="http://schemas.microsoft.com/office/drawing/2014/main" xmlns="" id="{AA38ABD5-1637-DC80-A922-DF10E4F75CDE}"/>
                   </a:ext>
                 </a:extLst>
               </p:cNvPr>
@@ -23936,7 +24057,7 @@
               <p:cNvPr id="33" name="Picture 32">
                 <a:extLst>
                   <a:ext uri="{FF2B5EF4-FFF2-40B4-BE49-F238E27FC236}">
-                    <a16:creationId xmlns:a16="http://schemas.microsoft.com/office/drawing/2014/main" id="{617B586A-0BC5-5E32-7E67-FD277547ED69}"/>
+                    <a16:creationId xmlns:a16="http://schemas.microsoft.com/office/drawing/2014/main" xmlns="" id="{617B586A-0BC5-5E32-7E67-FD277547ED69}"/>
                   </a:ext>
                 </a:extLst>
               </p:cNvPr>
@@ -23968,7 +24089,7 @@
           <p:cNvPr id="40" name="Picture 39" descr="Logo&#10;&#10;Description automatically generated">
             <a:extLst>
               <a:ext uri="{FF2B5EF4-FFF2-40B4-BE49-F238E27FC236}">
-                <a16:creationId xmlns:a16="http://schemas.microsoft.com/office/drawing/2014/main" id="{9C30DD70-D438-6D27-35D3-8BB874966D84}"/>
+                <a16:creationId xmlns:a16="http://schemas.microsoft.com/office/drawing/2014/main" xmlns="" id="{9C30DD70-D438-6D27-35D3-8BB874966D84}"/>
               </a:ext>
             </a:extLst>
           </p:cNvPr>
@@ -23998,7 +24119,7 @@
           <p:cNvPr id="2" name="Google Shape;441;p37">
             <a:extLst>
               <a:ext uri="{FF2B5EF4-FFF2-40B4-BE49-F238E27FC236}">
-                <a16:creationId xmlns:a16="http://schemas.microsoft.com/office/drawing/2014/main" id="{2AFB472C-93C2-241B-75FA-457782840F92}"/>
+                <a16:creationId xmlns:a16="http://schemas.microsoft.com/office/drawing/2014/main" xmlns="" id="{2AFB472C-93C2-241B-75FA-457782840F92}"/>
               </a:ext>
             </a:extLst>
           </p:cNvPr>
@@ -24303,7 +24424,7 @@
           <p:cNvPr id="14" name="Картина 13">
             <a:extLst>
               <a:ext uri="{FF2B5EF4-FFF2-40B4-BE49-F238E27FC236}">
-                <a16:creationId xmlns:a16="http://schemas.microsoft.com/office/drawing/2014/main" id="{54B365E9-8FD0-6D5B-2DFC-723EE5DDD555}"/>
+                <a16:creationId xmlns:a16="http://schemas.microsoft.com/office/drawing/2014/main" xmlns="" id="{54B365E9-8FD0-6D5B-2DFC-723EE5DDD555}"/>
               </a:ext>
             </a:extLst>
           </p:cNvPr>
@@ -24333,7 +24454,7 @@
           <p:cNvPr id="16" name="Картина 15">
             <a:extLst>
               <a:ext uri="{FF2B5EF4-FFF2-40B4-BE49-F238E27FC236}">
-                <a16:creationId xmlns:a16="http://schemas.microsoft.com/office/drawing/2014/main" id="{3BD6ABFC-02BF-2D42-B42B-6929222F37B6}"/>
+                <a16:creationId xmlns:a16="http://schemas.microsoft.com/office/drawing/2014/main" xmlns="" id="{3BD6ABFC-02BF-2D42-B42B-6929222F37B6}"/>
               </a:ext>
             </a:extLst>
           </p:cNvPr>
@@ -24361,7 +24482,7 @@
     </p:spTree>
     <p:extLst>
       <p:ext uri="{BB962C8B-B14F-4D97-AF65-F5344CB8AC3E}">
-        <p14:creationId xmlns:p14="http://schemas.microsoft.com/office/powerpoint/2010/main" val="2144060659"/>
+        <p14:creationId xmlns:p14="http://schemas.microsoft.com/office/powerpoint/2010/main" xmlns="" val="2144060659"/>
       </p:ext>
     </p:extLst>
   </p:cSld>
@@ -24393,7 +24514,7 @@
           <p:cNvPr id="5" name="Slide Number">
             <a:extLst>
               <a:ext uri="{FF2B5EF4-FFF2-40B4-BE49-F238E27FC236}">
-                <a16:creationId xmlns:a16="http://schemas.microsoft.com/office/drawing/2014/main" id="{F48C3C93-90A1-4D31-BEA6-B54D1106CE31}"/>
+                <a16:creationId xmlns:a16="http://schemas.microsoft.com/office/drawing/2014/main" xmlns="" id="{F48C3C93-90A1-4D31-BEA6-B54D1106CE31}"/>
               </a:ext>
             </a:extLst>
           </p:cNvPr>
@@ -24435,7 +24556,7 @@
           <p:cNvPr id="2" name="Slide Body">
             <a:extLst>
               <a:ext uri="{FF2B5EF4-FFF2-40B4-BE49-F238E27FC236}">
-                <a16:creationId xmlns:a16="http://schemas.microsoft.com/office/drawing/2014/main" id="{980F49B1-E4BE-4389-A747-7AB9B71AD920}"/>
+                <a16:creationId xmlns:a16="http://schemas.microsoft.com/office/drawing/2014/main" xmlns="" id="{980F49B1-E4BE-4389-A747-7AB9B71AD920}"/>
               </a:ext>
             </a:extLst>
           </p:cNvPr>
@@ -24569,7 +24690,7 @@
           <p:cNvPr id="6" name="Picture License" descr="License">
             <a:extLst>
               <a:ext uri="{FF2B5EF4-FFF2-40B4-BE49-F238E27FC236}">
-                <a16:creationId xmlns:a16="http://schemas.microsoft.com/office/drawing/2014/main" id="{A10A2585-858C-4B1E-8846-27CF1C15729E}"/>
+                <a16:creationId xmlns:a16="http://schemas.microsoft.com/office/drawing/2014/main" xmlns="" id="{A10A2585-858C-4B1E-8846-27CF1C15729E}"/>
               </a:ext>
             </a:extLst>
           </p:cNvPr>
@@ -24610,7 +24731,7 @@
           <p:cNvPr id="3" name="Slide Title">
             <a:extLst>
               <a:ext uri="{FF2B5EF4-FFF2-40B4-BE49-F238E27FC236}">
-                <a16:creationId xmlns:a16="http://schemas.microsoft.com/office/drawing/2014/main" id="{E5F1FB41-80C3-4816-BC47-CCC50632E6E8}"/>
+                <a16:creationId xmlns:a16="http://schemas.microsoft.com/office/drawing/2014/main" xmlns="" id="{E5F1FB41-80C3-4816-BC47-CCC50632E6E8}"/>
               </a:ext>
             </a:extLst>
           </p:cNvPr>
@@ -24636,18 +24757,18 @@
     </p:spTree>
     <p:extLst>
       <p:ext uri="{BB962C8B-B14F-4D97-AF65-F5344CB8AC3E}">
-        <p14:creationId xmlns:p14="http://schemas.microsoft.com/office/powerpoint/2010/main" val="3506533871"/>
+        <p14:creationId xmlns:p14="http://schemas.microsoft.com/office/powerpoint/2010/main" xmlns="" val="3506533871"/>
       </p:ext>
     </p:extLst>
   </p:cSld>
   <p:clrMapOvr>
     <a:masterClrMapping/>
   </p:clrMapOvr>
-  <mc:AlternateContent xmlns:mc="http://schemas.openxmlformats.org/markup-compatibility/2006" xmlns:p14="http://schemas.microsoft.com/office/powerpoint/2010/main">
-    <mc:Choice Requires="p14">
+  <mc:AlternateContent xmlns:mc="http://schemas.openxmlformats.org/markup-compatibility/2006">
+    <mc:Choice xmlns:p14="http://schemas.microsoft.com/office/powerpoint/2010/main" xmlns="" Requires="p14">
       <p:transition spd="slow" p14:dur="2000" advClick="0" advTm="5000"/>
     </mc:Choice>
-    <mc:Fallback xmlns="">
+    <mc:Fallback>
       <p:transition spd="slow" advClick="0" advTm="5000"/>
     </mc:Fallback>
   </mc:AlternateContent>
@@ -25015,11 +25136,11 @@
   <p:clrMapOvr>
     <a:masterClrMapping/>
   </p:clrMapOvr>
-  <mc:AlternateContent xmlns:mc="http://schemas.openxmlformats.org/markup-compatibility/2006" xmlns:p14="http://schemas.microsoft.com/office/powerpoint/2010/main">
-    <mc:Choice Requires="p14">
+  <mc:AlternateContent xmlns:mc="http://schemas.openxmlformats.org/markup-compatibility/2006">
+    <mc:Choice xmlns:p14="http://schemas.microsoft.com/office/powerpoint/2010/main" xmlns="" Requires="p14">
       <p:transition spd="slow" p14:dur="2000" advClick="0" advTm="5000"/>
     </mc:Choice>
-    <mc:Fallback xmlns="">
+    <mc:Fallback>
       <p:transition spd="slow" advClick="0" advTm="5000"/>
     </mc:Fallback>
   </mc:AlternateContent>
@@ -25366,11 +25487,11 @@
   <p:clrMapOvr>
     <a:masterClrMapping/>
   </p:clrMapOvr>
-  <mc:AlternateContent xmlns:mc="http://schemas.openxmlformats.org/markup-compatibility/2006" xmlns:p14="http://schemas.microsoft.com/office/powerpoint/2010/main">
-    <mc:Choice Requires="p14">
+  <mc:AlternateContent xmlns:mc="http://schemas.openxmlformats.org/markup-compatibility/2006">
+    <mc:Choice xmlns:p14="http://schemas.microsoft.com/office/powerpoint/2010/main" xmlns="" Requires="p14">
       <p:transition spd="slow" p14:dur="2000" advClick="0" advTm="5000"/>
     </mc:Choice>
-    <mc:Fallback xmlns="">
+    <mc:Fallback>
       <p:transition spd="slow" advClick="0" advTm="5000"/>
     </mc:Fallback>
   </mc:AlternateContent>
@@ -25440,7 +25561,9 @@
               <a:t>Натиснете </a:t>
             </a:r>
             <a:r>
-              <a:rPr lang="en-US" dirty="0"/>
+              <a:rPr lang="en-US" sz="3400" dirty="0">
+                <a:latin typeface="Consolas" pitchFamily="49" charset="0"/>
+              </a:rPr>
               <a:t>[</a:t>
             </a:r>
             <a:r>
@@ -25453,14 +25576,20 @@
               <a:t>File</a:t>
             </a:r>
             <a:r>
+              <a:rPr lang="en-US" sz="3400" dirty="0">
+                <a:latin typeface="Consolas" pitchFamily="49" charset="0"/>
+              </a:rPr>
+              <a:t>]</a:t>
+            </a:r>
+            <a:r>
+              <a:rPr lang="en-US" dirty="0"/>
+              <a:t> &gt; </a:t>
+            </a:r>
+            <a:r>
               <a:rPr lang="en-US" dirty="0">
                 <a:latin typeface="Consolas" pitchFamily="49" charset="0"/>
               </a:rPr>
-              <a:t>]</a:t>
-            </a:r>
-            <a:r>
-              <a:rPr lang="en-US" dirty="0"/>
-              <a:t> &gt; [</a:t>
+              <a:t>[</a:t>
             </a:r>
             <a:r>
               <a:rPr lang="en-US" b="1" dirty="0">
@@ -25712,78 +25841,16 @@
           </a:ln>
         </p:spPr>
       </p:pic>
-      <p:sp>
-        <p:nvSpPr>
-          <p:cNvPr id="5" name="TextBox 4">
-            <a:extLst>
-              <a:ext uri="{FF2B5EF4-FFF2-40B4-BE49-F238E27FC236}">
-                <a16:creationId xmlns:a16="http://schemas.microsoft.com/office/drawing/2014/main" id="{D152959B-B3EA-53CC-3D74-C0908A4E83BF}"/>
-              </a:ext>
-            </a:extLst>
-          </p:cNvPr>
-          <p:cNvSpPr txBox="1"/>
-          <p:nvPr/>
-        </p:nvSpPr>
-        <p:spPr>
-          <a:xfrm>
-            <a:off x="533400" y="1828799"/>
-            <a:ext cx="4038600" cy="1010314"/>
-          </a:xfrm>
-          <a:prstGeom prst="rect">
-            <a:avLst/>
-          </a:prstGeom>
-          <a:ln/>
-        </p:spPr>
-        <p:style>
-          <a:lnRef idx="2">
-            <a:schemeClr val="accent2"/>
-          </a:lnRef>
-          <a:fillRef idx="1">
-            <a:schemeClr val="lt1"/>
-          </a:fillRef>
-          <a:effectRef idx="0">
-            <a:schemeClr val="accent2"/>
-          </a:effectRef>
-          <a:fontRef idx="minor">
-            <a:schemeClr val="dk1"/>
-          </a:fontRef>
-        </p:style>
-        <p:txBody>
-          <a:bodyPr vert="horz" wrap="square" lIns="144000" tIns="108000" rIns="144000" bIns="108000" rtlCol="0">
-            <a:spAutoFit/>
-          </a:bodyPr>
-          <a:lstStyle/>
-          <a:p>
-            <a:pPr algn="l" eaLnBrk="0" hangingPunct="0">
-              <a:lnSpc>
-                <a:spcPct val="110000"/>
-              </a:lnSpc>
-              <a:buClr>
-                <a:schemeClr val="accent5">
-                  <a:lumMod val="40000"/>
-                  <a:lumOff val="60000"/>
-                </a:schemeClr>
-              </a:buClr>
-              <a:buSzPct val="70000"/>
-            </a:pPr>
-            <a:r>
-              <a:rPr lang="en-US" sz="2400" b="1" dirty="0"/>
-              <a:t>TODO: Add button brackets -&gt; [File]</a:t>
-            </a:r>
-            <a:endParaRPr lang="bg-BG" sz="2400" b="1" dirty="0"/>
-          </a:p>
-        </p:txBody>
-      </p:sp>
     </p:spTree>
   </p:cSld>
   <p:clrMapOvr>
     <a:masterClrMapping/>
   </p:clrMapOvr>
-  <mc:AlternateContent xmlns:mc="http://schemas.openxmlformats.org/markup-compatibility/2006" xmlns:p14="http://schemas.microsoft.com/office/powerpoint/2010/main">
-    <mc:Choice Requires="p14">
+  <mc:AlternateContent xmlns:mc="http://schemas.openxmlformats.org/markup-compatibility/2006">
+    <mc:Choice xmlns:p14="http://schemas.microsoft.com/office/powerpoint/2010/main" xmlns="" Requires="p14">
       <p:transition spd="slow" p14:dur="2000" advClick="0" advTm="5000"/>
     </mc:Choice>
-    <mc:Fallback xmlns="">
+    <mc:Fallback>
       <p:transition spd="slow" advClick="0" advTm="5000"/>
     </mc:Fallback>
   </mc:AlternateContent>
@@ -25992,7 +26059,13 @@
               <a:t>Натиснете </a:t>
             </a:r>
             <a:r>
-              <a:rPr lang="en-US" sz="3200" b="1" dirty="0">
+              <a:rPr lang="en-US" sz="3200" dirty="0" smtClean="0">
+                <a:latin typeface="Consolas" pitchFamily="49" charset="0"/>
+              </a:rPr>
+              <a:t>[</a:t>
+            </a:r>
+            <a:r>
+              <a:rPr lang="en-US" sz="3200" b="1" dirty="0" smtClean="0">
                 <a:solidFill>
                   <a:schemeClr val="bg1"/>
                 </a:solidFill>
@@ -26000,6 +26073,15 @@
               </a:rPr>
               <a:t>Create</a:t>
             </a:r>
+            <a:r>
+              <a:rPr lang="en-US" sz="3200" dirty="0" smtClean="0">
+                <a:latin typeface="Consolas" pitchFamily="49" charset="0"/>
+              </a:rPr>
+              <a:t>]</a:t>
+            </a:r>
+            <a:endParaRPr lang="en-US" sz="3200" dirty="0">
+              <a:latin typeface="Consolas" pitchFamily="49" charset="0"/>
+            </a:endParaRPr>
           </a:p>
           <a:p>
             <a:pPr>
@@ -26147,11 +26229,11 @@
   <p:clrMapOvr>
     <a:masterClrMapping/>
   </p:clrMapOvr>
-  <mc:AlternateContent xmlns:mc="http://schemas.openxmlformats.org/markup-compatibility/2006" xmlns:p14="http://schemas.microsoft.com/office/powerpoint/2010/main">
-    <mc:Choice Requires="p14">
+  <mc:AlternateContent xmlns:mc="http://schemas.openxmlformats.org/markup-compatibility/2006">
+    <mc:Choice xmlns:p14="http://schemas.microsoft.com/office/powerpoint/2010/main" xmlns="" Requires="p14">
       <p:transition spd="slow" p14:dur="2000" advClick="0" advTm="5000"/>
     </mc:Choice>
-    <mc:Fallback xmlns="">
+    <mc:Fallback>
       <p:transition spd="slow" advClick="0" advTm="5000"/>
     </mc:Fallback>
   </mc:AlternateContent>
@@ -26403,11 +26485,11 @@
   <p:clrMapOvr>
     <a:masterClrMapping/>
   </p:clrMapOvr>
-  <mc:AlternateContent xmlns:mc="http://schemas.openxmlformats.org/markup-compatibility/2006" xmlns:p14="http://schemas.microsoft.com/office/powerpoint/2010/main">
-    <mc:Choice Requires="p14">
+  <mc:AlternateContent xmlns:mc="http://schemas.openxmlformats.org/markup-compatibility/2006">
+    <mc:Choice xmlns:p14="http://schemas.microsoft.com/office/powerpoint/2010/main" xmlns="" Requires="p14">
       <p:transition spd="slow" p14:dur="2000" advClick="0" advTm="5000"/>
     </mc:Choice>
-    <mc:Fallback xmlns="">
+    <mc:Fallback>
       <p:transition spd="slow" advClick="0" advTm="5000"/>
     </mc:Fallback>
   </mc:AlternateContent>
@@ -26580,7 +26662,13 @@
               <a:t>натиснете </a:t>
             </a:r>
             <a:r>
-              <a:rPr lang="en-US" b="1" dirty="0">
+              <a:rPr lang="en-US" sz="3400" dirty="0" smtClean="0">
+                <a:latin typeface="Consolas" pitchFamily="49" charset="0"/>
+              </a:rPr>
+              <a:t>[</a:t>
+            </a:r>
+            <a:r>
+              <a:rPr lang="en-US" sz="3400" b="1" dirty="0" smtClean="0">
                 <a:solidFill>
                   <a:schemeClr val="bg1"/>
                 </a:solidFill>
@@ -26588,7 +26676,13 @@
               </a:rPr>
               <a:t>Table</a:t>
             </a:r>
-            <a:endParaRPr lang="en-US" dirty="0"/>
+            <a:r>
+              <a:rPr lang="en-US" sz="3400" dirty="0" smtClean="0">
+                <a:latin typeface="Consolas" pitchFamily="49" charset="0"/>
+              </a:rPr>
+              <a:t>]</a:t>
+            </a:r>
+            <a:endParaRPr lang="en-US" sz="3400" dirty="0"/>
           </a:p>
           <a:p>
             <a:endParaRPr lang="en-US" sz="3400" dirty="0"/>
@@ -26883,11 +26977,11 @@
   <p:clrMapOvr>
     <a:masterClrMapping/>
   </p:clrMapOvr>
-  <mc:AlternateContent xmlns:mc="http://schemas.openxmlformats.org/markup-compatibility/2006" xmlns:p14="http://schemas.microsoft.com/office/powerpoint/2010/main">
-    <mc:Choice Requires="p14">
+  <mc:AlternateContent xmlns:mc="http://schemas.openxmlformats.org/markup-compatibility/2006">
+    <mc:Choice xmlns:p14="http://schemas.microsoft.com/office/powerpoint/2010/main" xmlns="" Requires="p14">
       <p:transition spd="slow" p14:dur="2000" advClick="0" advTm="5000"/>
     </mc:Choice>
-    <mc:Fallback xmlns="">
+    <mc:Fallback>
       <p:transition spd="slow" advClick="0" advTm="5000"/>
     </mc:Fallback>
   </mc:AlternateContent>
@@ -27393,7 +27487,7 @@
   <a:extraClrSchemeLst/>
   <a:extLst>
     <a:ext uri="{05A4C25C-085E-4340-85A3-A5531E510DB2}">
-      <thm15:themeFamily xmlns:thm15="http://schemas.microsoft.com/office/thememl/2012/main" name="SoftUni" id="{D61FAD9B-6E74-4E03-BFE4-B363D484F1DA}" vid="{7089C1A3-635B-4B03-A017-DAF10A3A396B}"/>
+      <thm15:themeFamily xmlns:thm15="http://schemas.microsoft.com/office/thememl/2012/main" xmlns="" name="SoftUni" id="{D61FAD9B-6E74-4E03-BFE4-B363D484F1DA}" vid="{7089C1A3-635B-4B03-A017-DAF10A3A396B}"/>
     </a:ext>
   </a:extLst>
 </a:theme>
@@ -27688,7 +27782,7 @@
   <a:extraClrSchemeLst/>
   <a:extLst>
     <a:ext uri="{05A4C25C-085E-4340-85A3-A5531E510DB2}">
-      <thm15:themeFamily xmlns:thm15="http://schemas.microsoft.com/office/thememl/2012/main" name="Office Theme" id="{62F939B6-93AF-4DB8-9C6B-D6C7DFDC589F}" vid="{4A3C46E8-61CC-4603-A589-7422A47A8E4A}"/>
+      <thm15:themeFamily xmlns:thm15="http://schemas.microsoft.com/office/thememl/2012/main" xmlns="" name="Office Theme" id="{62F939B6-93AF-4DB8-9C6B-D6C7DFDC589F}" vid="{4A3C46E8-61CC-4603-A589-7422A47A8E4A}"/>
     </a:ext>
   </a:extLst>
 </a:theme>
@@ -27983,13 +28077,28 @@
   <a:extraClrSchemeLst/>
   <a:extLst>
     <a:ext uri="{05A4C25C-085E-4340-85A3-A5531E510DB2}">
-      <thm15:themeFamily xmlns:thm15="http://schemas.microsoft.com/office/thememl/2012/main" name="Office Theme" id="{62F939B6-93AF-4DB8-9C6B-D6C7DFDC589F}" vid="{4A3C46E8-61CC-4603-A589-7422A47A8E4A}"/>
+      <thm15:themeFamily xmlns:thm15="http://schemas.microsoft.com/office/thememl/2012/main" xmlns="" name="Office Theme" id="{62F939B6-93AF-4DB8-9C6B-D6C7DFDC589F}" vid="{4A3C46E8-61CC-4603-A589-7422A47A8E4A}"/>
     </a:ext>
   </a:extLst>
 </a:theme>
 </file>
 
 <file path=customXml/item1.xml><?xml version="1.0" encoding="utf-8"?>
+<p:properties xmlns:p="http://schemas.microsoft.com/office/2006/metadata/properties" xmlns:xsi="http://www.w3.org/2001/XMLSchema-instance" xmlns:pc="http://schemas.microsoft.com/office/infopath/2007/PartnerControls">
+  <documentManagement/>
+</p:properties>
+</file>
+
+<file path=customXml/item2.xml><?xml version="1.0" encoding="utf-8"?>
+<?mso-contentType ?>
+<FormTemplates xmlns="http://schemas.microsoft.com/sharepoint/v3/contenttype/forms">
+  <Display>DocumentLibraryForm</Display>
+  <Edit>DocumentLibraryForm</Edit>
+  <New>DocumentLibraryForm</New>
+</FormTemplates>
+</file>
+
+<file path=customXml/item3.xml><?xml version="1.0" encoding="utf-8"?>
 <ct:contentTypeSchema xmlns:ct="http://schemas.microsoft.com/office/2006/metadata/contentType" xmlns:ma="http://schemas.microsoft.com/office/2006/metadata/properties/metaAttributes" ct:_="" ma:_="" ma:contentTypeName="Документ" ma:contentTypeID="0x010100B6C18B0EB80FEC43B96FC4929E3ACDFF" ma:contentTypeVersion="8" ma:contentTypeDescription="Създаване на нов документ" ma:contentTypeScope="" ma:versionID="5e73c28b7fde86b7f49c9d6b9be21d41">
   <xsd:schema xmlns:xsd="http://www.w3.org/2001/XMLSchema" xmlns:xs="http://www.w3.org/2001/XMLSchema" xmlns:p="http://schemas.microsoft.com/office/2006/metadata/properties" xmlns:ns2="4f985cec-e092-4bcf-a1e1-b816bd0221d8" targetNamespace="http://schemas.microsoft.com/office/2006/metadata/properties" ma:root="true" ma:fieldsID="f7a640d6aa79659634b3275499e0d9c9" ns2:_="">
     <xsd:import namespace="4f985cec-e092-4bcf-a1e1-b816bd0221d8"/>
@@ -28161,22 +28270,31 @@
 </ct:contentTypeSchema>
 </file>
 
-<file path=customXml/item2.xml><?xml version="1.0" encoding="utf-8"?>
-<?mso-contentType ?>
-<FormTemplates xmlns="http://schemas.microsoft.com/sharepoint/v3/contenttype/forms">
-  <Display>DocumentLibraryForm</Display>
-  <Edit>DocumentLibraryForm</Edit>
-  <New>DocumentLibraryForm</New>
-</FormTemplates>
+<file path=customXml/itemProps1.xml><?xml version="1.0" encoding="utf-8"?>
+<ds:datastoreItem xmlns:ds="http://schemas.openxmlformats.org/officeDocument/2006/customXml" ds:itemID="{5E2F4A33-1866-4BB8-8A35-8D6BDFE8D9F5}">
+  <ds:schemaRefs>
+    <ds:schemaRef ds:uri="http://schemas.microsoft.com/office/infopath/2007/PartnerControls"/>
+    <ds:schemaRef ds:uri="http://purl.org/dc/dcmitype/"/>
+    <ds:schemaRef ds:uri="http://schemas.microsoft.com/office/2006/documentManagement/types"/>
+    <ds:schemaRef ds:uri="http://schemas.microsoft.com/office/2006/metadata/properties"/>
+    <ds:schemaRef ds:uri="http://www.w3.org/XML/1998/namespace"/>
+    <ds:schemaRef ds:uri="4f985cec-e092-4bcf-a1e1-b816bd0221d8"/>
+    <ds:schemaRef ds:uri="http://schemas.openxmlformats.org/package/2006/metadata/core-properties"/>
+    <ds:schemaRef ds:uri="http://purl.org/dc/terms/"/>
+    <ds:schemaRef ds:uri="http://purl.org/dc/elements/1.1/"/>
+  </ds:schemaRefs>
+</ds:datastoreItem>
 </file>
 
-<file path=customXml/item3.xml><?xml version="1.0" encoding="utf-8"?>
-<p:properties xmlns:p="http://schemas.microsoft.com/office/2006/metadata/properties" xmlns:xsi="http://www.w3.org/2001/XMLSchema-instance" xmlns:pc="http://schemas.microsoft.com/office/infopath/2007/PartnerControls">
-  <documentManagement/>
-</p:properties>
+<file path=customXml/itemProps2.xml><?xml version="1.0" encoding="utf-8"?>
+<ds:datastoreItem xmlns:ds="http://schemas.openxmlformats.org/officeDocument/2006/customXml" ds:itemID="{68A20BEC-F81B-49CD-951D-E62C4BAE7796}">
+  <ds:schemaRefs>
+    <ds:schemaRef ds:uri="http://schemas.microsoft.com/sharepoint/v3/contenttype/forms"/>
+  </ds:schemaRefs>
+</ds:datastoreItem>
 </file>
 
-<file path=customXml/itemProps1.xml><?xml version="1.0" encoding="utf-8"?>
+<file path=customXml/itemProps3.xml><?xml version="1.0" encoding="utf-8"?>
 <ds:datastoreItem xmlns:ds="http://schemas.openxmlformats.org/officeDocument/2006/customXml" ds:itemID="{4443A303-689A-4436-B140-8B2DF827EBE9}">
   <ds:schemaRefs>
     <ds:schemaRef ds:uri="http://schemas.microsoft.com/office/2006/metadata/contentType"/>
@@ -28192,28 +28310,4 @@
     <ds:schemaRef ds:uri="http://schemas.microsoft.com/internal/obd"/>
   </ds:schemaRefs>
 </ds:datastoreItem>
-</file>
-
-<file path=customXml/itemProps2.xml><?xml version="1.0" encoding="utf-8"?>
-<ds:datastoreItem xmlns:ds="http://schemas.openxmlformats.org/officeDocument/2006/customXml" ds:itemID="{68A20BEC-F81B-49CD-951D-E62C4BAE7796}">
-  <ds:schemaRefs>
-    <ds:schemaRef ds:uri="http://schemas.microsoft.com/sharepoint/v3/contenttype/forms"/>
-  </ds:schemaRefs>
-</ds:datastoreItem>
-</file>
-
-<file path=customXml/itemProps3.xml><?xml version="1.0" encoding="utf-8"?>
-<ds:datastoreItem xmlns:ds="http://schemas.openxmlformats.org/officeDocument/2006/customXml" ds:itemID="{5E2F4A33-1866-4BB8-8A35-8D6BDFE8D9F5}">
-  <ds:schemaRefs>
-    <ds:schemaRef ds:uri="http://schemas.microsoft.com/office/infopath/2007/PartnerControls"/>
-    <ds:schemaRef ds:uri="http://purl.org/dc/dcmitype/"/>
-    <ds:schemaRef ds:uri="http://schemas.microsoft.com/office/2006/documentManagement/types"/>
-    <ds:schemaRef ds:uri="http://schemas.microsoft.com/office/2006/metadata/properties"/>
-    <ds:schemaRef ds:uri="http://www.w3.org/XML/1998/namespace"/>
-    <ds:schemaRef ds:uri="4f985cec-e092-4bcf-a1e1-b816bd0221d8"/>
-    <ds:schemaRef ds:uri="http://schemas.openxmlformats.org/package/2006/metadata/core-properties"/>
-    <ds:schemaRef ds:uri="http://purl.org/dc/terms/"/>
-    <ds:schemaRef ds:uri="http://purl.org/dc/elements/1.1/"/>
-  </ds:schemaRefs>
-</ds:datastoreItem>
 </file>
</xml_diff>

<commit_message>
Fixes added to MS Access slides
</commit_message>
<xml_diff>
--- a/Courses/Software-Sciences/Module-3-Databases-New/11-MS-Access/11-MS-Access.pptx
+++ b/Courses/Software-Sciences/Module-3-Databases-New/11-MS-Access/11-MS-Access.pptx
@@ -14705,7 +14705,41 @@
                 </a:solidFill>
                 <a:latin typeface="Consolas" pitchFamily="49" charset="0"/>
               </a:rPr>
-              <a:t>Click to Add</a:t>
+              <a:t>Click</a:t>
+            </a:r>
+            <a:r>
+              <a:rPr lang="en-US" sz="3500" b="1" dirty="0" smtClean="0">
+                <a:solidFill>
+                  <a:schemeClr val="bg1"/>
+                </a:solidFill>
+              </a:rPr>
+              <a:t> </a:t>
+            </a:r>
+            <a:r>
+              <a:rPr lang="en-US" sz="3500" b="1" dirty="0" smtClean="0">
+                <a:solidFill>
+                  <a:schemeClr val="bg1"/>
+                </a:solidFill>
+                <a:latin typeface="Consolas" pitchFamily="49" charset="0"/>
+              </a:rPr>
+              <a:t>to</a:t>
+            </a:r>
+            <a:r>
+              <a:rPr lang="en-US" sz="3500" b="1" dirty="0" smtClean="0">
+                <a:solidFill>
+                  <a:schemeClr val="bg1"/>
+                </a:solidFill>
+              </a:rPr>
+              <a:t> </a:t>
+            </a:r>
+            <a:r>
+              <a:rPr lang="en-US" sz="3500" b="1" dirty="0" smtClean="0">
+                <a:solidFill>
+                  <a:schemeClr val="bg1"/>
+                </a:solidFill>
+                <a:latin typeface="Consolas" pitchFamily="49" charset="0"/>
+              </a:rPr>
+              <a:t>Add</a:t>
             </a:r>
             <a:r>
               <a:rPr lang="en-US" sz="3500" dirty="0" smtClean="0">
@@ -14930,7 +14964,11 @@
               <a:t>Rename</a:t>
             </a:r>
             <a:r>
-              <a:rPr lang="en-US" sz="3500" b="1" dirty="0" smtClean="0"/>
+              <a:rPr lang="en-US" sz="3500" b="1" dirty="0" smtClean="0">
+                <a:solidFill>
+                  <a:schemeClr val="bg1"/>
+                </a:solidFill>
+              </a:rPr>
               <a:t> </a:t>
             </a:r>
             <a:r>
@@ -15376,7 +15414,32 @@
                 </a:solidFill>
                 <a:latin typeface="Consolas" pitchFamily="49" charset="0"/>
               </a:rPr>
-              <a:t>Click to </a:t>
+              <a:t>Click</a:t>
+            </a:r>
+            <a:r>
+              <a:rPr lang="en-US" sz="3200" b="1" dirty="0" smtClean="0">
+                <a:solidFill>
+                  <a:schemeClr val="bg1"/>
+                </a:solidFill>
+              </a:rPr>
+              <a:t> </a:t>
+            </a:r>
+            <a:r>
+              <a:rPr lang="en-US" sz="3200" b="1" dirty="0" smtClean="0">
+                <a:solidFill>
+                  <a:schemeClr val="bg1"/>
+                </a:solidFill>
+                <a:latin typeface="Consolas" pitchFamily="49" charset="0"/>
+              </a:rPr>
+              <a:t>to</a:t>
+            </a:r>
+            <a:r>
+              <a:rPr lang="en-US" sz="3200" b="1" dirty="0" smtClean="0">
+                <a:solidFill>
+                  <a:schemeClr val="bg1"/>
+                </a:solidFill>
+              </a:rPr>
+              <a:t> </a:t>
             </a:r>
             <a:r>
               <a:rPr lang="en-US" sz="3200" b="1" dirty="0" smtClean="0">
@@ -17691,13 +17754,30 @@
               <a:t>В раздела </a:t>
             </a:r>
             <a:r>
-              <a:rPr lang="en-US" b="1" dirty="0">
+              <a:rPr lang="en-US" b="1" dirty="0" smtClean="0">
                 <a:solidFill>
                   <a:schemeClr val="bg1"/>
                 </a:solidFill>
                 <a:latin typeface="Consolas" pitchFamily="49" charset="0"/>
               </a:rPr>
-              <a:t>External Data</a:t>
+              <a:t>External</a:t>
+            </a:r>
+            <a:r>
+              <a:rPr lang="en-US" sz="3200" b="1" dirty="0" smtClean="0">
+                <a:solidFill>
+                  <a:schemeClr val="bg1"/>
+                </a:solidFill>
+              </a:rPr>
+              <a:t> </a:t>
+            </a:r>
+            <a:r>
+              <a:rPr lang="en-US" b="1" dirty="0" smtClean="0">
+                <a:solidFill>
+                  <a:schemeClr val="bg1"/>
+                </a:solidFill>
+                <a:latin typeface="Consolas" pitchFamily="49" charset="0"/>
+              </a:rPr>
+              <a:t>Data</a:t>
             </a:r>
             <a:r>
               <a:rPr lang="bg-BG" dirty="0"/>
@@ -17708,16 +17788,50 @@
               <a:t> </a:t>
             </a:r>
             <a:r>
-              <a:rPr lang="en-US" b="1" dirty="0">
+              <a:rPr lang="en-US" b="1" dirty="0" smtClean="0">
                 <a:solidFill>
                   <a:schemeClr val="bg1"/>
                 </a:solidFill>
                 <a:latin typeface="Consolas" pitchFamily="49" charset="0"/>
               </a:rPr>
-              <a:t>Import &amp; Link</a:t>
-            </a:r>
-            <a:r>
-              <a:rPr lang="bg-BG" b="1" dirty="0">
+              <a:t>Import</a:t>
+            </a:r>
+            <a:r>
+              <a:rPr lang="en-US" sz="3200" b="1" dirty="0" smtClean="0">
+                <a:solidFill>
+                  <a:schemeClr val="bg1"/>
+                </a:solidFill>
+              </a:rPr>
+              <a:t> </a:t>
+            </a:r>
+            <a:r>
+              <a:rPr lang="en-US" b="1" dirty="0" smtClean="0">
+                <a:solidFill>
+                  <a:schemeClr val="bg1"/>
+                </a:solidFill>
+                <a:latin typeface="Consolas" pitchFamily="49" charset="0"/>
+              </a:rPr>
+              <a:t>&amp;</a:t>
+            </a:r>
+            <a:r>
+              <a:rPr lang="en-US" sz="3200" b="1" dirty="0" smtClean="0">
+                <a:solidFill>
+                  <a:schemeClr val="bg1"/>
+                </a:solidFill>
+              </a:rPr>
+              <a:t> </a:t>
+            </a:r>
+            <a:r>
+              <a:rPr lang="en-US" b="1" dirty="0" smtClean="0">
+                <a:solidFill>
+                  <a:schemeClr val="bg1"/>
+                </a:solidFill>
+                <a:latin typeface="Consolas" pitchFamily="49" charset="0"/>
+              </a:rPr>
+              <a:t>Link</a:t>
+            </a:r>
+            <a:r>
+              <a:rPr lang="bg-BG" b="1" dirty="0" smtClean="0">
                 <a:solidFill>
                   <a:schemeClr val="bg1"/>
                 </a:solidFill>
@@ -18258,24 +18372,56 @@
               <a:t>от групата </a:t>
             </a:r>
             <a:r>
-              <a:rPr lang="en-US" sz="3200" b="1" dirty="0">
+              <a:rPr lang="en-US" sz="3200" b="1" dirty="0" smtClean="0">
                 <a:solidFill>
                   <a:schemeClr val="bg1"/>
                 </a:solidFill>
                 <a:latin typeface="Consolas" pitchFamily="49" charset="0"/>
               </a:rPr>
-              <a:t>Import &amp; Link</a:t>
-            </a:r>
-            <a:r>
-              <a:rPr lang="bg-BG" sz="3200" b="1" dirty="0">
+              <a:t>Import</a:t>
+            </a:r>
+            <a:r>
+              <a:rPr lang="en-US" sz="3200" b="1" dirty="0" smtClean="0">
                 <a:solidFill>
                   <a:schemeClr val="bg1"/>
                 </a:solidFill>
               </a:rPr>
               <a:t> </a:t>
             </a:r>
-          </a:p>
-          <a:p>
+            <a:r>
+              <a:rPr lang="en-US" sz="3200" b="1" dirty="0" smtClean="0">
+                <a:solidFill>
+                  <a:schemeClr val="bg1"/>
+                </a:solidFill>
+                <a:latin typeface="Consolas" pitchFamily="49" charset="0"/>
+              </a:rPr>
+              <a:t>&amp;</a:t>
+            </a:r>
+            <a:r>
+              <a:rPr lang="en-US" sz="3200" b="1" dirty="0" smtClean="0">
+                <a:solidFill>
+                  <a:schemeClr val="bg1"/>
+                </a:solidFill>
+              </a:rPr>
+              <a:t> </a:t>
+            </a:r>
+            <a:r>
+              <a:rPr lang="en-US" sz="3200" b="1" dirty="0" smtClean="0">
+                <a:solidFill>
+                  <a:schemeClr val="bg1"/>
+                </a:solidFill>
+                <a:latin typeface="Consolas" pitchFamily="49" charset="0"/>
+              </a:rPr>
+              <a:t>Link</a:t>
+            </a:r>
+            <a:r>
+              <a:rPr lang="bg-BG" sz="3200" b="1" dirty="0" smtClean="0">
+                <a:solidFill>
+                  <a:schemeClr val="bg1"/>
+                </a:solidFill>
+              </a:rPr>
+              <a:t> </a:t>
+            </a:r>
             <a:endParaRPr lang="bg-BG" sz="3200" b="1" dirty="0">
               <a:solidFill>
                 <a:schemeClr val="bg1"/>
@@ -18283,6 +18429,13 @@
             </a:endParaRPr>
           </a:p>
           <a:p>
+            <a:endParaRPr lang="bg-BG" sz="3200" b="1" dirty="0">
+              <a:solidFill>
+                <a:schemeClr val="bg1"/>
+              </a:solidFill>
+            </a:endParaRPr>
+          </a:p>
+          <a:p>
             <a:pPr>
               <a:buNone/>
             </a:pPr>
@@ -18298,13 +18451,98 @@
               <a:t>"</a:t>
             </a:r>
             <a:r>
-              <a:rPr lang="en-US" sz="3200" b="1" dirty="0">
+              <a:rPr lang="en-US" sz="3200" b="1" dirty="0" smtClean="0">
                 <a:solidFill>
                   <a:schemeClr val="bg1"/>
                 </a:solidFill>
                 <a:latin typeface="Consolas" pitchFamily="49" charset="0"/>
               </a:rPr>
-              <a:t>Get External Data – Excel Spreadsheet</a:t>
+              <a:t>Get</a:t>
+            </a:r>
+            <a:r>
+              <a:rPr lang="en-US" sz="3200" b="1" dirty="0" smtClean="0">
+                <a:solidFill>
+                  <a:schemeClr val="bg1"/>
+                </a:solidFill>
+              </a:rPr>
+              <a:t> </a:t>
+            </a:r>
+            <a:r>
+              <a:rPr lang="en-US" sz="3200" b="1" dirty="0" smtClean="0">
+                <a:solidFill>
+                  <a:schemeClr val="bg1"/>
+                </a:solidFill>
+                <a:latin typeface="Consolas" pitchFamily="49" charset="0"/>
+              </a:rPr>
+              <a:t>External</a:t>
+            </a:r>
+            <a:r>
+              <a:rPr lang="en-US" sz="3200" b="1" dirty="0" smtClean="0">
+                <a:solidFill>
+                  <a:schemeClr val="bg1"/>
+                </a:solidFill>
+              </a:rPr>
+              <a:t> </a:t>
+            </a:r>
+            <a:r>
+              <a:rPr lang="en-US" sz="3200" b="1" dirty="0" smtClean="0">
+                <a:solidFill>
+                  <a:schemeClr val="bg1"/>
+                </a:solidFill>
+                <a:latin typeface="Consolas" pitchFamily="49" charset="0"/>
+              </a:rPr>
+              <a:t>Data</a:t>
+            </a:r>
+            <a:r>
+              <a:rPr lang="en-US" sz="3200" b="1" dirty="0" smtClean="0">
+                <a:solidFill>
+                  <a:schemeClr val="bg1"/>
+                </a:solidFill>
+              </a:rPr>
+              <a:t> </a:t>
+            </a:r>
+            <a:r>
+              <a:rPr lang="en-US" sz="3200" b="1" dirty="0" smtClean="0">
+                <a:solidFill>
+                  <a:schemeClr val="bg1"/>
+                </a:solidFill>
+                <a:latin typeface="Consolas" pitchFamily="49" charset="0"/>
+              </a:rPr>
+              <a:t>–</a:t>
+            </a:r>
+            <a:r>
+              <a:rPr lang="en-US" sz="3200" b="1" dirty="0" smtClean="0">
+                <a:solidFill>
+                  <a:schemeClr val="bg1"/>
+                </a:solidFill>
+              </a:rPr>
+              <a:t> </a:t>
+            </a:r>
+            <a:r>
+              <a:rPr lang="en-US" sz="3200" b="1" dirty="0" smtClean="0">
+                <a:solidFill>
+                  <a:schemeClr val="bg1"/>
+                </a:solidFill>
+                <a:latin typeface="Consolas" pitchFamily="49" charset="0"/>
+              </a:rPr>
+              <a:t>Excel</a:t>
+            </a:r>
+            <a:r>
+              <a:rPr lang="en-US" sz="3200" b="1" dirty="0" smtClean="0">
+                <a:solidFill>
+                  <a:schemeClr val="bg1"/>
+                </a:solidFill>
+              </a:rPr>
+              <a:t> </a:t>
+            </a:r>
+            <a:r>
+              <a:rPr lang="en-US" sz="3200" b="1" dirty="0" smtClean="0">
+                <a:solidFill>
+                  <a:schemeClr val="bg1"/>
+                </a:solidFill>
+                <a:latin typeface="Consolas" pitchFamily="49" charset="0"/>
+              </a:rPr>
+              <a:t>Spreadsheet</a:t>
             </a:r>
             <a:r>
               <a:rPr lang="en-US" sz="3200" dirty="0"/>
@@ -18355,13 +18593,143 @@
               <a:t>"</a:t>
             </a:r>
             <a:r>
-              <a:rPr lang="en-US" sz="3200" b="1" dirty="0">
+              <a:rPr lang="en-US" sz="3200" b="1" dirty="0" smtClean="0">
                 <a:solidFill>
                   <a:schemeClr val="bg1"/>
                 </a:solidFill>
                 <a:latin typeface="Consolas" pitchFamily="49" charset="0"/>
               </a:rPr>
-              <a:t>Import the source data into a new table in the current database</a:t>
+              <a:t>Import</a:t>
+            </a:r>
+            <a:r>
+              <a:rPr lang="en-US" dirty="0" smtClean="0"/>
+              <a:t> </a:t>
+            </a:r>
+            <a:r>
+              <a:rPr lang="en-US" sz="3200" b="1" dirty="0" smtClean="0">
+                <a:solidFill>
+                  <a:schemeClr val="bg1"/>
+                </a:solidFill>
+                <a:latin typeface="Consolas" pitchFamily="49" charset="0"/>
+              </a:rPr>
+              <a:t>the</a:t>
+            </a:r>
+            <a:r>
+              <a:rPr lang="en-US" dirty="0" smtClean="0"/>
+              <a:t> </a:t>
+            </a:r>
+            <a:r>
+              <a:rPr lang="en-US" sz="3200" b="1" dirty="0" smtClean="0">
+                <a:solidFill>
+                  <a:schemeClr val="bg1"/>
+                </a:solidFill>
+                <a:latin typeface="Consolas" pitchFamily="49" charset="0"/>
+              </a:rPr>
+              <a:t>source</a:t>
+            </a:r>
+            <a:r>
+              <a:rPr lang="en-US" dirty="0" smtClean="0"/>
+              <a:t> </a:t>
+            </a:r>
+            <a:r>
+              <a:rPr lang="en-US" sz="3200" b="1" dirty="0" smtClean="0">
+                <a:solidFill>
+                  <a:schemeClr val="bg1"/>
+                </a:solidFill>
+                <a:latin typeface="Consolas" pitchFamily="49" charset="0"/>
+              </a:rPr>
+              <a:t>data</a:t>
+            </a:r>
+            <a:r>
+              <a:rPr lang="en-US" dirty="0" smtClean="0"/>
+              <a:t> </a:t>
+            </a:r>
+            <a:r>
+              <a:rPr lang="en-US" sz="3200" b="1" dirty="0" smtClean="0">
+                <a:solidFill>
+                  <a:schemeClr val="bg1"/>
+                </a:solidFill>
+                <a:latin typeface="Consolas" pitchFamily="49" charset="0"/>
+              </a:rPr>
+              <a:t>into</a:t>
+            </a:r>
+            <a:r>
+              <a:rPr lang="en-US" dirty="0" smtClean="0"/>
+              <a:t> </a:t>
+            </a:r>
+            <a:r>
+              <a:rPr lang="en-US" sz="3200" b="1" dirty="0" smtClean="0">
+                <a:solidFill>
+                  <a:schemeClr val="bg1"/>
+                </a:solidFill>
+                <a:latin typeface="Consolas" pitchFamily="49" charset="0"/>
+              </a:rPr>
+              <a:t>a</a:t>
+            </a:r>
+            <a:r>
+              <a:rPr lang="en-US" dirty="0" smtClean="0"/>
+              <a:t> </a:t>
+            </a:r>
+            <a:r>
+              <a:rPr lang="en-US" sz="3200" b="1" dirty="0" smtClean="0">
+                <a:solidFill>
+                  <a:schemeClr val="bg1"/>
+                </a:solidFill>
+                <a:latin typeface="Consolas" pitchFamily="49" charset="0"/>
+              </a:rPr>
+              <a:t>new table</a:t>
+            </a:r>
+            <a:r>
+              <a:rPr lang="en-US" dirty="0" smtClean="0"/>
+              <a:t> </a:t>
+            </a:r>
+            <a:r>
+              <a:rPr lang="en-US" sz="3200" b="1" dirty="0" smtClean="0">
+                <a:solidFill>
+                  <a:schemeClr val="bg1"/>
+                </a:solidFill>
+                <a:latin typeface="Consolas" pitchFamily="49" charset="0"/>
+              </a:rPr>
+              <a:t>in</a:t>
+            </a:r>
+            <a:r>
+              <a:rPr lang="en-US" dirty="0" smtClean="0"/>
+              <a:t> </a:t>
+            </a:r>
+            <a:r>
+              <a:rPr lang="en-US" sz="3200" b="1" dirty="0" smtClean="0">
+                <a:solidFill>
+                  <a:schemeClr val="bg1"/>
+                </a:solidFill>
+                <a:latin typeface="Consolas" pitchFamily="49" charset="0"/>
+              </a:rPr>
+              <a:t>the</a:t>
+            </a:r>
+            <a:r>
+              <a:rPr lang="en-US" dirty="0" smtClean="0"/>
+              <a:t> </a:t>
+            </a:r>
+            <a:r>
+              <a:rPr lang="en-US" sz="3200" b="1" dirty="0" smtClean="0">
+                <a:solidFill>
+                  <a:schemeClr val="bg1"/>
+                </a:solidFill>
+                <a:latin typeface="Consolas" pitchFamily="49" charset="0"/>
+              </a:rPr>
+              <a:t>current</a:t>
+            </a:r>
+            <a:r>
+              <a:rPr lang="en-US" dirty="0" smtClean="0"/>
+              <a:t> </a:t>
+            </a:r>
+            <a:r>
+              <a:rPr lang="en-US" sz="3200" b="1" dirty="0" smtClean="0">
+                <a:solidFill>
+                  <a:schemeClr val="bg1"/>
+                </a:solidFill>
+                <a:latin typeface="Consolas" pitchFamily="49" charset="0"/>
+              </a:rPr>
+              <a:t>database</a:t>
             </a:r>
             <a:r>
               <a:rPr lang="en-US" sz="3200" dirty="0"/>
@@ -20975,16 +21343,33 @@
               <a:t>В </a:t>
             </a:r>
             <a:r>
-              <a:rPr lang="en-US" sz="3000" b="1" dirty="0">
+              <a:rPr lang="en-US" sz="3000" b="1" dirty="0" smtClean="0">
                 <a:solidFill>
                   <a:schemeClr val="bg1"/>
                 </a:solidFill>
                 <a:latin typeface="Consolas" pitchFamily="49" charset="0"/>
               </a:rPr>
-              <a:t>Navigation Pane</a:t>
-            </a:r>
-            <a:r>
-              <a:rPr lang="bg-BG" sz="3000" dirty="0"/>
+              <a:t>Navigation</a:t>
+            </a:r>
+            <a:r>
+              <a:rPr lang="en-US" sz="3200" b="1" dirty="0" smtClean="0">
+                <a:solidFill>
+                  <a:schemeClr val="bg1"/>
+                </a:solidFill>
+              </a:rPr>
+              <a:t> </a:t>
+            </a:r>
+            <a:r>
+              <a:rPr lang="en-US" sz="3000" b="1" dirty="0" smtClean="0">
+                <a:solidFill>
+                  <a:schemeClr val="bg1"/>
+                </a:solidFill>
+                <a:latin typeface="Consolas" pitchFamily="49" charset="0"/>
+              </a:rPr>
+              <a:t>Pane</a:t>
+            </a:r>
+            <a:r>
+              <a:rPr lang="bg-BG" sz="3000" dirty="0" smtClean="0"/>
               <a:t> </a:t>
             </a:r>
             <a:r>

</xml_diff>

<commit_message>
Fixes and TODOs for MS Access slides
</commit_message>
<xml_diff>
--- a/Courses/Software-Sciences/Module-3-Databases-New/11-MS-Access/11-MS-Access.pptx
+++ b/Courses/Software-Sciences/Module-3-Databases-New/11-MS-Access/11-MS-Access.pptx
@@ -5,10 +5,10 @@
     <p:sldMasterId id="2147483675" r:id="rId4"/>
   </p:sldMasterIdLst>
   <p:notesMasterIdLst>
-    <p:notesMasterId r:id="rId62"/>
+    <p:notesMasterId r:id="rId63"/>
   </p:notesMasterIdLst>
   <p:handoutMasterIdLst>
-    <p:handoutMasterId r:id="rId63"/>
+    <p:handoutMasterId r:id="rId64"/>
   </p:handoutMasterIdLst>
   <p:sldIdLst>
     <p:sldId id="503" r:id="rId5"/>
@@ -53,21 +53,22 @@
     <p:sldId id="560" r:id="rId44"/>
     <p:sldId id="561" r:id="rId45"/>
     <p:sldId id="562" r:id="rId46"/>
-    <p:sldId id="542" r:id="rId47"/>
-    <p:sldId id="543" r:id="rId48"/>
-    <p:sldId id="544" r:id="rId49"/>
-    <p:sldId id="545" r:id="rId50"/>
-    <p:sldId id="546" r:id="rId51"/>
-    <p:sldId id="548" r:id="rId52"/>
-    <p:sldId id="549" r:id="rId53"/>
-    <p:sldId id="550" r:id="rId54"/>
-    <p:sldId id="551" r:id="rId55"/>
-    <p:sldId id="552" r:id="rId56"/>
-    <p:sldId id="553" r:id="rId57"/>
-    <p:sldId id="554" r:id="rId58"/>
-    <p:sldId id="349" r:id="rId59"/>
-    <p:sldId id="256" r:id="rId60"/>
-    <p:sldId id="493" r:id="rId61"/>
+    <p:sldId id="579" r:id="rId47"/>
+    <p:sldId id="542" r:id="rId48"/>
+    <p:sldId id="543" r:id="rId49"/>
+    <p:sldId id="544" r:id="rId50"/>
+    <p:sldId id="545" r:id="rId51"/>
+    <p:sldId id="546" r:id="rId52"/>
+    <p:sldId id="548" r:id="rId53"/>
+    <p:sldId id="549" r:id="rId54"/>
+    <p:sldId id="550" r:id="rId55"/>
+    <p:sldId id="551" r:id="rId56"/>
+    <p:sldId id="552" r:id="rId57"/>
+    <p:sldId id="553" r:id="rId58"/>
+    <p:sldId id="554" r:id="rId59"/>
+    <p:sldId id="349" r:id="rId60"/>
+    <p:sldId id="256" r:id="rId61"/>
+    <p:sldId id="493" r:id="rId62"/>
   </p:sldIdLst>
   <p:sldSz cx="12192000" cy="6858000"/>
   <p:notesSz cx="6858000" cy="9144000"/>
@@ -233,6 +234,7 @@
             <p14:sldId id="560"/>
             <p14:sldId id="561"/>
             <p14:sldId id="562"/>
+            <p14:sldId id="579"/>
           </p14:sldIdLst>
         </p14:section>
         <p14:section name="Формуляри" id="{7BDC2BCA-A701-1E40-8B09-18A08493787F}">
@@ -427,7 +429,7 @@
             <a:fld id="{4E087215-0C8F-4762-A664-737A353EC9A4}" type="datetimeFigureOut">
               <a:rPr lang="bg-BG" smtClean="0"/>
               <a:pPr/>
-              <a:t>26.9.2023 г.</a:t>
+              <a:t>29.09.23 г.</a:t>
             </a:fld>
             <a:endParaRPr lang="bg-BG" dirty="0"/>
           </a:p>
@@ -620,7 +622,7 @@
             <a:fld id="{72D84649-876A-46C9-8472-14CB09C070D8}" type="datetimeFigureOut">
               <a:rPr lang="en-US" smtClean="0"/>
               <a:pPr/>
-              <a:t>9/25/2023</a:t>
+              <a:t>9/29/23</a:t>
             </a:fld>
             <a:endParaRPr lang="en-US" dirty="0"/>
           </a:p>
@@ -1341,7 +1343,7 @@
             <a:fld id="{2BF067CD-8E6B-4360-9AA8-C5DF2A48A6D1}" type="slidenum">
               <a:rPr lang="en-US" smtClean="0"/>
               <a:pPr/>
-              <a:t>49</a:t>
+              <a:t>50</a:t>
             </a:fld>
             <a:endParaRPr lang="en-US" dirty="0"/>
           </a:p>
@@ -1560,7 +1562,7 @@
             <a:fld id="{3EBA5BD7-F043-4D1B-AA17-CD412FC534DE}" type="slidenum">
               <a:rPr lang="en-US" smtClean="0"/>
               <a:pPr/>
-              <a:t>55</a:t>
+              <a:t>56</a:t>
             </a:fld>
             <a:endParaRPr lang="en-US" dirty="0"/>
           </a:p>
@@ -1683,7 +1685,7 @@
             <a:fld id="{85C0F205-FB23-4B4A-AA1E-CC80DEDB9B7E}" type="slidenum">
               <a:rPr lang="x-none" smtClean="0"/>
               <a:pPr/>
-              <a:t>56</a:t>
+              <a:t>57</a:t>
             </a:fld>
             <a:endParaRPr lang="x-none"/>
           </a:p>
@@ -1874,7 +1876,7 @@
             <a:fld id="{3EBA5BD7-F043-4D1B-AA17-CD412FC534DE}" type="slidenum">
               <a:rPr lang="en-US" smtClean="0"/>
               <a:pPr/>
-              <a:t>57</a:t>
+              <a:t>58</a:t>
             </a:fld>
             <a:endParaRPr lang="en-US" dirty="0"/>
           </a:p>
@@ -6117,7 +6119,7 @@
             <a:fld id="{1CF2F75B-1C4E-1E47-AE31-5B79E79ADF4F}" type="datetimeFigureOut">
               <a:rPr lang="x-none" smtClean="0"/>
               <a:pPr/>
-              <a:t>9/25/2023</a:t>
+              <a:t>29.09.23</a:t>
             </a:fld>
             <a:endParaRPr lang="x-none"/>
           </a:p>
@@ -7231,7 +7233,7 @@
             <a:fld id="{1D8BD707-D9CF-40AE-B4C6-C98DA3205C09}" type="datetimeFigureOut">
               <a:rPr lang="en-US"/>
               <a:pPr/>
-              <a:t>9/25/2023</a:t>
+              <a:t>9/29/23</a:t>
             </a:fld>
             <a:endParaRPr lang="en-US" dirty="0"/>
           </a:p>
@@ -15639,8 +15641,8 @@
         </p:nvSpPr>
         <p:spPr bwMode="auto">
           <a:xfrm>
-            <a:off x="7620000" y="4419600"/>
-            <a:ext cx="2286000" cy="762000"/>
+            <a:off x="7620000" y="4533900"/>
+            <a:ext cx="2286000" cy="647700"/>
           </a:xfrm>
           <a:prstGeom prst="wedgeRoundRectCallout">
             <a:avLst>
@@ -16465,12 +16467,20 @@
               <a:t>чрез </a:t>
             </a:r>
             <a:r>
+              <a:rPr lang="ru-RU" b="1" dirty="0" err="1">
+                <a:solidFill>
+                  <a:schemeClr val="bg1"/>
+                </a:solidFill>
+              </a:rPr>
+              <a:t>импортиране</a:t>
+            </a:r>
+            <a:r>
               <a:rPr lang="ru-RU" b="1" dirty="0">
                 <a:solidFill>
                   <a:schemeClr val="bg1"/>
                 </a:solidFill>
               </a:rPr>
-              <a:t>импортиране </a:t>
+              <a:t> </a:t>
             </a:r>
             <a:r>
               <a:rPr lang="ru-RU" dirty="0"/>
@@ -18287,7 +18297,7 @@
             </a:r>
             <a:r>
               <a:rPr lang="en-US" sz="3200" dirty="0"/>
-              <a:t>“</a:t>
+              <a:t>"</a:t>
             </a:r>
           </a:p>
           <a:p>
@@ -18484,6 +18494,10 @@
               <a:t>Натиснете </a:t>
             </a:r>
             <a:r>
+              <a:rPr lang="en-US" sz="3200" dirty="0"/>
+              <a:t>[</a:t>
+            </a:r>
+            <a:r>
               <a:rPr lang="bg-BG" sz="3200" b="1" dirty="0">
                 <a:solidFill>
                   <a:schemeClr val="bg1"/>
@@ -18492,9 +18506,12 @@
               </a:rPr>
               <a:t>OK</a:t>
             </a:r>
-            <a:endParaRPr lang="en-US" sz="3200" dirty="0">
-              <a:latin typeface="Consolas" pitchFamily="49" charset="0"/>
-            </a:endParaRPr>
+            <a:r>
+              <a:rPr lang="en-US" sz="3200" dirty="0">
+                <a:latin typeface="Consolas" pitchFamily="49" charset="0"/>
+              </a:rPr>
+              <a:t>]</a:t>
+            </a:r>
           </a:p>
         </p:txBody>
       </p:sp>
@@ -20380,7 +20397,7 @@
               <a:t> за </a:t>
             </a:r>
             <a:r>
-              <a:rPr lang="ru-RU" b="1" dirty="0">
+              <a:rPr lang="ru-RU" b="1" dirty="0" err="1">
                 <a:solidFill>
                   <a:schemeClr val="bg1"/>
                 </a:solidFill>
@@ -20517,8 +20534,8 @@
         </p:nvSpPr>
         <p:spPr>
           <a:xfrm>
-            <a:off x="7315200" y="6291229"/>
-            <a:ext cx="609600" cy="254700"/>
+            <a:off x="7315200" y="6324599"/>
+            <a:ext cx="609600" cy="221329"/>
           </a:xfrm>
           <a:prstGeom prst="roundRect">
             <a:avLst>
@@ -20819,7 +20836,7 @@
             </a:r>
             <a:r>
               <a:rPr lang="en-US" dirty="0"/>
-              <a:t>‘</a:t>
+              <a:t>'</a:t>
             </a:r>
             <a:r>
               <a:rPr lang="en-US" b="1" dirty="0">
@@ -20831,7 +20848,7 @@
             </a:r>
             <a:r>
               <a:rPr lang="en-US" dirty="0"/>
-              <a:t>’</a:t>
+              <a:t>'</a:t>
             </a:r>
             <a:r>
               <a:rPr lang="ru-RU" dirty="0"/>
@@ -21160,7 +21177,7 @@
                             </p:stCondLst>
                             <p:childTnLst>
                               <p:par>
-                                <p:cTn id="9" presetID="1" presetClass="entr" presetSubtype="0" fill="hold" grpId="0" nodeType="clickEffect">
+                                <p:cTn id="9" presetID="1" presetClass="entr" presetSubtype="0" fill="hold" nodeType="clickEffect">
                                   <p:stCondLst>
                                     <p:cond delay="0"/>
                                   </p:stCondLst>
@@ -21168,6 +21185,55 @@
                                     <p:set>
                                       <p:cBhvr>
                                         <p:cTn id="10" dur="1" fill="hold">
+                                          <p:stCondLst>
+                                            <p:cond delay="0"/>
+                                          </p:stCondLst>
+                                        </p:cTn>
+                                        <p:tgtEl>
+                                          <p:spTgt spid="3">
+                                            <p:txEl>
+                                              <p:pRg st="1" end="1"/>
+                                            </p:txEl>
+                                          </p:spTgt>
+                                        </p:tgtEl>
+                                        <p:attrNameLst>
+                                          <p:attrName>style.visibility</p:attrName>
+                                        </p:attrNameLst>
+                                      </p:cBhvr>
+                                      <p:to>
+                                        <p:strVal val="visible"/>
+                                      </p:to>
+                                    </p:set>
+                                  </p:childTnLst>
+                                </p:cTn>
+                              </p:par>
+                            </p:childTnLst>
+                          </p:cTn>
+                        </p:par>
+                      </p:childTnLst>
+                    </p:cTn>
+                  </p:par>
+                  <p:par>
+                    <p:cTn id="11" fill="hold">
+                      <p:stCondLst>
+                        <p:cond delay="indefinite"/>
+                      </p:stCondLst>
+                      <p:childTnLst>
+                        <p:par>
+                          <p:cTn id="12" fill="hold">
+                            <p:stCondLst>
+                              <p:cond delay="0"/>
+                            </p:stCondLst>
+                            <p:childTnLst>
+                              <p:par>
+                                <p:cTn id="13" presetID="1" presetClass="entr" presetSubtype="0" fill="hold" grpId="0" nodeType="clickEffect">
+                                  <p:stCondLst>
+                                    <p:cond delay="0"/>
+                                  </p:stCondLst>
+                                  <p:childTnLst>
+                                    <p:set>
+                                      <p:cBhvr>
+                                        <p:cTn id="14" dur="1" fill="hold">
                                           <p:stCondLst>
                                             <p:cond delay="0"/>
                                           </p:stCondLst>
@@ -21921,7 +21987,7 @@
             </a:r>
             <a:r>
               <a:rPr lang="en-US" dirty="0"/>
-              <a:t>‘</a:t>
+              <a:t>'</a:t>
             </a:r>
             <a:r>
               <a:rPr lang="en-US" b="1" dirty="0">
@@ -21933,7 +21999,7 @@
             </a:r>
             <a:r>
               <a:rPr lang="en-US" dirty="0"/>
-              <a:t>’</a:t>
+              <a:t>'</a:t>
             </a:r>
           </a:p>
           <a:p>
@@ -22007,7 +22073,7 @@
           <a:p>
             <a:r>
               <a:rPr lang="ru-RU" dirty="0"/>
-              <a:t>Натиснете върху </a:t>
+              <a:t>Натиснете </a:t>
             </a:r>
             <a:r>
               <a:rPr lang="en-US" dirty="0">
@@ -22673,7 +22739,19 @@
             </a:r>
             <a:r>
               <a:rPr lang="ru-RU" sz="3400" dirty="0"/>
-              <a:t> не се синхронизират</a:t>
+              <a:t> </a:t>
+            </a:r>
+            <a:r>
+              <a:rPr lang="ru-RU" sz="3400" b="1" dirty="0">
+                <a:solidFill>
+                  <a:schemeClr val="bg1"/>
+                </a:solidFill>
+              </a:rPr>
+              <a:t>не</a:t>
+            </a:r>
+            <a:r>
+              <a:rPr lang="ru-RU" sz="3400" dirty="0"/>
+              <a:t> се синхронизират</a:t>
             </a:r>
             <a:endParaRPr lang="en-US" sz="3400" dirty="0"/>
           </a:p>
@@ -25157,7 +25235,15 @@
             </a:r>
             <a:r>
               <a:rPr lang="ru-RU" dirty="0"/>
-              <a:t> за импортиране:</a:t>
+              <a:t> за </a:t>
+            </a:r>
+            <a:r>
+              <a:rPr lang="ru-RU" dirty="0" err="1"/>
+              <a:t>импортиране</a:t>
+            </a:r>
+            <a:r>
+              <a:rPr lang="ru-RU" dirty="0"/>
+              <a:t>:</a:t>
             </a:r>
           </a:p>
           <a:p>
@@ -25378,6 +25464,68 @@
           </a:extLst>
         </p:spPr>
       </p:pic>
+      <p:sp>
+        <p:nvSpPr>
+          <p:cNvPr id="5" name="TextBox 4">
+            <a:extLst>
+              <a:ext uri="{FF2B5EF4-FFF2-40B4-BE49-F238E27FC236}">
+                <a16:creationId xmlns:a16="http://schemas.microsoft.com/office/drawing/2014/main" id="{FCE53D7A-A030-9F02-FD72-B0B1EEA7711D}"/>
+              </a:ext>
+            </a:extLst>
+          </p:cNvPr>
+          <p:cNvSpPr txBox="1"/>
+          <p:nvPr/>
+        </p:nvSpPr>
+        <p:spPr>
+          <a:xfrm>
+            <a:off x="609600" y="3886200"/>
+            <a:ext cx="5791200" cy="1406383"/>
+          </a:xfrm>
+          <a:prstGeom prst="rect">
+            <a:avLst/>
+          </a:prstGeom>
+          <a:ln/>
+        </p:spPr>
+        <p:style>
+          <a:lnRef idx="2">
+            <a:schemeClr val="accent2"/>
+          </a:lnRef>
+          <a:fillRef idx="1">
+            <a:schemeClr val="lt1"/>
+          </a:fillRef>
+          <a:effectRef idx="0">
+            <a:schemeClr val="accent2"/>
+          </a:effectRef>
+          <a:fontRef idx="minor">
+            <a:schemeClr val="dk1"/>
+          </a:fontRef>
+        </p:style>
+        <p:txBody>
+          <a:bodyPr vert="horz" wrap="square" lIns="144000" tIns="108000" rIns="144000" bIns="108000" rtlCol="0">
+            <a:spAutoFit/>
+          </a:bodyPr>
+          <a:lstStyle/>
+          <a:p>
+            <a:pPr algn="l" eaLnBrk="0" hangingPunct="0">
+              <a:lnSpc>
+                <a:spcPct val="110000"/>
+              </a:lnSpc>
+              <a:buClr>
+                <a:schemeClr val="accent5">
+                  <a:lumMod val="40000"/>
+                  <a:lumOff val="60000"/>
+                </a:schemeClr>
+              </a:buClr>
+              <a:buSzPct val="70000"/>
+            </a:pPr>
+            <a:r>
+              <a:rPr lang="en-US" sz="3600" b="1" dirty="0"/>
+              <a:t>TODO: change screenshot so that [OK] button is visible</a:t>
+            </a:r>
+            <a:endParaRPr lang="bg-BG" sz="3600" b="1" dirty="0"/>
+          </a:p>
+        </p:txBody>
+      </p:sp>
     </p:spTree>
     <p:extLst>
       <p:ext uri="{BB962C8B-B14F-4D97-AF65-F5344CB8AC3E}">
@@ -25418,31 +25566,6 @@
       </p:grpSpPr>
       <p:sp>
         <p:nvSpPr>
-          <p:cNvPr id="2" name="Subtitle 1">
-            <a:extLst>
-              <a:ext uri="{FF2B5EF4-FFF2-40B4-BE49-F238E27FC236}">
-                <a16:creationId xmlns:a16="http://schemas.microsoft.com/office/drawing/2014/main" id="{1D1921AF-88B7-45FE-C2CC-1B3FF6228BF9}"/>
-              </a:ext>
-            </a:extLst>
-          </p:cNvPr>
-          <p:cNvSpPr>
-            <a:spLocks noGrp="1"/>
-          </p:cNvSpPr>
-          <p:nvPr>
-            <p:ph type="subTitle" sz="quarter" idx="11"/>
-          </p:nvPr>
-        </p:nvSpPr>
-        <p:spPr/>
-        <p:txBody>
-          <a:bodyPr/>
-          <a:lstStyle/>
-          <a:p>
-            <a:endParaRPr lang="en-US"/>
-          </a:p>
-        </p:txBody>
-      </p:sp>
-      <p:sp>
-        <p:nvSpPr>
           <p:cNvPr id="3" name="Title 2">
             <a:extLst>
               <a:ext uri="{FF2B5EF4-FFF2-40B4-BE49-F238E27FC236}">
@@ -25463,36 +25586,12 @@
           <a:lstStyle/>
           <a:p>
             <a:r>
-              <a:rPr lang="en-US" sz="5350" dirty="0" err="1">
-                <a:cs typeface="Arial"/>
-              </a:rPr>
-              <a:t>Създаване</a:t>
-            </a:r>
-            <a:r>
               <a:rPr lang="en-US" sz="5350" dirty="0">
                 <a:cs typeface="Arial"/>
               </a:rPr>
-              <a:t> </a:t>
-            </a:r>
-            <a:r>
-              <a:rPr lang="en-US" sz="5350" dirty="0" err="1">
-                <a:cs typeface="Arial"/>
-              </a:rPr>
-              <a:t>на</a:t>
-            </a:r>
-            <a:r>
-              <a:rPr lang="en-US" sz="5350" dirty="0">
-                <a:cs typeface="Arial"/>
-              </a:rPr>
-              <a:t> </a:t>
-            </a:r>
-            <a:r>
-              <a:rPr lang="en-US" sz="5350" dirty="0" err="1">
-                <a:cs typeface="Arial"/>
-              </a:rPr>
-              <a:t>заявки</a:t>
-            </a:r>
-            <a:endParaRPr lang="en-US" dirty="0" err="1"/>
+              <a:t>Създаване на заявки</a:t>
+            </a:r>
+            <a:endParaRPr lang="en-US" dirty="0"/>
           </a:p>
         </p:txBody>
       </p:sp>
@@ -25716,7 +25815,7 @@
             </a:r>
             <a:r>
               <a:rPr lang="en-US" dirty="0"/>
-              <a:t>, </a:t>
+              <a:t> </a:t>
             </a:r>
             <a:r>
               <a:rPr lang="bg-BG" dirty="0"/>
@@ -27516,7 +27615,15 @@
             </a:r>
             <a:r>
               <a:rPr lang="ru-RU" dirty="0"/>
-              <a:t>, когато я изпълняваме се нуждаем от </a:t>
+              <a:t>, когато я изпълняваме</a:t>
+            </a:r>
+            <a:r>
+              <a:rPr lang="en-US" dirty="0"/>
+              <a:t>,</a:t>
+            </a:r>
+            <a:r>
+              <a:rPr lang="ru-RU" dirty="0"/>
+              <a:t> се нуждаем от </a:t>
             </a:r>
             <a:r>
               <a:rPr lang="bg-BG" b="1" dirty="0">
@@ -28496,7 +28603,7 @@
             </a:r>
             <a:r>
               <a:rPr lang="ru-RU" dirty="0"/>
-              <a:t>, и след това натиснете върху </a:t>
+              <a:t>, и след това натиснете </a:t>
             </a:r>
             <a:r>
               <a:rPr lang="en-US" dirty="0">
@@ -30813,6 +30920,163 @@
       </p:grpSpPr>
       <p:sp>
         <p:nvSpPr>
+          <p:cNvPr id="2" name="Slide Number Placeholder 1"/>
+          <p:cNvSpPr>
+            <a:spLocks noGrp="1"/>
+          </p:cNvSpPr>
+          <p:nvPr>
+            <p:ph type="sldNum" sz="quarter" idx="5"/>
+          </p:nvPr>
+        </p:nvSpPr>
+        <p:spPr/>
+        <p:txBody>
+          <a:bodyPr/>
+          <a:lstStyle/>
+          <a:p>
+            <a:fld id="{2BF067CD-8E6B-4360-9AA8-C5DF2A48A6D1}" type="slidenum">
+              <a:rPr lang="en-US" noProof="0" smtClean="0"/>
+              <a:pPr/>
+              <a:t>43</a:t>
+            </a:fld>
+            <a:endParaRPr lang="en-US" noProof="0" dirty="0"/>
+          </a:p>
+        </p:txBody>
+      </p:sp>
+      <p:sp>
+        <p:nvSpPr>
+          <p:cNvPr id="4" name="Title 3"/>
+          <p:cNvSpPr>
+            <a:spLocks noGrp="1"/>
+          </p:cNvSpPr>
+          <p:nvPr>
+            <p:ph type="title"/>
+          </p:nvPr>
+        </p:nvSpPr>
+        <p:spPr/>
+        <p:txBody>
+          <a:bodyPr>
+            <a:normAutofit fontScale="90000"/>
+          </a:bodyPr>
+          <a:lstStyle/>
+          <a:p>
+            <a:r>
+              <a:rPr lang="bg-BG" dirty="0"/>
+              <a:t>Специфициране на типове данни </a:t>
+            </a:r>
+            <a:r>
+              <a:rPr lang="en-US" dirty="0"/>
+              <a:t>– </a:t>
+            </a:r>
+            <a:r>
+              <a:rPr lang="bg-BG" dirty="0"/>
+              <a:t>Пример</a:t>
+            </a:r>
+            <a:endParaRPr lang="en-US" dirty="0"/>
+          </a:p>
+        </p:txBody>
+      </p:sp>
+      <p:sp>
+        <p:nvSpPr>
+          <p:cNvPr id="5" name="TextBox 4">
+            <a:extLst>
+              <a:ext uri="{FF2B5EF4-FFF2-40B4-BE49-F238E27FC236}">
+                <a16:creationId xmlns:a16="http://schemas.microsoft.com/office/drawing/2014/main" id="{F45D9228-4AB9-E81D-DEC5-BA8AB1E21727}"/>
+              </a:ext>
+            </a:extLst>
+          </p:cNvPr>
+          <p:cNvSpPr txBox="1"/>
+          <p:nvPr/>
+        </p:nvSpPr>
+        <p:spPr>
+          <a:xfrm>
+            <a:off x="838200" y="3352800"/>
+            <a:ext cx="10318686" cy="1182989"/>
+          </a:xfrm>
+          <a:prstGeom prst="rect">
+            <a:avLst/>
+          </a:prstGeom>
+          <a:ln/>
+        </p:spPr>
+        <p:style>
+          <a:lnRef idx="2">
+            <a:schemeClr val="accent2"/>
+          </a:lnRef>
+          <a:fillRef idx="1">
+            <a:schemeClr val="lt1"/>
+          </a:fillRef>
+          <a:effectRef idx="0">
+            <a:schemeClr val="accent2"/>
+          </a:effectRef>
+          <a:fontRef idx="minor">
+            <a:schemeClr val="dk1"/>
+          </a:fontRef>
+        </p:style>
+        <p:txBody>
+          <a:bodyPr vert="horz" wrap="none" lIns="144000" tIns="108000" rIns="144000" bIns="108000" rtlCol="0">
+            <a:spAutoFit/>
+          </a:bodyPr>
+          <a:lstStyle/>
+          <a:p>
+            <a:pPr algn="l" eaLnBrk="0" hangingPunct="0">
+              <a:lnSpc>
+                <a:spcPct val="110000"/>
+              </a:lnSpc>
+              <a:buClr>
+                <a:schemeClr val="accent5">
+                  <a:lumMod val="40000"/>
+                  <a:lumOff val="60000"/>
+                </a:schemeClr>
+              </a:buClr>
+              <a:buSzPct val="70000"/>
+            </a:pPr>
+            <a:r>
+              <a:rPr lang="en-US" sz="6000" b="1" dirty="0"/>
+              <a:t>TODO: add example screenshot</a:t>
+            </a:r>
+            <a:endParaRPr lang="bg-BG" sz="6000" b="1" dirty="0"/>
+          </a:p>
+        </p:txBody>
+      </p:sp>
+    </p:spTree>
+    <p:extLst>
+      <p:ext uri="{BB962C8B-B14F-4D97-AF65-F5344CB8AC3E}">
+        <p14:creationId xmlns:p14="http://schemas.microsoft.com/office/powerpoint/2010/main" val="2312411611"/>
+      </p:ext>
+    </p:extLst>
+  </p:cSld>
+  <p:clrMapOvr>
+    <a:masterClrMapping/>
+  </p:clrMapOvr>
+  <mc:AlternateContent xmlns:mc="http://schemas.openxmlformats.org/markup-compatibility/2006">
+    <mc:Choice xmlns:p14="http://schemas.microsoft.com/office/powerpoint/2010/main" Requires="p14">
+      <p:transition spd="slow" p14:dur="2000" advClick="0" advTm="5000"/>
+    </mc:Choice>
+    <mc:Fallback>
+      <p:transition spd="slow" advClick="0" advTm="5000"/>
+    </mc:Fallback>
+  </mc:AlternateContent>
+</p:sld>
+</file>
+
+<file path=ppt/slides/slide44.xml><?xml version="1.0" encoding="utf-8"?>
+<p:sld xmlns:a="http://schemas.openxmlformats.org/drawingml/2006/main" xmlns:r="http://schemas.openxmlformats.org/officeDocument/2006/relationships" xmlns:p="http://schemas.openxmlformats.org/presentationml/2006/main">
+  <p:cSld>
+    <p:spTree>
+      <p:nvGrpSpPr>
+        <p:cNvPr id="1" name=""/>
+        <p:cNvGrpSpPr/>
+        <p:nvPr/>
+      </p:nvGrpSpPr>
+      <p:grpSpPr>
+        <a:xfrm>
+          <a:off x="0" y="0"/>
+          <a:ext cx="0" cy="0"/>
+          <a:chOff x="0" y="0"/>
+          <a:chExt cx="0" cy="0"/>
+        </a:xfrm>
+      </p:grpSpPr>
+      <p:sp>
+        <p:nvSpPr>
           <p:cNvPr id="2" name="Subtitle 1"/>
           <p:cNvSpPr>
             <a:spLocks noGrp="1"/>
@@ -30903,7 +31167,7 @@
 </p:sld>
 </file>
 
-<file path=ppt/slides/slide44.xml><?xml version="1.0" encoding="utf-8"?>
+<file path=ppt/slides/slide45.xml><?xml version="1.0" encoding="utf-8"?>
 <p:sld xmlns:a="http://schemas.openxmlformats.org/drawingml/2006/main" xmlns:r="http://schemas.openxmlformats.org/officeDocument/2006/relationships" xmlns:p="http://schemas.openxmlformats.org/presentationml/2006/main">
   <p:cSld>
     <p:spTree>
@@ -30938,7 +31202,7 @@
             <a:fld id="{2BF067CD-8E6B-4360-9AA8-C5DF2A48A6D1}" type="slidenum">
               <a:rPr lang="en-US" noProof="0" smtClean="0"/>
               <a:pPr/>
-              <a:t>44</a:t>
+              <a:t>45</a:t>
             </a:fld>
             <a:endParaRPr lang="en-US" noProof="0" dirty="0"/>
           </a:p>
@@ -31417,7 +31681,7 @@
 </p:sld>
 </file>
 
-<file path=ppt/slides/slide45.xml><?xml version="1.0" encoding="utf-8"?>
+<file path=ppt/slides/slide46.xml><?xml version="1.0" encoding="utf-8"?>
 <p:sld xmlns:a="http://schemas.openxmlformats.org/drawingml/2006/main" xmlns:r="http://schemas.openxmlformats.org/officeDocument/2006/relationships" xmlns:p="http://schemas.openxmlformats.org/presentationml/2006/main">
   <p:cSld>
     <p:spTree>
@@ -31452,7 +31716,7 @@
             <a:fld id="{2BF067CD-8E6B-4360-9AA8-C5DF2A48A6D1}" type="slidenum">
               <a:rPr lang="en-US" noProof="0" smtClean="0"/>
               <a:pPr/>
-              <a:t>45</a:t>
+              <a:t>46</a:t>
             </a:fld>
             <a:endParaRPr lang="en-US" noProof="0" dirty="0"/>
           </a:p>
@@ -31734,7 +31998,7 @@
 </p:sld>
 </file>
 
-<file path=ppt/slides/slide46.xml><?xml version="1.0" encoding="utf-8"?>
+<file path=ppt/slides/slide47.xml><?xml version="1.0" encoding="utf-8"?>
 <p:sld xmlns:a="http://schemas.openxmlformats.org/drawingml/2006/main" xmlns:r="http://schemas.openxmlformats.org/officeDocument/2006/relationships" xmlns:p="http://schemas.openxmlformats.org/presentationml/2006/main">
   <p:cSld>
     <p:spTree>
@@ -31769,7 +32033,7 @@
             <a:fld id="{2BF067CD-8E6B-4360-9AA8-C5DF2A48A6D1}" type="slidenum">
               <a:rPr lang="en-US" noProof="0" smtClean="0"/>
               <a:pPr/>
-              <a:t>46</a:t>
+              <a:t>47</a:t>
             </a:fld>
             <a:endParaRPr lang="en-US" noProof="0" dirty="0"/>
           </a:p>
@@ -32112,7 +32376,7 @@
 </p:sld>
 </file>
 
-<file path=ppt/slides/slide47.xml><?xml version="1.0" encoding="utf-8"?>
+<file path=ppt/slides/slide48.xml><?xml version="1.0" encoding="utf-8"?>
 <p:sld xmlns:a="http://schemas.openxmlformats.org/drawingml/2006/main" xmlns:r="http://schemas.openxmlformats.org/officeDocument/2006/relationships" xmlns:p="http://schemas.openxmlformats.org/presentationml/2006/main">
   <p:cSld>
     <p:spTree>
@@ -32147,7 +32411,7 @@
             <a:fld id="{2BF067CD-8E6B-4360-9AA8-C5DF2A48A6D1}" type="slidenum">
               <a:rPr lang="en-US" noProof="0" smtClean="0"/>
               <a:pPr/>
-              <a:t>47</a:t>
+              <a:t>48</a:t>
             </a:fld>
             <a:endParaRPr lang="en-US" noProof="0" dirty="0"/>
           </a:p>
@@ -32572,7 +32836,7 @@
 </p:sld>
 </file>
 
-<file path=ppt/slides/slide48.xml><?xml version="1.0" encoding="utf-8"?>
+<file path=ppt/slides/slide49.xml><?xml version="1.0" encoding="utf-8"?>
 <p:sld xmlns:a="http://schemas.openxmlformats.org/drawingml/2006/main" xmlns:r="http://schemas.openxmlformats.org/officeDocument/2006/relationships" xmlns:p="http://schemas.openxmlformats.org/presentationml/2006/main">
   <p:cSld>
     <p:spTree>
@@ -32673,7 +32937,101 @@
 </p:sld>
 </file>
 
-<file path=ppt/slides/slide49.xml><?xml version="1.0" encoding="utf-8"?>
+<file path=ppt/slides/slide5.xml><?xml version="1.0" encoding="utf-8"?>
+<p:sld xmlns:a="http://schemas.openxmlformats.org/drawingml/2006/main" xmlns:r="http://schemas.openxmlformats.org/officeDocument/2006/relationships" xmlns:p="http://schemas.openxmlformats.org/presentationml/2006/main">
+  <p:cSld>
+    <p:spTree>
+      <p:nvGrpSpPr>
+        <p:cNvPr id="1" name=""/>
+        <p:cNvGrpSpPr/>
+        <p:nvPr/>
+      </p:nvGrpSpPr>
+      <p:grpSpPr>
+        <a:xfrm>
+          <a:off x="0" y="0"/>
+          <a:ext cx="0" cy="0"/>
+          <a:chOff x="0" y="0"/>
+          <a:chExt cx="0" cy="0"/>
+        </a:xfrm>
+      </p:grpSpPr>
+      <p:sp>
+        <p:nvSpPr>
+          <p:cNvPr id="3" name="Title 2"/>
+          <p:cNvSpPr>
+            <a:spLocks noGrp="1"/>
+          </p:cNvSpPr>
+          <p:nvPr>
+            <p:ph type="title" sz="quarter" idx="10"/>
+          </p:nvPr>
+        </p:nvSpPr>
+        <p:spPr>
+          <a:xfrm>
+            <a:off x="615109" y="4572000"/>
+            <a:ext cx="10961783" cy="1848375"/>
+          </a:xfrm>
+        </p:spPr>
+        <p:txBody>
+          <a:bodyPr/>
+          <a:lstStyle/>
+          <a:p>
+            <a:r>
+              <a:rPr lang="bg-BG" dirty="0"/>
+              <a:t>Създаване на таблици и </a:t>
+            </a:r>
+            <a:br>
+              <a:rPr lang="bg-BG" dirty="0"/>
+            </a:br>
+            <a:r>
+              <a:rPr lang="bg-BG" dirty="0"/>
+              <a:t>попълване на данни</a:t>
+            </a:r>
+            <a:endParaRPr lang="en-US" dirty="0"/>
+          </a:p>
+        </p:txBody>
+      </p:sp>
+      <p:pic>
+        <p:nvPicPr>
+          <p:cNvPr id="43012" name="Picture 4" descr="Database table - Free computer icons"/>
+          <p:cNvPicPr>
+            <a:picLocks noChangeAspect="1" noChangeArrowheads="1"/>
+          </p:cNvPicPr>
+          <p:nvPr/>
+        </p:nvPicPr>
+        <p:blipFill>
+          <a:blip r:embed="rId2" cstate="print"/>
+          <a:srcRect/>
+          <a:stretch>
+            <a:fillRect/>
+          </a:stretch>
+        </p:blipFill>
+        <p:spPr bwMode="auto">
+          <a:xfrm>
+            <a:off x="4800600" y="1295400"/>
+            <a:ext cx="2438400" cy="2438401"/>
+          </a:xfrm>
+          <a:prstGeom prst="rect">
+            <a:avLst/>
+          </a:prstGeom>
+          <a:noFill/>
+        </p:spPr>
+      </p:pic>
+    </p:spTree>
+  </p:cSld>
+  <p:clrMapOvr>
+    <a:masterClrMapping/>
+  </p:clrMapOvr>
+  <mc:AlternateContent xmlns:mc="http://schemas.openxmlformats.org/markup-compatibility/2006" xmlns:p14="http://schemas.microsoft.com/office/powerpoint/2010/main">
+    <mc:Choice Requires="p14">
+      <p:transition spd="slow" p14:dur="2000" advClick="0" advTm="5000"/>
+    </mc:Choice>
+    <mc:Fallback xmlns="">
+      <p:transition spd="slow" advClick="0" advTm="5000"/>
+    </mc:Fallback>
+  </mc:AlternateContent>
+</p:sld>
+</file>
+
+<file path=ppt/slides/slide50.xml><?xml version="1.0" encoding="utf-8"?>
 <p:sld xmlns:a="http://schemas.openxmlformats.org/drawingml/2006/main" xmlns:r="http://schemas.openxmlformats.org/officeDocument/2006/relationships" xmlns:p="http://schemas.openxmlformats.org/presentationml/2006/main">
   <p:cSld>
     <p:spTree>
@@ -32708,7 +33066,7 @@
             <a:fld id="{2BF067CD-8E6B-4360-9AA8-C5DF2A48A6D1}" type="slidenum">
               <a:rPr lang="en-US" noProof="0" smtClean="0"/>
               <a:pPr/>
-              <a:t>49</a:t>
+              <a:t>50</a:t>
             </a:fld>
             <a:endParaRPr lang="en-US" noProof="0" dirty="0"/>
           </a:p>
@@ -33267,101 +33625,7 @@
 </p:sld>
 </file>
 
-<file path=ppt/slides/slide5.xml><?xml version="1.0" encoding="utf-8"?>
-<p:sld xmlns:a="http://schemas.openxmlformats.org/drawingml/2006/main" xmlns:r="http://schemas.openxmlformats.org/officeDocument/2006/relationships" xmlns:p="http://schemas.openxmlformats.org/presentationml/2006/main">
-  <p:cSld>
-    <p:spTree>
-      <p:nvGrpSpPr>
-        <p:cNvPr id="1" name=""/>
-        <p:cNvGrpSpPr/>
-        <p:nvPr/>
-      </p:nvGrpSpPr>
-      <p:grpSpPr>
-        <a:xfrm>
-          <a:off x="0" y="0"/>
-          <a:ext cx="0" cy="0"/>
-          <a:chOff x="0" y="0"/>
-          <a:chExt cx="0" cy="0"/>
-        </a:xfrm>
-      </p:grpSpPr>
-      <p:sp>
-        <p:nvSpPr>
-          <p:cNvPr id="3" name="Title 2"/>
-          <p:cNvSpPr>
-            <a:spLocks noGrp="1"/>
-          </p:cNvSpPr>
-          <p:nvPr>
-            <p:ph type="title" sz="quarter" idx="10"/>
-          </p:nvPr>
-        </p:nvSpPr>
-        <p:spPr>
-          <a:xfrm>
-            <a:off x="615109" y="4572000"/>
-            <a:ext cx="10961783" cy="1848375"/>
-          </a:xfrm>
-        </p:spPr>
-        <p:txBody>
-          <a:bodyPr/>
-          <a:lstStyle/>
-          <a:p>
-            <a:r>
-              <a:rPr lang="bg-BG" dirty="0"/>
-              <a:t>Създаване на таблици и </a:t>
-            </a:r>
-            <a:br>
-              <a:rPr lang="bg-BG" dirty="0"/>
-            </a:br>
-            <a:r>
-              <a:rPr lang="bg-BG" dirty="0"/>
-              <a:t>попълване на данни</a:t>
-            </a:r>
-            <a:endParaRPr lang="en-US" dirty="0"/>
-          </a:p>
-        </p:txBody>
-      </p:sp>
-      <p:pic>
-        <p:nvPicPr>
-          <p:cNvPr id="43012" name="Picture 4" descr="Database table - Free computer icons"/>
-          <p:cNvPicPr>
-            <a:picLocks noChangeAspect="1" noChangeArrowheads="1"/>
-          </p:cNvPicPr>
-          <p:nvPr/>
-        </p:nvPicPr>
-        <p:blipFill>
-          <a:blip r:embed="rId2" cstate="print"/>
-          <a:srcRect/>
-          <a:stretch>
-            <a:fillRect/>
-          </a:stretch>
-        </p:blipFill>
-        <p:spPr bwMode="auto">
-          <a:xfrm>
-            <a:off x="4800600" y="1295400"/>
-            <a:ext cx="2438400" cy="2438401"/>
-          </a:xfrm>
-          <a:prstGeom prst="rect">
-            <a:avLst/>
-          </a:prstGeom>
-          <a:noFill/>
-        </p:spPr>
-      </p:pic>
-    </p:spTree>
-  </p:cSld>
-  <p:clrMapOvr>
-    <a:masterClrMapping/>
-  </p:clrMapOvr>
-  <mc:AlternateContent xmlns:mc="http://schemas.openxmlformats.org/markup-compatibility/2006" xmlns:p14="http://schemas.microsoft.com/office/powerpoint/2010/main">
-    <mc:Choice Requires="p14">
-      <p:transition spd="slow" p14:dur="2000" advClick="0" advTm="5000"/>
-    </mc:Choice>
-    <mc:Fallback xmlns="">
-      <p:transition spd="slow" advClick="0" advTm="5000"/>
-    </mc:Fallback>
-  </mc:AlternateContent>
-</p:sld>
-</file>
-
-<file path=ppt/slides/slide50.xml><?xml version="1.0" encoding="utf-8"?>
+<file path=ppt/slides/slide51.xml><?xml version="1.0" encoding="utf-8"?>
 <p:sld xmlns:a="http://schemas.openxmlformats.org/drawingml/2006/main" xmlns:r="http://schemas.openxmlformats.org/officeDocument/2006/relationships" xmlns:p="http://schemas.openxmlformats.org/presentationml/2006/main">
   <p:cSld>
     <p:spTree>
@@ -33396,7 +33660,7 @@
             <a:fld id="{2BF067CD-8E6B-4360-9AA8-C5DF2A48A6D1}" type="slidenum">
               <a:rPr lang="en-US" noProof="0" smtClean="0"/>
               <a:pPr/>
-              <a:t>50</a:t>
+              <a:t>51</a:t>
             </a:fld>
             <a:endParaRPr lang="en-US" noProof="0" dirty="0"/>
           </a:p>
@@ -33876,7 +34140,7 @@
 </p:sld>
 </file>
 
-<file path=ppt/slides/slide51.xml><?xml version="1.0" encoding="utf-8"?>
+<file path=ppt/slides/slide52.xml><?xml version="1.0" encoding="utf-8"?>
 <p:sld xmlns:a="http://schemas.openxmlformats.org/drawingml/2006/main" xmlns:r="http://schemas.openxmlformats.org/officeDocument/2006/relationships" xmlns:p="http://schemas.openxmlformats.org/presentationml/2006/main">
   <p:cSld>
     <p:spTree>
@@ -33911,7 +34175,7 @@
             <a:fld id="{2BF067CD-8E6B-4360-9AA8-C5DF2A48A6D1}" type="slidenum">
               <a:rPr lang="en-US" noProof="0" smtClean="0"/>
               <a:pPr/>
-              <a:t>51</a:t>
+              <a:t>52</a:t>
             </a:fld>
             <a:endParaRPr lang="en-US" noProof="0" dirty="0"/>
           </a:p>
@@ -34185,7 +34449,7 @@
 </p:sld>
 </file>
 
-<file path=ppt/slides/slide52.xml><?xml version="1.0" encoding="utf-8"?>
+<file path=ppt/slides/slide53.xml><?xml version="1.0" encoding="utf-8"?>
 <p:sld xmlns:a="http://schemas.openxmlformats.org/drawingml/2006/main" xmlns:r="http://schemas.openxmlformats.org/officeDocument/2006/relationships" xmlns:p="http://schemas.openxmlformats.org/presentationml/2006/main">
   <p:cSld>
     <p:spTree>
@@ -34220,7 +34484,7 @@
             <a:fld id="{2BF067CD-8E6B-4360-9AA8-C5DF2A48A6D1}" type="slidenum">
               <a:rPr lang="en-US" noProof="0" smtClean="0"/>
               <a:pPr/>
-              <a:t>52</a:t>
+              <a:t>53</a:t>
             </a:fld>
             <a:endParaRPr lang="en-US" noProof="0" dirty="0"/>
           </a:p>
@@ -36276,7 +36540,7 @@
 </p:sld>
 </file>
 
-<file path=ppt/slides/slide53.xml><?xml version="1.0" encoding="utf-8"?>
+<file path=ppt/slides/slide54.xml><?xml version="1.0" encoding="utf-8"?>
 <p:sld xmlns:a="http://schemas.openxmlformats.org/drawingml/2006/main" xmlns:r="http://schemas.openxmlformats.org/officeDocument/2006/relationships" xmlns:p="http://schemas.openxmlformats.org/presentationml/2006/main">
   <p:cSld>
     <p:spTree>
@@ -36311,7 +36575,7 @@
             <a:fld id="{2BF067CD-8E6B-4360-9AA8-C5DF2A48A6D1}" type="slidenum">
               <a:rPr lang="en-US" noProof="0" smtClean="0"/>
               <a:pPr/>
-              <a:t>53</a:t>
+              <a:t>54</a:t>
             </a:fld>
             <a:endParaRPr lang="en-US" noProof="0" dirty="0"/>
           </a:p>
@@ -36365,7 +36629,7 @@
             <a:pPr lvl="1"/>
             <a:r>
               <a:rPr lang="ru-RU" dirty="0"/>
-              <a:t>Ако се появи </a:t>
+              <a:t>Ако използвате </a:t>
             </a:r>
             <a:r>
               <a:rPr lang="ru-RU" b="1" dirty="0">
@@ -36695,7 +36959,7 @@
 </p:sld>
 </file>
 
-<file path=ppt/slides/slide54.xml><?xml version="1.0" encoding="utf-8"?>
+<file path=ppt/slides/slide55.xml><?xml version="1.0" encoding="utf-8"?>
 <p:sld xmlns:a="http://schemas.openxmlformats.org/drawingml/2006/main" xmlns:r="http://schemas.openxmlformats.org/officeDocument/2006/relationships" xmlns:p="http://schemas.openxmlformats.org/presentationml/2006/main">
   <p:cSld>
     <p:spTree>
@@ -36730,7 +36994,7 @@
             <a:fld id="{2BF067CD-8E6B-4360-9AA8-C5DF2A48A6D1}" type="slidenum">
               <a:rPr lang="en-US" noProof="0" smtClean="0"/>
               <a:pPr/>
-              <a:t>54</a:t>
+              <a:t>55</a:t>
             </a:fld>
             <a:endParaRPr lang="en-US" noProof="0" dirty="0"/>
           </a:p>
@@ -37217,7 +37481,7 @@
 </p:sld>
 </file>
 
-<file path=ppt/slides/slide55.xml><?xml version="1.0" encoding="utf-8"?>
+<file path=ppt/slides/slide56.xml><?xml version="1.0" encoding="utf-8"?>
 <p:sld xmlns:a="http://schemas.openxmlformats.org/drawingml/2006/main" xmlns:r="http://schemas.openxmlformats.org/officeDocument/2006/relationships" xmlns:p="http://schemas.openxmlformats.org/presentationml/2006/main">
   <p:cSld>
     <p:spTree>
@@ -37448,8 +37712,8 @@
         </p:nvSpPr>
         <p:spPr>
           <a:xfrm>
-            <a:off x="609600" y="1295400"/>
-            <a:ext cx="8775781" cy="5029200"/>
+            <a:off x="533400" y="1540935"/>
+            <a:ext cx="9051235" cy="5393265"/>
           </a:xfrm>
         </p:spPr>
         <p:txBody>
@@ -37516,7 +37780,7 @@
               </a:buClr>
             </a:pPr>
             <a:r>
-              <a:rPr lang="en-US" sz="2600" b="1" dirty="0">
+              <a:rPr lang="en-US" sz="2800" b="1" dirty="0">
                 <a:solidFill>
                   <a:schemeClr val="bg1">
                     <a:lumMod val="60000"/>
@@ -37527,7 +37791,7 @@
               <a:t>MS Access</a:t>
             </a:r>
             <a:r>
-              <a:rPr lang="bg-BG" sz="2600" b="1" dirty="0">
+              <a:rPr lang="bg-BG" sz="2800" b="1" dirty="0">
                 <a:solidFill>
                   <a:schemeClr val="bg1">
                     <a:lumMod val="60000"/>
@@ -37538,10 +37802,10 @@
               <a:t> </a:t>
             </a:r>
             <a:r>
-              <a:rPr lang="bg-BG" sz="2600" b="1" dirty="0"/>
+              <a:rPr lang="bg-BG" sz="2800" b="1" dirty="0"/>
               <a:t>== СУБД с интуитивен интерфейс</a:t>
             </a:r>
-            <a:endParaRPr lang="en-US" sz="2600" b="1" dirty="0"/>
+            <a:endParaRPr lang="en-US" sz="2800" b="1" dirty="0"/>
           </a:p>
           <a:p>
             <a:pPr lvl="1">
@@ -37619,74 +37883,7 @@
             </a:r>
           </a:p>
           <a:p>
-            <a:pPr lvl="1">
-              <a:lnSpc>
-                <a:spcPct val="100000"/>
-              </a:lnSpc>
-              <a:spcAft>
-                <a:spcPts val="0"/>
-              </a:spcAft>
-            </a:pPr>
-            <a:r>
-              <a:rPr lang="ru-RU" sz="2400" b="1" dirty="0">
-                <a:solidFill>
-                  <a:schemeClr val="bg2"/>
-                </a:solidFill>
-              </a:rPr>
-              <a:t>Дава възможност за </a:t>
-            </a:r>
-            <a:r>
-              <a:rPr lang="ru-RU" sz="2400" b="1" dirty="0">
-                <a:solidFill>
-                  <a:schemeClr val="bg1">
-                    <a:lumMod val="60000"/>
-                    <a:lumOff val="40000"/>
-                  </a:schemeClr>
-                </a:solidFill>
-              </a:rPr>
-              <a:t>импортиране</a:t>
-            </a:r>
-            <a:r>
-              <a:rPr lang="ru-RU" sz="2400" b="1" dirty="0">
-                <a:solidFill>
-                  <a:schemeClr val="bg2"/>
-                </a:solidFill>
-              </a:rPr>
-              <a:t> на </a:t>
-            </a:r>
-            <a:r>
-              <a:rPr lang="ru-RU" sz="2400" b="1" dirty="0">
-                <a:solidFill>
-                  <a:schemeClr val="bg1">
-                    <a:lumMod val="60000"/>
-                    <a:lumOff val="40000"/>
-                  </a:schemeClr>
-                </a:solidFill>
-              </a:rPr>
-              <a:t>външни</a:t>
-            </a:r>
-            <a:r>
-              <a:rPr lang="ru-RU" sz="2400" b="1" dirty="0">
-                <a:solidFill>
-                  <a:schemeClr val="bg2"/>
-                </a:solidFill>
-              </a:rPr>
-              <a:t> </a:t>
-            </a:r>
-            <a:r>
-              <a:rPr lang="ru-RU" sz="2400" b="1" dirty="0">
-                <a:solidFill>
-                  <a:schemeClr val="bg1">
-                    <a:lumMod val="60000"/>
-                    <a:lumOff val="40000"/>
-                  </a:schemeClr>
-                </a:solidFill>
-              </a:rPr>
-              <a:t>данни</a:t>
-            </a:r>
-          </a:p>
-          <a:p>
-            <a:pPr lvl="2">
+            <a:pPr>
               <a:lnSpc>
                 <a:spcPct val="100000"/>
               </a:lnSpc>
@@ -37698,7 +37895,7 @@
               </a:buClr>
             </a:pPr>
             <a:r>
-              <a:rPr lang="en-US" sz="2400" b="1" dirty="0">
+              <a:rPr lang="ru-RU" sz="2800" b="1" dirty="0">
                 <a:solidFill>
                   <a:schemeClr val="bg1">
                     <a:lumMod val="60000"/>
@@ -37706,23 +37903,18 @@
                   </a:schemeClr>
                 </a:solidFill>
               </a:rPr>
-              <a:t>Excel</a:t>
-            </a:r>
-          </a:p>
-          <a:p>
-            <a:pPr lvl="2">
-              <a:lnSpc>
-                <a:spcPct val="100000"/>
-              </a:lnSpc>
-              <a:spcAft>
-                <a:spcPts val="0"/>
-              </a:spcAft>
-              <a:buClr>
-                <a:schemeClr val="bg2"/>
-              </a:buClr>
-            </a:pPr>
-            <a:r>
-              <a:rPr lang="en-US" sz="2400" b="1" dirty="0">
+              <a:t>Импортиране</a:t>
+            </a:r>
+            <a:r>
+              <a:rPr lang="ru-RU" sz="2800" b="1" dirty="0">
+                <a:solidFill>
+                  <a:schemeClr val="bg2"/>
+                </a:solidFill>
+              </a:rPr>
+              <a:t> на </a:t>
+            </a:r>
+            <a:r>
+              <a:rPr lang="ru-RU" sz="2800" b="1" dirty="0">
                 <a:solidFill>
                   <a:schemeClr val="bg1">
                     <a:lumMod val="60000"/>
@@ -37730,10 +37922,10 @@
                   </a:schemeClr>
                 </a:solidFill>
               </a:rPr>
-              <a:t>SQL</a:t>
-            </a:r>
-            <a:r>
-              <a:rPr lang="en-US" sz="2400" b="1" dirty="0">
+              <a:t>външни</a:t>
+            </a:r>
+            <a:r>
+              <a:rPr lang="ru-RU" sz="2800" b="1" dirty="0">
                 <a:solidFill>
                   <a:schemeClr val="bg2"/>
                 </a:solidFill>
@@ -37741,7 +37933,7 @@
               <a:t> </a:t>
             </a:r>
             <a:r>
-              <a:rPr lang="en-US" sz="2400" b="1" dirty="0">
+              <a:rPr lang="ru-RU" sz="2800" b="1" dirty="0">
                 <a:solidFill>
                   <a:schemeClr val="bg1">
                     <a:lumMod val="60000"/>
@@ -37749,32 +37941,7 @@
                   </a:schemeClr>
                 </a:solidFill>
               </a:rPr>
-              <a:t>Server</a:t>
-            </a:r>
-          </a:p>
-          <a:p>
-            <a:pPr>
-              <a:lnSpc>
-                <a:spcPct val="100000"/>
-              </a:lnSpc>
-              <a:spcAft>
-                <a:spcPts val="0"/>
-              </a:spcAft>
-            </a:pPr>
-            <a:r>
-              <a:rPr lang="bg-BG" sz="2800" b="1" dirty="0"/>
-              <a:t>Създаване на </a:t>
-            </a:r>
-            <a:r>
-              <a:rPr lang="bg-BG" sz="2800" b="1" dirty="0">
-                <a:solidFill>
-                  <a:schemeClr val="bg1">
-                    <a:lumMod val="60000"/>
-                    <a:lumOff val="40000"/>
-                  </a:schemeClr>
-                </a:solidFill>
-              </a:rPr>
-              <a:t>заявки</a:t>
+              <a:t>данни</a:t>
             </a:r>
           </a:p>
           <a:p>
@@ -37790,7 +37957,7 @@
               </a:buClr>
             </a:pPr>
             <a:r>
-              <a:rPr lang="ru-RU" sz="2400" b="1" dirty="0">
+              <a:rPr lang="en-US" sz="2600" b="1" dirty="0">
                 <a:solidFill>
                   <a:schemeClr val="bg1">
                     <a:lumMod val="60000"/>
@@ -37798,18 +37965,23 @@
                   </a:schemeClr>
                 </a:solidFill>
               </a:rPr>
-              <a:t>SQL</a:t>
-            </a:r>
-            <a:r>
-              <a:rPr lang="ru-RU" sz="2400" b="1" dirty="0">
-                <a:solidFill>
-                  <a:schemeClr val="bg2"/>
-                </a:solidFill>
-              </a:rPr>
-              <a:t> и </a:t>
-            </a:r>
-            <a:r>
-              <a:rPr lang="ru-RU" sz="2400" b="1" dirty="0">
+              <a:t>Excel</a:t>
+            </a:r>
+          </a:p>
+          <a:p>
+            <a:pPr lvl="1">
+              <a:lnSpc>
+                <a:spcPct val="100000"/>
+              </a:lnSpc>
+              <a:spcAft>
+                <a:spcPts val="0"/>
+              </a:spcAft>
+              <a:buClr>
+                <a:schemeClr val="bg2"/>
+              </a:buClr>
+            </a:pPr>
+            <a:r>
+              <a:rPr lang="en-US" sz="2600" b="1" dirty="0">
                 <a:solidFill>
                   <a:schemeClr val="bg1">
                     <a:lumMod val="60000"/>
@@ -37817,10 +37989,99 @@
                   </a:schemeClr>
                 </a:solidFill>
               </a:rPr>
+              <a:t>SQL</a:t>
+            </a:r>
+            <a:r>
+              <a:rPr lang="en-US" sz="2600" b="1" dirty="0">
+                <a:solidFill>
+                  <a:schemeClr val="bg2"/>
+                </a:solidFill>
+              </a:rPr>
+              <a:t> </a:t>
+            </a:r>
+            <a:r>
+              <a:rPr lang="en-US" sz="2600" b="1" dirty="0">
+                <a:solidFill>
+                  <a:schemeClr val="bg1">
+                    <a:lumMod val="60000"/>
+                    <a:lumOff val="40000"/>
+                  </a:schemeClr>
+                </a:solidFill>
+              </a:rPr>
+              <a:t>Server</a:t>
+            </a:r>
+          </a:p>
+          <a:p>
+            <a:pPr>
+              <a:lnSpc>
+                <a:spcPct val="100000"/>
+              </a:lnSpc>
+              <a:spcAft>
+                <a:spcPts val="0"/>
+              </a:spcAft>
+            </a:pPr>
+            <a:r>
+              <a:rPr lang="bg-BG" sz="2800" b="1" dirty="0"/>
+              <a:t>Създаване на </a:t>
+            </a:r>
+            <a:r>
+              <a:rPr lang="bg-BG" sz="2800" b="1" dirty="0">
+                <a:solidFill>
+                  <a:schemeClr val="bg1">
+                    <a:lumMod val="60000"/>
+                    <a:lumOff val="40000"/>
+                  </a:schemeClr>
+                </a:solidFill>
+              </a:rPr>
+              <a:t>заявки </a:t>
+            </a:r>
+            <a:r>
+              <a:rPr lang="bg-BG" sz="2800" b="1" dirty="0"/>
+              <a:t>с</a:t>
+            </a:r>
+            <a:r>
+              <a:rPr lang="bg-BG" sz="2800" b="1" dirty="0">
+                <a:solidFill>
+                  <a:schemeClr val="bg1">
+                    <a:lumMod val="60000"/>
+                    <a:lumOff val="40000"/>
+                  </a:schemeClr>
+                </a:solidFill>
+              </a:rPr>
+              <a:t> </a:t>
+            </a:r>
+            <a:r>
+              <a:rPr lang="ru-RU" sz="2400" b="1" dirty="0">
+                <a:solidFill>
+                  <a:schemeClr val="bg1">
+                    <a:lumMod val="60000"/>
+                    <a:lumOff val="40000"/>
+                  </a:schemeClr>
+                </a:solidFill>
+              </a:rPr>
+              <a:t>SQL</a:t>
+            </a:r>
+            <a:r>
+              <a:rPr lang="ru-RU" sz="2800" b="1" dirty="0">
+                <a:solidFill>
+                  <a:schemeClr val="bg2"/>
+                </a:solidFill>
+              </a:rPr>
+              <a:t> и </a:t>
+            </a:r>
+            <a:r>
+              <a:rPr lang="ru-RU" sz="2800" b="1" dirty="0">
+                <a:solidFill>
+                  <a:schemeClr val="bg1">
+                    <a:lumMod val="60000"/>
+                    <a:lumOff val="40000"/>
+                  </a:schemeClr>
+                </a:solidFill>
+              </a:rPr>
               <a:t>визуален</a:t>
             </a:r>
             <a:r>
-              <a:rPr lang="ru-RU" sz="2400" b="1" dirty="0">
+              <a:rPr lang="ru-RU" sz="2800" b="1" dirty="0">
                 <a:solidFill>
                   <a:schemeClr val="bg2"/>
                 </a:solidFill>
@@ -37849,18 +38110,23 @@
                   </a:schemeClr>
                 </a:solidFill>
               </a:rPr>
-              <a:t>Параметрични заявки</a:t>
-            </a:r>
-          </a:p>
-          <a:p>
-            <a:pPr lvl="1">
-              <a:lnSpc>
-                <a:spcPct val="100000"/>
-              </a:lnSpc>
-              <a:spcAft>
-                <a:spcPts val="0"/>
-              </a:spcAft>
-            </a:pPr>
+              <a:t>Параметрични заявки </a:t>
+            </a:r>
+            <a:r>
+              <a:rPr lang="bg-BG" sz="2800" b="1" dirty="0"/>
+              <a:t>==</a:t>
+            </a:r>
+            <a:r>
+              <a:rPr lang="bg-BG" sz="2800" b="1" dirty="0">
+                <a:solidFill>
+                  <a:schemeClr val="bg1">
+                    <a:lumMod val="60000"/>
+                    <a:lumOff val="40000"/>
+                  </a:schemeClr>
+                </a:solidFill>
+              </a:rPr>
+              <a:t> </a:t>
+            </a:r>
             <a:r>
               <a:rPr lang="bg-BG" sz="2400" b="1" dirty="0">
                 <a:solidFill>
@@ -37906,28 +38172,14 @@
                   </a:schemeClr>
                 </a:solidFill>
               </a:rPr>
-              <a:t>отчети</a:t>
-            </a:r>
-          </a:p>
-          <a:p>
-            <a:pPr lvl="1">
-              <a:lnSpc>
-                <a:spcPct val="100000"/>
-              </a:lnSpc>
-              <a:spcAft>
-                <a:spcPts val="0"/>
-              </a:spcAft>
-            </a:pPr>
-            <a:r>
-              <a:rPr lang="bg-BG" sz="2400" b="1" dirty="0">
-                <a:solidFill>
-                  <a:schemeClr val="bg2"/>
-                </a:solidFill>
-              </a:rPr>
-              <a:t>По-лесно </a:t>
-            </a:r>
-            <a:r>
-              <a:rPr lang="bg-BG" sz="2400" b="1" dirty="0">
+              <a:t>отчети </a:t>
+            </a:r>
+            <a:r>
+              <a:rPr lang="bg-BG" sz="2800" b="1" dirty="0"/>
+              <a:t>–</a:t>
+            </a:r>
+            <a:r>
+              <a:rPr lang="bg-BG" sz="2800" b="1" dirty="0">
                 <a:solidFill>
                   <a:schemeClr val="bg1">
                     <a:lumMod val="60000"/>
@@ -37935,18 +38187,22 @@
                   </a:schemeClr>
                 </a:solidFill>
               </a:rPr>
-              <a:t>анализиране</a:t>
-            </a:r>
-            <a:r>
-              <a:rPr lang="bg-BG" sz="2400" b="1" dirty="0">
+              <a:t> </a:t>
+            </a:r>
+            <a:r>
+              <a:rPr lang="bg-BG" sz="2800" b="1" dirty="0"/>
+              <a:t>п</a:t>
+            </a:r>
+            <a:r>
+              <a:rPr lang="bg-BG" sz="2800" b="1" dirty="0">
                 <a:solidFill>
                   <a:schemeClr val="bg2"/>
                 </a:solidFill>
               </a:rPr>
-              <a:t> и </a:t>
-            </a:r>
-            <a:r>
-              <a:rPr lang="bg-BG" sz="2400" b="1" dirty="0">
+              <a:t>о-лесно </a:t>
+            </a:r>
+            <a:r>
+              <a:rPr lang="bg-BG" sz="2800" b="1" dirty="0">
                 <a:solidFill>
                   <a:schemeClr val="bg1">
                     <a:lumMod val="60000"/>
@@ -37954,10 +38210,29 @@
                   </a:schemeClr>
                 </a:solidFill>
               </a:rPr>
+              <a:t>анализиране</a:t>
+            </a:r>
+            <a:r>
+              <a:rPr lang="bg-BG" sz="2800" b="1" dirty="0">
+                <a:solidFill>
+                  <a:schemeClr val="bg2"/>
+                </a:solidFill>
+              </a:rPr>
+              <a:t> и </a:t>
+            </a:r>
+            <a:r>
+              <a:rPr lang="bg-BG" sz="2800" b="1" dirty="0">
+                <a:solidFill>
+                  <a:schemeClr val="bg1">
+                    <a:lumMod val="60000"/>
+                    <a:lumOff val="40000"/>
+                  </a:schemeClr>
+                </a:solidFill>
+              </a:rPr>
               <a:t>споделяне</a:t>
             </a:r>
             <a:r>
-              <a:rPr lang="bg-BG" sz="2400" b="1" dirty="0">
+              <a:rPr lang="bg-BG" sz="2800" b="1" dirty="0">
                 <a:solidFill>
                   <a:schemeClr val="bg2"/>
                 </a:solidFill>
@@ -37965,7 +38240,7 @@
               <a:t> на </a:t>
             </a:r>
             <a:r>
-              <a:rPr lang="bg-BG" sz="2400" b="1" dirty="0">
+              <a:rPr lang="bg-BG" sz="2800" b="1" dirty="0">
                 <a:solidFill>
                   <a:schemeClr val="bg1">
                     <a:lumMod val="60000"/>
@@ -38014,7 +38289,7 @@
             <a:fld id="{2BF067CD-8E6B-4360-9AA8-C5DF2A48A6D1}" type="slidenum">
               <a:rPr lang="en-US" smtClean="0"/>
               <a:pPr/>
-              <a:t>55</a:t>
+              <a:t>56</a:t>
             </a:fld>
             <a:endParaRPr lang="en-US" dirty="0"/>
           </a:p>
@@ -38073,7 +38348,7 @@
           <a:lstStyle/>
           <a:p>
             <a:r>
-              <a:rPr lang="bg-BG"/>
+              <a:rPr lang="bg-BG" dirty="0"/>
               <a:t>Обобщение</a:t>
             </a:r>
             <a:endParaRPr lang="en-US" dirty="0"/>
@@ -38278,15 +38553,33 @@
                                   </p:childTnLst>
                                 </p:cTn>
                               </p:par>
+                            </p:childTnLst>
+                          </p:cTn>
+                        </p:par>
+                      </p:childTnLst>
+                    </p:cTn>
+                  </p:par>
+                  <p:par>
+                    <p:cTn id="17" fill="hold">
+                      <p:stCondLst>
+                        <p:cond delay="indefinite"/>
+                      </p:stCondLst>
+                      <p:childTnLst>
+                        <p:par>
+                          <p:cTn id="18" fill="hold">
+                            <p:stCondLst>
+                              <p:cond delay="0"/>
+                            </p:stCondLst>
+                            <p:childTnLst>
                               <p:par>
-                                <p:cTn id="17" presetID="1" presetClass="entr" presetSubtype="0" fill="hold" nodeType="withEffect">
+                                <p:cTn id="19" presetID="1" presetClass="entr" presetSubtype="0" fill="hold" nodeType="clickEffect">
                                   <p:stCondLst>
                                     <p:cond delay="0"/>
                                   </p:stCondLst>
                                   <p:childTnLst>
                                     <p:set>
                                       <p:cBhvr>
-                                        <p:cTn id="18" dur="1" fill="hold">
+                                        <p:cTn id="20" dur="1" fill="hold">
                                           <p:stCondLst>
                                             <p:cond delay="0"/>
                                           </p:stCondLst>
@@ -38316,50 +38609,19 @@
                     </p:cTn>
                   </p:par>
                   <p:par>
-                    <p:cTn id="19" fill="hold">
+                    <p:cTn id="21" fill="hold">
                       <p:stCondLst>
                         <p:cond delay="indefinite"/>
                       </p:stCondLst>
                       <p:childTnLst>
                         <p:par>
-                          <p:cTn id="20" fill="hold">
+                          <p:cTn id="22" fill="hold">
                             <p:stCondLst>
                               <p:cond delay="0"/>
                             </p:stCondLst>
                             <p:childTnLst>
                               <p:par>
-                                <p:cTn id="21" presetID="1" presetClass="entr" presetSubtype="0" fill="hold" nodeType="clickEffect">
-                                  <p:stCondLst>
-                                    <p:cond delay="0"/>
-                                  </p:stCondLst>
-                                  <p:childTnLst>
-                                    <p:set>
-                                      <p:cBhvr>
-                                        <p:cTn id="22" dur="1" fill="hold">
-                                          <p:stCondLst>
-                                            <p:cond delay="0"/>
-                                          </p:stCondLst>
-                                        </p:cTn>
-                                        <p:tgtEl>
-                                          <p:spTgt spid="14">
-                                            <p:txEl>
-                                              <p:pRg st="7" end="7"/>
-                                            </p:txEl>
-                                          </p:spTgt>
-                                        </p:tgtEl>
-                                        <p:attrNameLst>
-                                          <p:attrName>style.visibility</p:attrName>
-                                        </p:attrNameLst>
-                                      </p:cBhvr>
-                                      <p:to>
-                                        <p:strVal val="visible"/>
-                                      </p:to>
-                                    </p:set>
-                                  </p:childTnLst>
-                                </p:cTn>
-                              </p:par>
-                              <p:par>
-                                <p:cTn id="23" presetID="1" presetClass="entr" presetSubtype="0" fill="hold" nodeType="withEffect">
+                                <p:cTn id="23" presetID="1" presetClass="entr" presetSubtype="0" fill="hold" nodeType="clickEffect">
                                   <p:stCondLst>
                                     <p:cond delay="0"/>
                                   </p:stCondLst>
@@ -38374,87 +38636,7 @@
                                         <p:tgtEl>
                                           <p:spTgt spid="14">
                                             <p:txEl>
-                                              <p:pRg st="8" end="8"/>
-                                            </p:txEl>
-                                          </p:spTgt>
-                                        </p:tgtEl>
-                                        <p:attrNameLst>
-                                          <p:attrName>style.visibility</p:attrName>
-                                        </p:attrNameLst>
-                                      </p:cBhvr>
-                                      <p:to>
-                                        <p:strVal val="visible"/>
-                                      </p:to>
-                                    </p:set>
-                                  </p:childTnLst>
-                                </p:cTn>
-                              </p:par>
-                            </p:childTnLst>
-                          </p:cTn>
-                        </p:par>
-                      </p:childTnLst>
-                    </p:cTn>
-                  </p:par>
-                  <p:par>
-                    <p:cTn id="25" fill="hold">
-                      <p:stCondLst>
-                        <p:cond delay="indefinite"/>
-                      </p:stCondLst>
-                      <p:childTnLst>
-                        <p:par>
-                          <p:cTn id="26" fill="hold">
-                            <p:stCondLst>
-                              <p:cond delay="0"/>
-                            </p:stCondLst>
-                            <p:childTnLst>
-                              <p:par>
-                                <p:cTn id="27" presetID="1" presetClass="entr" presetSubtype="0" fill="hold" nodeType="clickEffect">
-                                  <p:stCondLst>
-                                    <p:cond delay="0"/>
-                                  </p:stCondLst>
-                                  <p:childTnLst>
-                                    <p:set>
-                                      <p:cBhvr>
-                                        <p:cTn id="28" dur="1" fill="hold">
-                                          <p:stCondLst>
-                                            <p:cond delay="0"/>
-                                          </p:stCondLst>
-                                        </p:cTn>
-                                        <p:tgtEl>
-                                          <p:spTgt spid="14">
-                                            <p:txEl>
-                                              <p:pRg st="9" end="9"/>
-                                            </p:txEl>
-                                          </p:spTgt>
-                                        </p:tgtEl>
-                                        <p:attrNameLst>
-                                          <p:attrName>style.visibility</p:attrName>
-                                        </p:attrNameLst>
-                                      </p:cBhvr>
-                                      <p:to>
-                                        <p:strVal val="visible"/>
-                                      </p:to>
-                                    </p:set>
-                                  </p:childTnLst>
-                                </p:cTn>
-                              </p:par>
-                              <p:par>
-                                <p:cTn id="29" presetID="1" presetClass="entr" presetSubtype="0" fill="hold" nodeType="withEffect">
-                                  <p:stCondLst>
-                                    <p:cond delay="0"/>
-                                  </p:stCondLst>
-                                  <p:childTnLst>
-                                    <p:set>
-                                      <p:cBhvr>
-                                        <p:cTn id="30" dur="1" fill="hold">
-                                          <p:stCondLst>
-                                            <p:cond delay="0"/>
-                                          </p:stCondLst>
-                                        </p:cTn>
-                                        <p:tgtEl>
-                                          <p:spTgt spid="14">
-                                            <p:txEl>
-                                              <p:pRg st="10" end="10"/>
+                                              <p:pRg st="7" end="7"/>
                                             </p:txEl>
                                           </p:spTgt>
                                         </p:tgtEl>
@@ -38500,7 +38682,7 @@
 </p:sld>
 </file>
 
-<file path=ppt/slides/slide56.xml><?xml version="1.0" encoding="utf-8"?>
+<file path=ppt/slides/slide57.xml><?xml version="1.0" encoding="utf-8"?>
 <p:sld xmlns:a="http://schemas.openxmlformats.org/drawingml/2006/main" xmlns:r="http://schemas.openxmlformats.org/officeDocument/2006/relationships" xmlns:p="http://schemas.openxmlformats.org/presentationml/2006/main">
   <p:cSld>
     <p:spTree>
@@ -39262,7 +39444,7 @@
 </p:sld>
 </file>
 
-<file path=ppt/slides/slide57.xml><?xml version="1.0" encoding="utf-8"?>
+<file path=ppt/slides/slide58.xml><?xml version="1.0" encoding="utf-8"?>
 <p:sld xmlns:a="http://schemas.openxmlformats.org/drawingml/2006/main" xmlns:r="http://schemas.openxmlformats.org/officeDocument/2006/relationships" xmlns:p="http://schemas.openxmlformats.org/presentationml/2006/main">
   <p:cSld>
     <p:spTree>
@@ -39315,7 +39497,7 @@
             <a:fld id="{2BF067CD-8E6B-4360-9AA8-C5DF2A48A6D1}" type="slidenum">
               <a:rPr lang="en-US" smtClean="0"/>
               <a:pPr/>
-              <a:t>57</a:t>
+              <a:t>58</a:t>
             </a:fld>
             <a:endParaRPr lang="en-US" dirty="0"/>
           </a:p>
@@ -40515,8 +40697,8 @@
         </p:blipFill>
         <p:spPr bwMode="auto">
           <a:xfrm>
-            <a:off x="3124200" y="2383611"/>
-            <a:ext cx="5943600" cy="4093389"/>
+            <a:off x="3139882" y="2007300"/>
+            <a:ext cx="6749185" cy="4648200"/>
           </a:xfrm>
           <a:prstGeom prst="rect">
             <a:avLst/>
@@ -42128,21 +42310,12 @@
 </file>
 
 <file path=customXml/item1.xml><?xml version="1.0" encoding="utf-8"?>
-<?mso-contentType ?>
-<FormTemplates xmlns="http://schemas.microsoft.com/sharepoint/v3/contenttype/forms">
-  <Display>DocumentLibraryForm</Display>
-  <Edit>DocumentLibraryForm</Edit>
-  <New>DocumentLibraryForm</New>
-</FormTemplates>
-</file>
-
-<file path=customXml/item2.xml><?xml version="1.0" encoding="utf-8"?>
 <p:properties xmlns:p="http://schemas.microsoft.com/office/2006/metadata/properties" xmlns:xsi="http://www.w3.org/2001/XMLSchema-instance" xmlns:pc="http://schemas.microsoft.com/office/infopath/2007/PartnerControls">
   <documentManagement/>
 </p:properties>
 </file>
 
-<file path=customXml/item3.xml><?xml version="1.0" encoding="utf-8"?>
+<file path=customXml/item2.xml><?xml version="1.0" encoding="utf-8"?>
 <ct:contentTypeSchema xmlns:ct="http://schemas.microsoft.com/office/2006/metadata/contentType" xmlns:ma="http://schemas.microsoft.com/office/2006/metadata/properties/metaAttributes" ct:_="" ma:_="" ma:contentTypeName="Документ" ma:contentTypeID="0x010100B6C18B0EB80FEC43B96FC4929E3ACDFF" ma:contentTypeVersion="8" ma:contentTypeDescription="Създаване на нов документ" ma:contentTypeScope="" ma:versionID="5e73c28b7fde86b7f49c9d6b9be21d41">
   <xsd:schema xmlns:xsd="http://www.w3.org/2001/XMLSchema" xmlns:xs="http://www.w3.org/2001/XMLSchema" xmlns:p="http://schemas.microsoft.com/office/2006/metadata/properties" xmlns:ns2="4f985cec-e092-4bcf-a1e1-b816bd0221d8" targetNamespace="http://schemas.microsoft.com/office/2006/metadata/properties" ma:root="true" ma:fieldsID="f7a640d6aa79659634b3275499e0d9c9" ns2:_="">
     <xsd:import namespace="4f985cec-e092-4bcf-a1e1-b816bd0221d8"/>
@@ -42314,15 +42487,16 @@
 </ct:contentTypeSchema>
 </file>
 
-<file path=customXml/itemProps1.xml><?xml version="1.0" encoding="utf-8"?>
-<ds:datastoreItem xmlns:ds="http://schemas.openxmlformats.org/officeDocument/2006/customXml" ds:itemID="{68A20BEC-F81B-49CD-951D-E62C4BAE7796}">
-  <ds:schemaRefs>
-    <ds:schemaRef ds:uri="http://schemas.microsoft.com/sharepoint/v3/contenttype/forms"/>
-  </ds:schemaRefs>
-</ds:datastoreItem>
+<file path=customXml/item3.xml><?xml version="1.0" encoding="utf-8"?>
+<?mso-contentType ?>
+<FormTemplates xmlns="http://schemas.microsoft.com/sharepoint/v3/contenttype/forms">
+  <Display>DocumentLibraryForm</Display>
+  <Edit>DocumentLibraryForm</Edit>
+  <New>DocumentLibraryForm</New>
+</FormTemplates>
 </file>
 
-<file path=customXml/itemProps2.xml><?xml version="1.0" encoding="utf-8"?>
+<file path=customXml/itemProps1.xml><?xml version="1.0" encoding="utf-8"?>
 <ds:datastoreItem xmlns:ds="http://schemas.openxmlformats.org/officeDocument/2006/customXml" ds:itemID="{5E2F4A33-1866-4BB8-8A35-8D6BDFE8D9F5}">
   <ds:schemaRefs>
     <ds:schemaRef ds:uri="http://schemas.microsoft.com/office/infopath/2007/PartnerControls"/>
@@ -42338,7 +42512,7 @@
 </ds:datastoreItem>
 </file>
 
-<file path=customXml/itemProps3.xml><?xml version="1.0" encoding="utf-8"?>
+<file path=customXml/itemProps2.xml><?xml version="1.0" encoding="utf-8"?>
 <ds:datastoreItem xmlns:ds="http://schemas.openxmlformats.org/officeDocument/2006/customXml" ds:itemID="{4443A303-689A-4436-B140-8B2DF827EBE9}">
   <ds:schemaRefs>
     <ds:schemaRef ds:uri="http://schemas.microsoft.com/office/2006/metadata/contentType"/>
@@ -42354,4 +42528,12 @@
     <ds:schemaRef ds:uri="http://schemas.microsoft.com/internal/obd"/>
   </ds:schemaRefs>
 </ds:datastoreItem>
+</file>
+
+<file path=customXml/itemProps3.xml><?xml version="1.0" encoding="utf-8"?>
+<ds:datastoreItem xmlns:ds="http://schemas.openxmlformats.org/officeDocument/2006/customXml" ds:itemID="{68A20BEC-F81B-49CD-951D-E62C4BAE7796}">
+  <ds:schemaRefs>
+    <ds:schemaRef ds:uri="http://schemas.microsoft.com/sharepoint/v3/contenttype/forms"/>
+  </ds:schemaRefs>
+</ds:datastoreItem>
 </file>
</xml_diff>